<commit_message>
Mise à jour - Rapport
</commit_message>
<xml_diff>
--- a/Documents/Presentation.pptx
+++ b/Documents/Presentation.pptx
@@ -139,7 +139,7 @@
           <p:cNvPr id="2" name="Title 1">
             <a:extLst>
               <a:ext uri="{FF2B5EF4-FFF2-40B4-BE49-F238E27FC236}">
-                <a16:creationId xmlns:a16="http://schemas.microsoft.com/office/drawing/2014/main" id="{771A0BF8-6686-4F02-AB36-9614142B369E}"/>
+                <a16:creationId xmlns:a16="http://schemas.microsoft.com/office/drawing/2014/main" xmlns="" id="{771A0BF8-6686-4F02-AB36-9614142B369E}"/>
               </a:ext>
             </a:extLst>
           </p:cNvPr>
@@ -177,7 +177,7 @@
           <p:cNvPr id="3" name="Subtitle 2">
             <a:extLst>
               <a:ext uri="{FF2B5EF4-FFF2-40B4-BE49-F238E27FC236}">
-                <a16:creationId xmlns:a16="http://schemas.microsoft.com/office/drawing/2014/main" id="{93B406FE-1165-421C-8D35-96F0CFEA6D51}"/>
+                <a16:creationId xmlns:a16="http://schemas.microsoft.com/office/drawing/2014/main" xmlns="" id="{93B406FE-1165-421C-8D35-96F0CFEA6D51}"/>
               </a:ext>
             </a:extLst>
           </p:cNvPr>
@@ -248,7 +248,7 @@
           <p:cNvPr id="4" name="Date Placeholder 3">
             <a:extLst>
               <a:ext uri="{FF2B5EF4-FFF2-40B4-BE49-F238E27FC236}">
-                <a16:creationId xmlns:a16="http://schemas.microsoft.com/office/drawing/2014/main" id="{DA7B22AA-13F6-430C-B5C3-3ED6A1325F28}"/>
+                <a16:creationId xmlns:a16="http://schemas.microsoft.com/office/drawing/2014/main" xmlns="" id="{DA7B22AA-13F6-430C-B5C3-3ED6A1325F28}"/>
               </a:ext>
             </a:extLst>
           </p:cNvPr>
@@ -266,7 +266,7 @@
           <a:p>
             <a:fld id="{1661375A-C223-44C8-917C-F7C3A1BCD50F}" type="datetimeFigureOut">
               <a:rPr lang="en-GB" smtClean="0"/>
-              <a:t>10/07/2020</a:t>
+              <a:t>11/07/2020</a:t>
             </a:fld>
             <a:endParaRPr lang="en-GB"/>
           </a:p>
@@ -277,7 +277,7 @@
           <p:cNvPr id="5" name="Footer Placeholder 4">
             <a:extLst>
               <a:ext uri="{FF2B5EF4-FFF2-40B4-BE49-F238E27FC236}">
-                <a16:creationId xmlns:a16="http://schemas.microsoft.com/office/drawing/2014/main" id="{12FB799C-1B8A-42C0-AD53-6DBEF2EC7EF6}"/>
+                <a16:creationId xmlns:a16="http://schemas.microsoft.com/office/drawing/2014/main" xmlns="" id="{12FB799C-1B8A-42C0-AD53-6DBEF2EC7EF6}"/>
               </a:ext>
             </a:extLst>
           </p:cNvPr>
@@ -302,7 +302,7 @@
           <p:cNvPr id="6" name="Slide Number Placeholder 5">
             <a:extLst>
               <a:ext uri="{FF2B5EF4-FFF2-40B4-BE49-F238E27FC236}">
-                <a16:creationId xmlns:a16="http://schemas.microsoft.com/office/drawing/2014/main" id="{8D8C035E-958A-44D5-9920-E77375E90336}"/>
+                <a16:creationId xmlns:a16="http://schemas.microsoft.com/office/drawing/2014/main" xmlns="" id="{8D8C035E-958A-44D5-9920-E77375E90336}"/>
               </a:ext>
             </a:extLst>
           </p:cNvPr>
@@ -361,7 +361,7 @@
           <p:cNvPr id="2" name="Title 1">
             <a:extLst>
               <a:ext uri="{FF2B5EF4-FFF2-40B4-BE49-F238E27FC236}">
-                <a16:creationId xmlns:a16="http://schemas.microsoft.com/office/drawing/2014/main" id="{81BE3A36-A7B5-4AED-90CE-DAABE341C72C}"/>
+                <a16:creationId xmlns:a16="http://schemas.microsoft.com/office/drawing/2014/main" xmlns="" id="{81BE3A36-A7B5-4AED-90CE-DAABE341C72C}"/>
               </a:ext>
             </a:extLst>
           </p:cNvPr>
@@ -390,7 +390,7 @@
           <p:cNvPr id="3" name="Vertical Text Placeholder 2">
             <a:extLst>
               <a:ext uri="{FF2B5EF4-FFF2-40B4-BE49-F238E27FC236}">
-                <a16:creationId xmlns:a16="http://schemas.microsoft.com/office/drawing/2014/main" id="{626DD818-2AC6-4AD8-ADB0-757AE6DE1FE6}"/>
+                <a16:creationId xmlns:a16="http://schemas.microsoft.com/office/drawing/2014/main" xmlns="" id="{626DD818-2AC6-4AD8-ADB0-757AE6DE1FE6}"/>
               </a:ext>
             </a:extLst>
           </p:cNvPr>
@@ -448,7 +448,7 @@
           <p:cNvPr id="4" name="Date Placeholder 3">
             <a:extLst>
               <a:ext uri="{FF2B5EF4-FFF2-40B4-BE49-F238E27FC236}">
-                <a16:creationId xmlns:a16="http://schemas.microsoft.com/office/drawing/2014/main" id="{1AB561BE-2670-413D-B85D-350DC6A08AAC}"/>
+                <a16:creationId xmlns:a16="http://schemas.microsoft.com/office/drawing/2014/main" xmlns="" id="{1AB561BE-2670-413D-B85D-350DC6A08AAC}"/>
               </a:ext>
             </a:extLst>
           </p:cNvPr>
@@ -466,7 +466,7 @@
           <a:p>
             <a:fld id="{1661375A-C223-44C8-917C-F7C3A1BCD50F}" type="datetimeFigureOut">
               <a:rPr lang="en-GB" smtClean="0"/>
-              <a:t>10/07/2020</a:t>
+              <a:t>11/07/2020</a:t>
             </a:fld>
             <a:endParaRPr lang="en-GB"/>
           </a:p>
@@ -477,7 +477,7 @@
           <p:cNvPr id="5" name="Footer Placeholder 4">
             <a:extLst>
               <a:ext uri="{FF2B5EF4-FFF2-40B4-BE49-F238E27FC236}">
-                <a16:creationId xmlns:a16="http://schemas.microsoft.com/office/drawing/2014/main" id="{8A7469BC-9B02-4F1D-9332-C52CAA6CD686}"/>
+                <a16:creationId xmlns:a16="http://schemas.microsoft.com/office/drawing/2014/main" xmlns="" id="{8A7469BC-9B02-4F1D-9332-C52CAA6CD686}"/>
               </a:ext>
             </a:extLst>
           </p:cNvPr>
@@ -502,7 +502,7 @@
           <p:cNvPr id="6" name="Slide Number Placeholder 5">
             <a:extLst>
               <a:ext uri="{FF2B5EF4-FFF2-40B4-BE49-F238E27FC236}">
-                <a16:creationId xmlns:a16="http://schemas.microsoft.com/office/drawing/2014/main" id="{B8F37A4D-841D-4B35-BD23-CCB82FC1C5BF}"/>
+                <a16:creationId xmlns:a16="http://schemas.microsoft.com/office/drawing/2014/main" xmlns="" id="{B8F37A4D-841D-4B35-BD23-CCB82FC1C5BF}"/>
               </a:ext>
             </a:extLst>
           </p:cNvPr>
@@ -561,7 +561,7 @@
           <p:cNvPr id="2" name="Vertical Title 1">
             <a:extLst>
               <a:ext uri="{FF2B5EF4-FFF2-40B4-BE49-F238E27FC236}">
-                <a16:creationId xmlns:a16="http://schemas.microsoft.com/office/drawing/2014/main" id="{F24028CB-78B2-414A-9948-C32EA4A46C81}"/>
+                <a16:creationId xmlns:a16="http://schemas.microsoft.com/office/drawing/2014/main" xmlns="" id="{F24028CB-78B2-414A-9948-C32EA4A46C81}"/>
               </a:ext>
             </a:extLst>
           </p:cNvPr>
@@ -595,7 +595,7 @@
           <p:cNvPr id="3" name="Vertical Text Placeholder 2">
             <a:extLst>
               <a:ext uri="{FF2B5EF4-FFF2-40B4-BE49-F238E27FC236}">
-                <a16:creationId xmlns:a16="http://schemas.microsoft.com/office/drawing/2014/main" id="{852AA2E1-9030-407F-A8FB-98BCFFFDF775}"/>
+                <a16:creationId xmlns:a16="http://schemas.microsoft.com/office/drawing/2014/main" xmlns="" id="{852AA2E1-9030-407F-A8FB-98BCFFFDF775}"/>
               </a:ext>
             </a:extLst>
           </p:cNvPr>
@@ -658,7 +658,7 @@
           <p:cNvPr id="4" name="Date Placeholder 3">
             <a:extLst>
               <a:ext uri="{FF2B5EF4-FFF2-40B4-BE49-F238E27FC236}">
-                <a16:creationId xmlns:a16="http://schemas.microsoft.com/office/drawing/2014/main" id="{80722082-BED4-46DC-B1C0-9696140EF480}"/>
+                <a16:creationId xmlns:a16="http://schemas.microsoft.com/office/drawing/2014/main" xmlns="" id="{80722082-BED4-46DC-B1C0-9696140EF480}"/>
               </a:ext>
             </a:extLst>
           </p:cNvPr>
@@ -676,7 +676,7 @@
           <a:p>
             <a:fld id="{1661375A-C223-44C8-917C-F7C3A1BCD50F}" type="datetimeFigureOut">
               <a:rPr lang="en-GB" smtClean="0"/>
-              <a:t>10/07/2020</a:t>
+              <a:t>11/07/2020</a:t>
             </a:fld>
             <a:endParaRPr lang="en-GB"/>
           </a:p>
@@ -687,7 +687,7 @@
           <p:cNvPr id="5" name="Footer Placeholder 4">
             <a:extLst>
               <a:ext uri="{FF2B5EF4-FFF2-40B4-BE49-F238E27FC236}">
-                <a16:creationId xmlns:a16="http://schemas.microsoft.com/office/drawing/2014/main" id="{F9485038-E165-45A4-8C75-C8A3CA8177EC}"/>
+                <a16:creationId xmlns:a16="http://schemas.microsoft.com/office/drawing/2014/main" xmlns="" id="{F9485038-E165-45A4-8C75-C8A3CA8177EC}"/>
               </a:ext>
             </a:extLst>
           </p:cNvPr>
@@ -712,7 +712,7 @@
           <p:cNvPr id="6" name="Slide Number Placeholder 5">
             <a:extLst>
               <a:ext uri="{FF2B5EF4-FFF2-40B4-BE49-F238E27FC236}">
-                <a16:creationId xmlns:a16="http://schemas.microsoft.com/office/drawing/2014/main" id="{C79D7943-C606-446E-B743-3AB1AE587BA9}"/>
+                <a16:creationId xmlns:a16="http://schemas.microsoft.com/office/drawing/2014/main" xmlns="" id="{C79D7943-C606-446E-B743-3AB1AE587BA9}"/>
               </a:ext>
             </a:extLst>
           </p:cNvPr>
@@ -771,7 +771,7 @@
           <p:cNvPr id="2" name="Title 1">
             <a:extLst>
               <a:ext uri="{FF2B5EF4-FFF2-40B4-BE49-F238E27FC236}">
-                <a16:creationId xmlns:a16="http://schemas.microsoft.com/office/drawing/2014/main" id="{F1628C7A-67F3-4CAD-9852-569FF656AD4E}"/>
+                <a16:creationId xmlns:a16="http://schemas.microsoft.com/office/drawing/2014/main" xmlns="" id="{F1628C7A-67F3-4CAD-9852-569FF656AD4E}"/>
               </a:ext>
             </a:extLst>
           </p:cNvPr>
@@ -800,7 +800,7 @@
           <p:cNvPr id="3" name="Content Placeholder 2">
             <a:extLst>
               <a:ext uri="{FF2B5EF4-FFF2-40B4-BE49-F238E27FC236}">
-                <a16:creationId xmlns:a16="http://schemas.microsoft.com/office/drawing/2014/main" id="{1D1E717F-25DD-4AF6-8E4C-C3F0B7258767}"/>
+                <a16:creationId xmlns:a16="http://schemas.microsoft.com/office/drawing/2014/main" xmlns="" id="{1D1E717F-25DD-4AF6-8E4C-C3F0B7258767}"/>
               </a:ext>
             </a:extLst>
           </p:cNvPr>
@@ -858,7 +858,7 @@
           <p:cNvPr id="4" name="Date Placeholder 3">
             <a:extLst>
               <a:ext uri="{FF2B5EF4-FFF2-40B4-BE49-F238E27FC236}">
-                <a16:creationId xmlns:a16="http://schemas.microsoft.com/office/drawing/2014/main" id="{5EB9BF79-C6C8-4A28-B317-36AB52011BBD}"/>
+                <a16:creationId xmlns:a16="http://schemas.microsoft.com/office/drawing/2014/main" xmlns="" id="{5EB9BF79-C6C8-4A28-B317-36AB52011BBD}"/>
               </a:ext>
             </a:extLst>
           </p:cNvPr>
@@ -876,7 +876,7 @@
           <a:p>
             <a:fld id="{1661375A-C223-44C8-917C-F7C3A1BCD50F}" type="datetimeFigureOut">
               <a:rPr lang="en-GB" smtClean="0"/>
-              <a:t>10/07/2020</a:t>
+              <a:t>11/07/2020</a:t>
             </a:fld>
             <a:endParaRPr lang="en-GB"/>
           </a:p>
@@ -887,7 +887,7 @@
           <p:cNvPr id="5" name="Footer Placeholder 4">
             <a:extLst>
               <a:ext uri="{FF2B5EF4-FFF2-40B4-BE49-F238E27FC236}">
-                <a16:creationId xmlns:a16="http://schemas.microsoft.com/office/drawing/2014/main" id="{A052C1D1-F1BF-42DD-A7C6-2ED272DF8AF6}"/>
+                <a16:creationId xmlns:a16="http://schemas.microsoft.com/office/drawing/2014/main" xmlns="" id="{A052C1D1-F1BF-42DD-A7C6-2ED272DF8AF6}"/>
               </a:ext>
             </a:extLst>
           </p:cNvPr>
@@ -912,7 +912,7 @@
           <p:cNvPr id="6" name="Slide Number Placeholder 5">
             <a:extLst>
               <a:ext uri="{FF2B5EF4-FFF2-40B4-BE49-F238E27FC236}">
-                <a16:creationId xmlns:a16="http://schemas.microsoft.com/office/drawing/2014/main" id="{B05916BF-016F-4056-985B-466516E68445}"/>
+                <a16:creationId xmlns:a16="http://schemas.microsoft.com/office/drawing/2014/main" xmlns="" id="{B05916BF-016F-4056-985B-466516E68445}"/>
               </a:ext>
             </a:extLst>
           </p:cNvPr>
@@ -971,7 +971,7 @@
           <p:cNvPr id="2" name="Title 1">
             <a:extLst>
               <a:ext uri="{FF2B5EF4-FFF2-40B4-BE49-F238E27FC236}">
-                <a16:creationId xmlns:a16="http://schemas.microsoft.com/office/drawing/2014/main" id="{A39FAECB-6827-4D91-8EB5-800DD8EA28F3}"/>
+                <a16:creationId xmlns:a16="http://schemas.microsoft.com/office/drawing/2014/main" xmlns="" id="{A39FAECB-6827-4D91-8EB5-800DD8EA28F3}"/>
               </a:ext>
             </a:extLst>
           </p:cNvPr>
@@ -1009,7 +1009,7 @@
           <p:cNvPr id="3" name="Text Placeholder 2">
             <a:extLst>
               <a:ext uri="{FF2B5EF4-FFF2-40B4-BE49-F238E27FC236}">
-                <a16:creationId xmlns:a16="http://schemas.microsoft.com/office/drawing/2014/main" id="{73CEBD6D-8344-4937-9A0D-E2DBE531B3F1}"/>
+                <a16:creationId xmlns:a16="http://schemas.microsoft.com/office/drawing/2014/main" xmlns="" id="{73CEBD6D-8344-4937-9A0D-E2DBE531B3F1}"/>
               </a:ext>
             </a:extLst>
           </p:cNvPr>
@@ -1134,7 +1134,7 @@
           <p:cNvPr id="4" name="Date Placeholder 3">
             <a:extLst>
               <a:ext uri="{FF2B5EF4-FFF2-40B4-BE49-F238E27FC236}">
-                <a16:creationId xmlns:a16="http://schemas.microsoft.com/office/drawing/2014/main" id="{40598055-7F4B-4E57-92A1-C43CE07ED7D1}"/>
+                <a16:creationId xmlns:a16="http://schemas.microsoft.com/office/drawing/2014/main" xmlns="" id="{40598055-7F4B-4E57-92A1-C43CE07ED7D1}"/>
               </a:ext>
             </a:extLst>
           </p:cNvPr>
@@ -1152,7 +1152,7 @@
           <a:p>
             <a:fld id="{1661375A-C223-44C8-917C-F7C3A1BCD50F}" type="datetimeFigureOut">
               <a:rPr lang="en-GB" smtClean="0"/>
-              <a:t>10/07/2020</a:t>
+              <a:t>11/07/2020</a:t>
             </a:fld>
             <a:endParaRPr lang="en-GB"/>
           </a:p>
@@ -1163,7 +1163,7 @@
           <p:cNvPr id="5" name="Footer Placeholder 4">
             <a:extLst>
               <a:ext uri="{FF2B5EF4-FFF2-40B4-BE49-F238E27FC236}">
-                <a16:creationId xmlns:a16="http://schemas.microsoft.com/office/drawing/2014/main" id="{0BC8293C-337A-46B9-801C-405BA28F919C}"/>
+                <a16:creationId xmlns:a16="http://schemas.microsoft.com/office/drawing/2014/main" xmlns="" id="{0BC8293C-337A-46B9-801C-405BA28F919C}"/>
               </a:ext>
             </a:extLst>
           </p:cNvPr>
@@ -1188,7 +1188,7 @@
           <p:cNvPr id="6" name="Slide Number Placeholder 5">
             <a:extLst>
               <a:ext uri="{FF2B5EF4-FFF2-40B4-BE49-F238E27FC236}">
-                <a16:creationId xmlns:a16="http://schemas.microsoft.com/office/drawing/2014/main" id="{77FE3A87-6EF6-4E32-958D-D3BDE968EC61}"/>
+                <a16:creationId xmlns:a16="http://schemas.microsoft.com/office/drawing/2014/main" xmlns="" id="{77FE3A87-6EF6-4E32-958D-D3BDE968EC61}"/>
               </a:ext>
             </a:extLst>
           </p:cNvPr>
@@ -1247,7 +1247,7 @@
           <p:cNvPr id="2" name="Title 1">
             <a:extLst>
               <a:ext uri="{FF2B5EF4-FFF2-40B4-BE49-F238E27FC236}">
-                <a16:creationId xmlns:a16="http://schemas.microsoft.com/office/drawing/2014/main" id="{439C1E4F-8411-4152-A040-45E4E38D465B}"/>
+                <a16:creationId xmlns:a16="http://schemas.microsoft.com/office/drawing/2014/main" xmlns="" id="{439C1E4F-8411-4152-A040-45E4E38D465B}"/>
               </a:ext>
             </a:extLst>
           </p:cNvPr>
@@ -1276,7 +1276,7 @@
           <p:cNvPr id="3" name="Content Placeholder 2">
             <a:extLst>
               <a:ext uri="{FF2B5EF4-FFF2-40B4-BE49-F238E27FC236}">
-                <a16:creationId xmlns:a16="http://schemas.microsoft.com/office/drawing/2014/main" id="{0C93C882-D441-40BC-AAB7-FB3EF79F6F5C}"/>
+                <a16:creationId xmlns:a16="http://schemas.microsoft.com/office/drawing/2014/main" xmlns="" id="{0C93C882-D441-40BC-AAB7-FB3EF79F6F5C}"/>
               </a:ext>
             </a:extLst>
           </p:cNvPr>
@@ -1339,7 +1339,7 @@
           <p:cNvPr id="4" name="Content Placeholder 3">
             <a:extLst>
               <a:ext uri="{FF2B5EF4-FFF2-40B4-BE49-F238E27FC236}">
-                <a16:creationId xmlns:a16="http://schemas.microsoft.com/office/drawing/2014/main" id="{880FF742-A50B-4EB6-86AE-E67F120A5B68}"/>
+                <a16:creationId xmlns:a16="http://schemas.microsoft.com/office/drawing/2014/main" xmlns="" id="{880FF742-A50B-4EB6-86AE-E67F120A5B68}"/>
               </a:ext>
             </a:extLst>
           </p:cNvPr>
@@ -1402,7 +1402,7 @@
           <p:cNvPr id="5" name="Date Placeholder 4">
             <a:extLst>
               <a:ext uri="{FF2B5EF4-FFF2-40B4-BE49-F238E27FC236}">
-                <a16:creationId xmlns:a16="http://schemas.microsoft.com/office/drawing/2014/main" id="{5ACB9172-F4DE-4657-A074-EF8778EE7E7D}"/>
+                <a16:creationId xmlns:a16="http://schemas.microsoft.com/office/drawing/2014/main" xmlns="" id="{5ACB9172-F4DE-4657-A074-EF8778EE7E7D}"/>
               </a:ext>
             </a:extLst>
           </p:cNvPr>
@@ -1420,7 +1420,7 @@
           <a:p>
             <a:fld id="{1661375A-C223-44C8-917C-F7C3A1BCD50F}" type="datetimeFigureOut">
               <a:rPr lang="en-GB" smtClean="0"/>
-              <a:t>10/07/2020</a:t>
+              <a:t>11/07/2020</a:t>
             </a:fld>
             <a:endParaRPr lang="en-GB"/>
           </a:p>
@@ -1431,7 +1431,7 @@
           <p:cNvPr id="6" name="Footer Placeholder 5">
             <a:extLst>
               <a:ext uri="{FF2B5EF4-FFF2-40B4-BE49-F238E27FC236}">
-                <a16:creationId xmlns:a16="http://schemas.microsoft.com/office/drawing/2014/main" id="{77507DBE-C8F7-423C-9124-EE7B3D22E368}"/>
+                <a16:creationId xmlns:a16="http://schemas.microsoft.com/office/drawing/2014/main" xmlns="" id="{77507DBE-C8F7-423C-9124-EE7B3D22E368}"/>
               </a:ext>
             </a:extLst>
           </p:cNvPr>
@@ -1456,7 +1456,7 @@
           <p:cNvPr id="7" name="Slide Number Placeholder 6">
             <a:extLst>
               <a:ext uri="{FF2B5EF4-FFF2-40B4-BE49-F238E27FC236}">
-                <a16:creationId xmlns:a16="http://schemas.microsoft.com/office/drawing/2014/main" id="{D881AC0B-71D5-43A5-AD86-9668B4D92263}"/>
+                <a16:creationId xmlns:a16="http://schemas.microsoft.com/office/drawing/2014/main" xmlns="" id="{D881AC0B-71D5-43A5-AD86-9668B4D92263}"/>
               </a:ext>
             </a:extLst>
           </p:cNvPr>
@@ -1515,7 +1515,7 @@
           <p:cNvPr id="2" name="Title 1">
             <a:extLst>
               <a:ext uri="{FF2B5EF4-FFF2-40B4-BE49-F238E27FC236}">
-                <a16:creationId xmlns:a16="http://schemas.microsoft.com/office/drawing/2014/main" id="{18C204D3-549C-4770-B620-7E3D4678A946}"/>
+                <a16:creationId xmlns:a16="http://schemas.microsoft.com/office/drawing/2014/main" xmlns="" id="{18C204D3-549C-4770-B620-7E3D4678A946}"/>
               </a:ext>
             </a:extLst>
           </p:cNvPr>
@@ -1549,7 +1549,7 @@
           <p:cNvPr id="3" name="Text Placeholder 2">
             <a:extLst>
               <a:ext uri="{FF2B5EF4-FFF2-40B4-BE49-F238E27FC236}">
-                <a16:creationId xmlns:a16="http://schemas.microsoft.com/office/drawing/2014/main" id="{54306D22-9474-474E-A4DD-36D304E57648}"/>
+                <a16:creationId xmlns:a16="http://schemas.microsoft.com/office/drawing/2014/main" xmlns="" id="{54306D22-9474-474E-A4DD-36D304E57648}"/>
               </a:ext>
             </a:extLst>
           </p:cNvPr>
@@ -1620,7 +1620,7 @@
           <p:cNvPr id="4" name="Content Placeholder 3">
             <a:extLst>
               <a:ext uri="{FF2B5EF4-FFF2-40B4-BE49-F238E27FC236}">
-                <a16:creationId xmlns:a16="http://schemas.microsoft.com/office/drawing/2014/main" id="{AD9ED9F3-E75B-4CB6-9C20-44656AF0159D}"/>
+                <a16:creationId xmlns:a16="http://schemas.microsoft.com/office/drawing/2014/main" xmlns="" id="{AD9ED9F3-E75B-4CB6-9C20-44656AF0159D}"/>
               </a:ext>
             </a:extLst>
           </p:cNvPr>
@@ -1683,7 +1683,7 @@
           <p:cNvPr id="5" name="Text Placeholder 4">
             <a:extLst>
               <a:ext uri="{FF2B5EF4-FFF2-40B4-BE49-F238E27FC236}">
-                <a16:creationId xmlns:a16="http://schemas.microsoft.com/office/drawing/2014/main" id="{82AB8604-4E78-4EF6-AF81-B832751C756A}"/>
+                <a16:creationId xmlns:a16="http://schemas.microsoft.com/office/drawing/2014/main" xmlns="" id="{82AB8604-4E78-4EF6-AF81-B832751C756A}"/>
               </a:ext>
             </a:extLst>
           </p:cNvPr>
@@ -1754,7 +1754,7 @@
           <p:cNvPr id="6" name="Content Placeholder 5">
             <a:extLst>
               <a:ext uri="{FF2B5EF4-FFF2-40B4-BE49-F238E27FC236}">
-                <a16:creationId xmlns:a16="http://schemas.microsoft.com/office/drawing/2014/main" id="{14C7266C-4F95-4B63-B8A4-5D430A6FCB51}"/>
+                <a16:creationId xmlns:a16="http://schemas.microsoft.com/office/drawing/2014/main" xmlns="" id="{14C7266C-4F95-4B63-B8A4-5D430A6FCB51}"/>
               </a:ext>
             </a:extLst>
           </p:cNvPr>
@@ -1817,7 +1817,7 @@
           <p:cNvPr id="7" name="Date Placeholder 6">
             <a:extLst>
               <a:ext uri="{FF2B5EF4-FFF2-40B4-BE49-F238E27FC236}">
-                <a16:creationId xmlns:a16="http://schemas.microsoft.com/office/drawing/2014/main" id="{8DA605C0-AC58-49C3-BFDA-E7ADCFC7B8CA}"/>
+                <a16:creationId xmlns:a16="http://schemas.microsoft.com/office/drawing/2014/main" xmlns="" id="{8DA605C0-AC58-49C3-BFDA-E7ADCFC7B8CA}"/>
               </a:ext>
             </a:extLst>
           </p:cNvPr>
@@ -1835,7 +1835,7 @@
           <a:p>
             <a:fld id="{1661375A-C223-44C8-917C-F7C3A1BCD50F}" type="datetimeFigureOut">
               <a:rPr lang="en-GB" smtClean="0"/>
-              <a:t>10/07/2020</a:t>
+              <a:t>11/07/2020</a:t>
             </a:fld>
             <a:endParaRPr lang="en-GB"/>
           </a:p>
@@ -1846,7 +1846,7 @@
           <p:cNvPr id="8" name="Footer Placeholder 7">
             <a:extLst>
               <a:ext uri="{FF2B5EF4-FFF2-40B4-BE49-F238E27FC236}">
-                <a16:creationId xmlns:a16="http://schemas.microsoft.com/office/drawing/2014/main" id="{A8CDB99B-8E2F-47DA-B6C3-50842D8C3DD2}"/>
+                <a16:creationId xmlns:a16="http://schemas.microsoft.com/office/drawing/2014/main" xmlns="" id="{A8CDB99B-8E2F-47DA-B6C3-50842D8C3DD2}"/>
               </a:ext>
             </a:extLst>
           </p:cNvPr>
@@ -1871,7 +1871,7 @@
           <p:cNvPr id="9" name="Slide Number Placeholder 8">
             <a:extLst>
               <a:ext uri="{FF2B5EF4-FFF2-40B4-BE49-F238E27FC236}">
-                <a16:creationId xmlns:a16="http://schemas.microsoft.com/office/drawing/2014/main" id="{900ACA83-753D-4AEE-B568-755DCF5ED7F7}"/>
+                <a16:creationId xmlns:a16="http://schemas.microsoft.com/office/drawing/2014/main" xmlns="" id="{900ACA83-753D-4AEE-B568-755DCF5ED7F7}"/>
               </a:ext>
             </a:extLst>
           </p:cNvPr>
@@ -1930,7 +1930,7 @@
           <p:cNvPr id="2" name="Title 1">
             <a:extLst>
               <a:ext uri="{FF2B5EF4-FFF2-40B4-BE49-F238E27FC236}">
-                <a16:creationId xmlns:a16="http://schemas.microsoft.com/office/drawing/2014/main" id="{80738EDC-8D44-427B-90E0-FBD0FBAC9691}"/>
+                <a16:creationId xmlns:a16="http://schemas.microsoft.com/office/drawing/2014/main" xmlns="" id="{80738EDC-8D44-427B-90E0-FBD0FBAC9691}"/>
               </a:ext>
             </a:extLst>
           </p:cNvPr>
@@ -1959,7 +1959,7 @@
           <p:cNvPr id="3" name="Date Placeholder 2">
             <a:extLst>
               <a:ext uri="{FF2B5EF4-FFF2-40B4-BE49-F238E27FC236}">
-                <a16:creationId xmlns:a16="http://schemas.microsoft.com/office/drawing/2014/main" id="{A8AE544B-A36F-473A-86AF-50F02429182D}"/>
+                <a16:creationId xmlns:a16="http://schemas.microsoft.com/office/drawing/2014/main" xmlns="" id="{A8AE544B-A36F-473A-86AF-50F02429182D}"/>
               </a:ext>
             </a:extLst>
           </p:cNvPr>
@@ -1977,7 +1977,7 @@
           <a:p>
             <a:fld id="{1661375A-C223-44C8-917C-F7C3A1BCD50F}" type="datetimeFigureOut">
               <a:rPr lang="en-GB" smtClean="0"/>
-              <a:t>10/07/2020</a:t>
+              <a:t>11/07/2020</a:t>
             </a:fld>
             <a:endParaRPr lang="en-GB"/>
           </a:p>
@@ -1988,7 +1988,7 @@
           <p:cNvPr id="4" name="Footer Placeholder 3">
             <a:extLst>
               <a:ext uri="{FF2B5EF4-FFF2-40B4-BE49-F238E27FC236}">
-                <a16:creationId xmlns:a16="http://schemas.microsoft.com/office/drawing/2014/main" id="{3E6F2748-531A-4318-A370-27EDE490E8C2}"/>
+                <a16:creationId xmlns:a16="http://schemas.microsoft.com/office/drawing/2014/main" xmlns="" id="{3E6F2748-531A-4318-A370-27EDE490E8C2}"/>
               </a:ext>
             </a:extLst>
           </p:cNvPr>
@@ -2013,7 +2013,7 @@
           <p:cNvPr id="5" name="Slide Number Placeholder 4">
             <a:extLst>
               <a:ext uri="{FF2B5EF4-FFF2-40B4-BE49-F238E27FC236}">
-                <a16:creationId xmlns:a16="http://schemas.microsoft.com/office/drawing/2014/main" id="{A5AD6E57-F20B-43D2-A268-2449E7D4ADF8}"/>
+                <a16:creationId xmlns:a16="http://schemas.microsoft.com/office/drawing/2014/main" xmlns="" id="{A5AD6E57-F20B-43D2-A268-2449E7D4ADF8}"/>
               </a:ext>
             </a:extLst>
           </p:cNvPr>
@@ -2072,7 +2072,7 @@
           <p:cNvPr id="2" name="Date Placeholder 1">
             <a:extLst>
               <a:ext uri="{FF2B5EF4-FFF2-40B4-BE49-F238E27FC236}">
-                <a16:creationId xmlns:a16="http://schemas.microsoft.com/office/drawing/2014/main" id="{CCEC2F6E-BB8D-4A07-B873-A379FEAE4F53}"/>
+                <a16:creationId xmlns:a16="http://schemas.microsoft.com/office/drawing/2014/main" xmlns="" id="{CCEC2F6E-BB8D-4A07-B873-A379FEAE4F53}"/>
               </a:ext>
             </a:extLst>
           </p:cNvPr>
@@ -2090,7 +2090,7 @@
           <a:p>
             <a:fld id="{1661375A-C223-44C8-917C-F7C3A1BCD50F}" type="datetimeFigureOut">
               <a:rPr lang="en-GB" smtClean="0"/>
-              <a:t>10/07/2020</a:t>
+              <a:t>11/07/2020</a:t>
             </a:fld>
             <a:endParaRPr lang="en-GB"/>
           </a:p>
@@ -2101,7 +2101,7 @@
           <p:cNvPr id="3" name="Footer Placeholder 2">
             <a:extLst>
               <a:ext uri="{FF2B5EF4-FFF2-40B4-BE49-F238E27FC236}">
-                <a16:creationId xmlns:a16="http://schemas.microsoft.com/office/drawing/2014/main" id="{29C64672-2E28-45BB-AB1E-9CA10E90883B}"/>
+                <a16:creationId xmlns:a16="http://schemas.microsoft.com/office/drawing/2014/main" xmlns="" id="{29C64672-2E28-45BB-AB1E-9CA10E90883B}"/>
               </a:ext>
             </a:extLst>
           </p:cNvPr>
@@ -2126,7 +2126,7 @@
           <p:cNvPr id="4" name="Slide Number Placeholder 3">
             <a:extLst>
               <a:ext uri="{FF2B5EF4-FFF2-40B4-BE49-F238E27FC236}">
-                <a16:creationId xmlns:a16="http://schemas.microsoft.com/office/drawing/2014/main" id="{433CCF35-5028-4E4D-8F6E-2E2DF0FB4299}"/>
+                <a16:creationId xmlns:a16="http://schemas.microsoft.com/office/drawing/2014/main" xmlns="" id="{433CCF35-5028-4E4D-8F6E-2E2DF0FB4299}"/>
               </a:ext>
             </a:extLst>
           </p:cNvPr>
@@ -2185,7 +2185,7 @@
           <p:cNvPr id="2" name="Title 1">
             <a:extLst>
               <a:ext uri="{FF2B5EF4-FFF2-40B4-BE49-F238E27FC236}">
-                <a16:creationId xmlns:a16="http://schemas.microsoft.com/office/drawing/2014/main" id="{4760471D-7A64-4A50-B9A6-0F3A78088AB3}"/>
+                <a16:creationId xmlns:a16="http://schemas.microsoft.com/office/drawing/2014/main" xmlns="" id="{4760471D-7A64-4A50-B9A6-0F3A78088AB3}"/>
               </a:ext>
             </a:extLst>
           </p:cNvPr>
@@ -2223,7 +2223,7 @@
           <p:cNvPr id="3" name="Content Placeholder 2">
             <a:extLst>
               <a:ext uri="{FF2B5EF4-FFF2-40B4-BE49-F238E27FC236}">
-                <a16:creationId xmlns:a16="http://schemas.microsoft.com/office/drawing/2014/main" id="{C16427B1-871E-4C56-AF97-3F78ADBFA9C8}"/>
+                <a16:creationId xmlns:a16="http://schemas.microsoft.com/office/drawing/2014/main" xmlns="" id="{C16427B1-871E-4C56-AF97-3F78ADBFA9C8}"/>
               </a:ext>
             </a:extLst>
           </p:cNvPr>
@@ -2314,7 +2314,7 @@
           <p:cNvPr id="4" name="Text Placeholder 3">
             <a:extLst>
               <a:ext uri="{FF2B5EF4-FFF2-40B4-BE49-F238E27FC236}">
-                <a16:creationId xmlns:a16="http://schemas.microsoft.com/office/drawing/2014/main" id="{6CF52702-EC0A-4FBA-9939-DCF10E412D80}"/>
+                <a16:creationId xmlns:a16="http://schemas.microsoft.com/office/drawing/2014/main" xmlns="" id="{6CF52702-EC0A-4FBA-9939-DCF10E412D80}"/>
               </a:ext>
             </a:extLst>
           </p:cNvPr>
@@ -2385,7 +2385,7 @@
           <p:cNvPr id="5" name="Date Placeholder 4">
             <a:extLst>
               <a:ext uri="{FF2B5EF4-FFF2-40B4-BE49-F238E27FC236}">
-                <a16:creationId xmlns:a16="http://schemas.microsoft.com/office/drawing/2014/main" id="{A1EDDBB8-93FE-4585-A97D-0E391EE246F7}"/>
+                <a16:creationId xmlns:a16="http://schemas.microsoft.com/office/drawing/2014/main" xmlns="" id="{A1EDDBB8-93FE-4585-A97D-0E391EE246F7}"/>
               </a:ext>
             </a:extLst>
           </p:cNvPr>
@@ -2403,7 +2403,7 @@
           <a:p>
             <a:fld id="{1661375A-C223-44C8-917C-F7C3A1BCD50F}" type="datetimeFigureOut">
               <a:rPr lang="en-GB" smtClean="0"/>
-              <a:t>10/07/2020</a:t>
+              <a:t>11/07/2020</a:t>
             </a:fld>
             <a:endParaRPr lang="en-GB"/>
           </a:p>
@@ -2414,7 +2414,7 @@
           <p:cNvPr id="6" name="Footer Placeholder 5">
             <a:extLst>
               <a:ext uri="{FF2B5EF4-FFF2-40B4-BE49-F238E27FC236}">
-                <a16:creationId xmlns:a16="http://schemas.microsoft.com/office/drawing/2014/main" id="{2CB77A2A-D97D-4B06-A029-77A3A88DA3E4}"/>
+                <a16:creationId xmlns:a16="http://schemas.microsoft.com/office/drawing/2014/main" xmlns="" id="{2CB77A2A-D97D-4B06-A029-77A3A88DA3E4}"/>
               </a:ext>
             </a:extLst>
           </p:cNvPr>
@@ -2439,7 +2439,7 @@
           <p:cNvPr id="7" name="Slide Number Placeholder 6">
             <a:extLst>
               <a:ext uri="{FF2B5EF4-FFF2-40B4-BE49-F238E27FC236}">
-                <a16:creationId xmlns:a16="http://schemas.microsoft.com/office/drawing/2014/main" id="{9BF4E011-48A8-486A-BF53-E7C085173F29}"/>
+                <a16:creationId xmlns:a16="http://schemas.microsoft.com/office/drawing/2014/main" xmlns="" id="{9BF4E011-48A8-486A-BF53-E7C085173F29}"/>
               </a:ext>
             </a:extLst>
           </p:cNvPr>
@@ -2498,7 +2498,7 @@
           <p:cNvPr id="2" name="Title 1">
             <a:extLst>
               <a:ext uri="{FF2B5EF4-FFF2-40B4-BE49-F238E27FC236}">
-                <a16:creationId xmlns:a16="http://schemas.microsoft.com/office/drawing/2014/main" id="{C8EA2B76-0D50-4AE7-8E70-B69B2F112A49}"/>
+                <a16:creationId xmlns:a16="http://schemas.microsoft.com/office/drawing/2014/main" xmlns="" id="{C8EA2B76-0D50-4AE7-8E70-B69B2F112A49}"/>
               </a:ext>
             </a:extLst>
           </p:cNvPr>
@@ -2536,7 +2536,7 @@
           <p:cNvPr id="3" name="Picture Placeholder 2">
             <a:extLst>
               <a:ext uri="{FF2B5EF4-FFF2-40B4-BE49-F238E27FC236}">
-                <a16:creationId xmlns:a16="http://schemas.microsoft.com/office/drawing/2014/main" id="{6E700288-1A1C-45A8-B99A-68E661D708A9}"/>
+                <a16:creationId xmlns:a16="http://schemas.microsoft.com/office/drawing/2014/main" xmlns="" id="{6E700288-1A1C-45A8-B99A-68E661D708A9}"/>
               </a:ext>
             </a:extLst>
           </p:cNvPr>
@@ -2603,7 +2603,7 @@
           <p:cNvPr id="4" name="Text Placeholder 3">
             <a:extLst>
               <a:ext uri="{FF2B5EF4-FFF2-40B4-BE49-F238E27FC236}">
-                <a16:creationId xmlns:a16="http://schemas.microsoft.com/office/drawing/2014/main" id="{C8D19D42-4449-4938-BE9F-F8A026382E85}"/>
+                <a16:creationId xmlns:a16="http://schemas.microsoft.com/office/drawing/2014/main" xmlns="" id="{C8D19D42-4449-4938-BE9F-F8A026382E85}"/>
               </a:ext>
             </a:extLst>
           </p:cNvPr>
@@ -2674,7 +2674,7 @@
           <p:cNvPr id="5" name="Date Placeholder 4">
             <a:extLst>
               <a:ext uri="{FF2B5EF4-FFF2-40B4-BE49-F238E27FC236}">
-                <a16:creationId xmlns:a16="http://schemas.microsoft.com/office/drawing/2014/main" id="{715CB693-3AD5-4FB5-9BD7-DDA6EA895AA0}"/>
+                <a16:creationId xmlns:a16="http://schemas.microsoft.com/office/drawing/2014/main" xmlns="" id="{715CB693-3AD5-4FB5-9BD7-DDA6EA895AA0}"/>
               </a:ext>
             </a:extLst>
           </p:cNvPr>
@@ -2692,7 +2692,7 @@
           <a:p>
             <a:fld id="{1661375A-C223-44C8-917C-F7C3A1BCD50F}" type="datetimeFigureOut">
               <a:rPr lang="en-GB" smtClean="0"/>
-              <a:t>10/07/2020</a:t>
+              <a:t>11/07/2020</a:t>
             </a:fld>
             <a:endParaRPr lang="en-GB"/>
           </a:p>
@@ -2703,7 +2703,7 @@
           <p:cNvPr id="6" name="Footer Placeholder 5">
             <a:extLst>
               <a:ext uri="{FF2B5EF4-FFF2-40B4-BE49-F238E27FC236}">
-                <a16:creationId xmlns:a16="http://schemas.microsoft.com/office/drawing/2014/main" id="{BB28CAAB-378F-4646-836D-6723AF22695B}"/>
+                <a16:creationId xmlns:a16="http://schemas.microsoft.com/office/drawing/2014/main" xmlns="" id="{BB28CAAB-378F-4646-836D-6723AF22695B}"/>
               </a:ext>
             </a:extLst>
           </p:cNvPr>
@@ -2728,7 +2728,7 @@
           <p:cNvPr id="7" name="Slide Number Placeholder 6">
             <a:extLst>
               <a:ext uri="{FF2B5EF4-FFF2-40B4-BE49-F238E27FC236}">
-                <a16:creationId xmlns:a16="http://schemas.microsoft.com/office/drawing/2014/main" id="{E08A5F22-2F00-4B7E-95E3-D4E37EE6F9BD}"/>
+                <a16:creationId xmlns:a16="http://schemas.microsoft.com/office/drawing/2014/main" xmlns="" id="{E08A5F22-2F00-4B7E-95E3-D4E37EE6F9BD}"/>
               </a:ext>
             </a:extLst>
           </p:cNvPr>
@@ -2792,7 +2792,7 @@
           <p:cNvPr id="2" name="Title Placeholder 1">
             <a:extLst>
               <a:ext uri="{FF2B5EF4-FFF2-40B4-BE49-F238E27FC236}">
-                <a16:creationId xmlns:a16="http://schemas.microsoft.com/office/drawing/2014/main" id="{EC73493B-E27E-4DC0-A41A-7E254FDDD4F9}"/>
+                <a16:creationId xmlns:a16="http://schemas.microsoft.com/office/drawing/2014/main" xmlns="" id="{EC73493B-E27E-4DC0-A41A-7E254FDDD4F9}"/>
               </a:ext>
             </a:extLst>
           </p:cNvPr>
@@ -2831,7 +2831,7 @@
           <p:cNvPr id="3" name="Text Placeholder 2">
             <a:extLst>
               <a:ext uri="{FF2B5EF4-FFF2-40B4-BE49-F238E27FC236}">
-                <a16:creationId xmlns:a16="http://schemas.microsoft.com/office/drawing/2014/main" id="{6B619A8B-408B-4DCB-AC39-AC640BF8562E}"/>
+                <a16:creationId xmlns:a16="http://schemas.microsoft.com/office/drawing/2014/main" xmlns="" id="{6B619A8B-408B-4DCB-AC39-AC640BF8562E}"/>
               </a:ext>
             </a:extLst>
           </p:cNvPr>
@@ -2899,7 +2899,7 @@
           <p:cNvPr id="4" name="Date Placeholder 3">
             <a:extLst>
               <a:ext uri="{FF2B5EF4-FFF2-40B4-BE49-F238E27FC236}">
-                <a16:creationId xmlns:a16="http://schemas.microsoft.com/office/drawing/2014/main" id="{A4A87CC5-FBB1-4FE5-893F-7BD071C75E09}"/>
+                <a16:creationId xmlns:a16="http://schemas.microsoft.com/office/drawing/2014/main" xmlns="" id="{A4A87CC5-FBB1-4FE5-893F-7BD071C75E09}"/>
               </a:ext>
             </a:extLst>
           </p:cNvPr>
@@ -2935,7 +2935,7 @@
           <a:p>
             <a:fld id="{1661375A-C223-44C8-917C-F7C3A1BCD50F}" type="datetimeFigureOut">
               <a:rPr lang="en-GB" smtClean="0"/>
-              <a:t>10/07/2020</a:t>
+              <a:t>11/07/2020</a:t>
             </a:fld>
             <a:endParaRPr lang="en-GB"/>
           </a:p>
@@ -2946,7 +2946,7 @@
           <p:cNvPr id="5" name="Footer Placeholder 4">
             <a:extLst>
               <a:ext uri="{FF2B5EF4-FFF2-40B4-BE49-F238E27FC236}">
-                <a16:creationId xmlns:a16="http://schemas.microsoft.com/office/drawing/2014/main" id="{068E1BCB-E2F2-4D1B-BCFC-521169C8EA83}"/>
+                <a16:creationId xmlns:a16="http://schemas.microsoft.com/office/drawing/2014/main" xmlns="" id="{068E1BCB-E2F2-4D1B-BCFC-521169C8EA83}"/>
               </a:ext>
             </a:extLst>
           </p:cNvPr>
@@ -2989,7 +2989,7 @@
           <p:cNvPr id="6" name="Slide Number Placeholder 5">
             <a:extLst>
               <a:ext uri="{FF2B5EF4-FFF2-40B4-BE49-F238E27FC236}">
-                <a16:creationId xmlns:a16="http://schemas.microsoft.com/office/drawing/2014/main" id="{E111173B-B48E-4DCF-8715-580539054913}"/>
+                <a16:creationId xmlns:a16="http://schemas.microsoft.com/office/drawing/2014/main" xmlns="" id="{E111173B-B48E-4DCF-8715-580539054913}"/>
               </a:ext>
             </a:extLst>
           </p:cNvPr>
@@ -3365,7 +3365,7 @@
           <p:cNvPr id="61" name="Rectangle 60">
             <a:extLst>
               <a:ext uri="{FF2B5EF4-FFF2-40B4-BE49-F238E27FC236}">
-                <a16:creationId xmlns:a16="http://schemas.microsoft.com/office/drawing/2014/main" id="{081ED8F9-FA35-46E4-A111-6E26EEF77E2D}"/>
+                <a16:creationId xmlns:a16="http://schemas.microsoft.com/office/drawing/2014/main" xmlns="" id="{081ED8F9-FA35-46E4-A111-6E26EEF77E2D}"/>
               </a:ext>
             </a:extLst>
           </p:cNvPr>
@@ -3419,7 +3419,7 @@
           <p:cNvPr id="30" name="TextBox 29">
             <a:extLst>
               <a:ext uri="{FF2B5EF4-FFF2-40B4-BE49-F238E27FC236}">
-                <a16:creationId xmlns:a16="http://schemas.microsoft.com/office/drawing/2014/main" id="{366288A5-37A7-479D-9050-4535FE30645D}"/>
+                <a16:creationId xmlns:a16="http://schemas.microsoft.com/office/drawing/2014/main" xmlns="" id="{366288A5-37A7-479D-9050-4535FE30645D}"/>
               </a:ext>
             </a:extLst>
           </p:cNvPr>
@@ -3458,8 +3458,65 @@
                 <a:ea typeface="Noto Sans" panose="020B0502040504020204" pitchFamily="34"/>
                 <a:cs typeface="Noto Sans" panose="020B0502040504020204" pitchFamily="34"/>
               </a:rPr>
-              <a:t>Notre équipe professionnel</a:t>
+              <a:t>Notre </a:t>
             </a:r>
+            <a:r>
+              <a:rPr lang="fr-FR" sz="4500" b="1" u="sng" dirty="0" smtClean="0">
+                <a:effectLst>
+                  <a:outerShdw blurRad="38100" dist="38100" dir="2700000" algn="tl">
+                    <a:srgbClr val="000000">
+                      <a:alpha val="43137"/>
+                    </a:srgbClr>
+                  </a:outerShdw>
+                </a:effectLst>
+                <a:latin typeface="Noto Sans" panose="020B0502040504020204" pitchFamily="34"/>
+                <a:ea typeface="Noto Sans" panose="020B0502040504020204" pitchFamily="34"/>
+                <a:cs typeface="Noto Sans" panose="020B0502040504020204" pitchFamily="34"/>
+              </a:rPr>
+              <a:t>équipe</a:t>
+            </a:r>
+            <a:r>
+              <a:rPr lang="en-GB" sz="4500" b="1" u="sng" dirty="0" smtClean="0">
+                <a:effectLst>
+                  <a:outerShdw blurRad="38100" dist="38100" dir="2700000" algn="tl">
+                    <a:srgbClr val="000000">
+                      <a:alpha val="43137"/>
+                    </a:srgbClr>
+                  </a:outerShdw>
+                </a:effectLst>
+                <a:latin typeface="Noto Sans" panose="020B0502040504020204" pitchFamily="34"/>
+                <a:ea typeface="Noto Sans" panose="020B0502040504020204" pitchFamily="34"/>
+                <a:cs typeface="Noto Sans" panose="020B0502040504020204" pitchFamily="34"/>
+              </a:rPr>
+              <a:t> </a:t>
+            </a:r>
+            <a:r>
+              <a:rPr lang="fr-FR" sz="4500" b="1" u="sng" dirty="0" smtClean="0">
+                <a:effectLst>
+                  <a:outerShdw blurRad="38100" dist="38100" dir="2700000" algn="tl">
+                    <a:srgbClr val="000000">
+                      <a:alpha val="43137"/>
+                    </a:srgbClr>
+                  </a:outerShdw>
+                </a:effectLst>
+                <a:latin typeface="Noto Sans" panose="020B0502040504020204" pitchFamily="34"/>
+                <a:ea typeface="Noto Sans" panose="020B0502040504020204" pitchFamily="34"/>
+                <a:cs typeface="Noto Sans" panose="020B0502040504020204" pitchFamily="34"/>
+              </a:rPr>
+              <a:t>professionnelle</a:t>
+            </a:r>
+            <a:endParaRPr lang="fr-FR" sz="4500" b="1" u="sng" dirty="0">
+              <a:effectLst>
+                <a:outerShdw blurRad="38100" dist="38100" dir="2700000" algn="tl">
+                  <a:srgbClr val="000000">
+                    <a:alpha val="43137"/>
+                  </a:srgbClr>
+                </a:outerShdw>
+              </a:effectLst>
+              <a:latin typeface="Noto Sans" panose="020B0502040504020204" pitchFamily="34"/>
+              <a:ea typeface="Noto Sans" panose="020B0502040504020204" pitchFamily="34"/>
+              <a:cs typeface="Noto Sans" panose="020B0502040504020204" pitchFamily="34"/>
+            </a:endParaRPr>
           </a:p>
         </p:txBody>
       </p:sp>
@@ -3468,7 +3525,7 @@
           <p:cNvPr id="45" name="TextBox 44">
             <a:extLst>
               <a:ext uri="{FF2B5EF4-FFF2-40B4-BE49-F238E27FC236}">
-                <a16:creationId xmlns:a16="http://schemas.microsoft.com/office/drawing/2014/main" id="{B62E3419-C206-4079-9AA5-799CD00C1D70}"/>
+                <a16:creationId xmlns:a16="http://schemas.microsoft.com/office/drawing/2014/main" xmlns="" id="{B62E3419-C206-4079-9AA5-799CD00C1D70}"/>
               </a:ext>
             </a:extLst>
           </p:cNvPr>
@@ -3572,7 +3629,7 @@
           <p:cNvPr id="50" name="Rectangle 49">
             <a:extLst>
               <a:ext uri="{FF2B5EF4-FFF2-40B4-BE49-F238E27FC236}">
-                <a16:creationId xmlns:a16="http://schemas.microsoft.com/office/drawing/2014/main" id="{AB10E3E3-BD8F-40FF-8E28-66FEC53D2FE3}"/>
+                <a16:creationId xmlns:a16="http://schemas.microsoft.com/office/drawing/2014/main" xmlns="" id="{AB10E3E3-BD8F-40FF-8E28-66FEC53D2FE3}"/>
               </a:ext>
             </a:extLst>
           </p:cNvPr>
@@ -3624,7 +3681,7 @@
           <p:cNvPr id="39" name="TextBox 38">
             <a:extLst>
               <a:ext uri="{FF2B5EF4-FFF2-40B4-BE49-F238E27FC236}">
-                <a16:creationId xmlns:a16="http://schemas.microsoft.com/office/drawing/2014/main" id="{E6A26AFA-2726-49BD-9D9E-FE3183459762}"/>
+                <a16:creationId xmlns:a16="http://schemas.microsoft.com/office/drawing/2014/main" xmlns="" id="{E6A26AFA-2726-49BD-9D9E-FE3183459762}"/>
               </a:ext>
             </a:extLst>
           </p:cNvPr>
@@ -3679,7 +3736,7 @@
           <p:cNvPr id="43" name="TextBox 42">
             <a:extLst>
               <a:ext uri="{FF2B5EF4-FFF2-40B4-BE49-F238E27FC236}">
-                <a16:creationId xmlns:a16="http://schemas.microsoft.com/office/drawing/2014/main" id="{EB02B6FE-3EAD-4984-87AC-AFEC5775C921}"/>
+                <a16:creationId xmlns:a16="http://schemas.microsoft.com/office/drawing/2014/main" xmlns="" id="{EB02B6FE-3EAD-4984-87AC-AFEC5775C921}"/>
               </a:ext>
             </a:extLst>
           </p:cNvPr>
@@ -3735,7 +3792,7 @@
           <p:cNvPr id="12" name="Image 11">
             <a:extLst>
               <a:ext uri="{FF2B5EF4-FFF2-40B4-BE49-F238E27FC236}">
-                <a16:creationId xmlns:a16="http://schemas.microsoft.com/office/drawing/2014/main" id="{5AC15F94-19FE-4662-9E83-EE33AF046D1D}"/>
+                <a16:creationId xmlns:a16="http://schemas.microsoft.com/office/drawing/2014/main" xmlns="" id="{5AC15F94-19FE-4662-9E83-EE33AF046D1D}"/>
               </a:ext>
             </a:extLst>
           </p:cNvPr>
@@ -3771,7 +3828,7 @@
           <p:cNvPr id="44" name="Rectangle 43">
             <a:extLst>
               <a:ext uri="{FF2B5EF4-FFF2-40B4-BE49-F238E27FC236}">
-                <a16:creationId xmlns:a16="http://schemas.microsoft.com/office/drawing/2014/main" id="{157C2955-8572-49B1-803A-654B4314A3E8}"/>
+                <a16:creationId xmlns:a16="http://schemas.microsoft.com/office/drawing/2014/main" xmlns="" id="{157C2955-8572-49B1-803A-654B4314A3E8}"/>
               </a:ext>
             </a:extLst>
           </p:cNvPr>
@@ -3825,7 +3882,7 @@
           <p:cNvPr id="47" name="Rectangle 46">
             <a:extLst>
               <a:ext uri="{FF2B5EF4-FFF2-40B4-BE49-F238E27FC236}">
-                <a16:creationId xmlns:a16="http://schemas.microsoft.com/office/drawing/2014/main" id="{96AC1BEA-E0F5-4085-8411-A9F07501409A}"/>
+                <a16:creationId xmlns:a16="http://schemas.microsoft.com/office/drawing/2014/main" xmlns="" id="{96AC1BEA-E0F5-4085-8411-A9F07501409A}"/>
               </a:ext>
             </a:extLst>
           </p:cNvPr>
@@ -3877,7 +3934,7 @@
           <p:cNvPr id="48" name="Rectangle 47">
             <a:extLst>
               <a:ext uri="{FF2B5EF4-FFF2-40B4-BE49-F238E27FC236}">
-                <a16:creationId xmlns:a16="http://schemas.microsoft.com/office/drawing/2014/main" id="{C3358B1D-C17E-4127-8636-36FA9639BFEF}"/>
+                <a16:creationId xmlns:a16="http://schemas.microsoft.com/office/drawing/2014/main" xmlns="" id="{C3358B1D-C17E-4127-8636-36FA9639BFEF}"/>
               </a:ext>
             </a:extLst>
           </p:cNvPr>
@@ -3931,7 +3988,7 @@
           <p:cNvPr id="51" name="Rectangle 50">
             <a:extLst>
               <a:ext uri="{FF2B5EF4-FFF2-40B4-BE49-F238E27FC236}">
-                <a16:creationId xmlns:a16="http://schemas.microsoft.com/office/drawing/2014/main" id="{125AA3C8-C951-4B34-A0F7-9A43C53CBD79}"/>
+                <a16:creationId xmlns:a16="http://schemas.microsoft.com/office/drawing/2014/main" xmlns="" id="{125AA3C8-C951-4B34-A0F7-9A43C53CBD79}"/>
               </a:ext>
             </a:extLst>
           </p:cNvPr>
@@ -3983,7 +4040,7 @@
           <p:cNvPr id="52" name="TextBox 38">
             <a:extLst>
               <a:ext uri="{FF2B5EF4-FFF2-40B4-BE49-F238E27FC236}">
-                <a16:creationId xmlns:a16="http://schemas.microsoft.com/office/drawing/2014/main" id="{0FC01F2B-E9F4-48B4-B015-5D9062994DAF}"/>
+                <a16:creationId xmlns:a16="http://schemas.microsoft.com/office/drawing/2014/main" xmlns="" id="{0FC01F2B-E9F4-48B4-B015-5D9062994DAF}"/>
               </a:ext>
             </a:extLst>
           </p:cNvPr>
@@ -4010,12 +4067,30 @@
               <a:defRPr/>
             </a:pPr>
             <a:r>
-              <a:rPr lang="en-GB" sz="3400" dirty="0" err="1">
+              <a:rPr lang="en-GB" sz="3400" dirty="0" err="1" smtClean="0">
                 <a:latin typeface="Noto Sans" panose="020B0502040504020204" pitchFamily="34"/>
                 <a:ea typeface="Noto Sans" panose="020B0502040504020204" pitchFamily="34"/>
                 <a:cs typeface="Noto Sans" panose="020B0502040504020204" pitchFamily="34"/>
               </a:rPr>
               <a:t>Israe</a:t>
+            </a:r>
+            <a:endParaRPr lang="en-GB" sz="3400" dirty="0" smtClean="0">
+              <a:latin typeface="Noto Sans" panose="020B0502040504020204" pitchFamily="34"/>
+              <a:ea typeface="Noto Sans" panose="020B0502040504020204" pitchFamily="34"/>
+              <a:cs typeface="Noto Sans" panose="020B0502040504020204" pitchFamily="34"/>
+            </a:endParaRPr>
+          </a:p>
+          <a:p>
+            <a:pPr lvl="0" algn="ctr">
+              <a:defRPr/>
+            </a:pPr>
+            <a:r>
+              <a:rPr lang="en-GB" sz="3400" dirty="0" smtClean="0">
+                <a:latin typeface="Noto Sans" panose="020B0502040504020204" pitchFamily="34"/>
+                <a:ea typeface="Noto Sans" panose="020B0502040504020204" pitchFamily="34"/>
+                <a:cs typeface="Noto Sans" panose="020B0502040504020204" pitchFamily="34"/>
+              </a:rPr>
+              <a:t> </a:t>
             </a:r>
             <a:r>
               <a:rPr lang="en-GB" sz="3400" dirty="0">
@@ -4023,7 +4098,7 @@
                 <a:ea typeface="Noto Sans" panose="020B0502040504020204" pitchFamily="34"/>
                 <a:cs typeface="Noto Sans" panose="020B0502040504020204" pitchFamily="34"/>
               </a:rPr>
-              <a:t> El </a:t>
+              <a:t>El </a:t>
             </a:r>
             <a:r>
               <a:rPr lang="en-GB" sz="3400" dirty="0" err="1">
@@ -4046,7 +4121,7 @@
           <p:cNvPr id="53" name="TextBox 38">
             <a:extLst>
               <a:ext uri="{FF2B5EF4-FFF2-40B4-BE49-F238E27FC236}">
-                <a16:creationId xmlns:a16="http://schemas.microsoft.com/office/drawing/2014/main" id="{C0CCDAF6-7CFB-4C3D-91EE-8E02694CD0F1}"/>
+                <a16:creationId xmlns:a16="http://schemas.microsoft.com/office/drawing/2014/main" xmlns="" id="{C0CCDAF6-7CFB-4C3D-91EE-8E02694CD0F1}"/>
               </a:ext>
             </a:extLst>
           </p:cNvPr>
@@ -4106,7 +4181,7 @@
           <p:cNvPr id="69" name="TextBox 44">
             <a:extLst>
               <a:ext uri="{FF2B5EF4-FFF2-40B4-BE49-F238E27FC236}">
-                <a16:creationId xmlns:a16="http://schemas.microsoft.com/office/drawing/2014/main" id="{1AA1CF2E-AC70-4D32-8964-4F54E9F4242A}"/>
+                <a16:creationId xmlns:a16="http://schemas.microsoft.com/office/drawing/2014/main" xmlns="" id="{1AA1CF2E-AC70-4D32-8964-4F54E9F4242A}"/>
               </a:ext>
             </a:extLst>
           </p:cNvPr>
@@ -4210,7 +4285,7 @@
           <p:cNvPr id="70" name="TextBox 44">
             <a:extLst>
               <a:ext uri="{FF2B5EF4-FFF2-40B4-BE49-F238E27FC236}">
-                <a16:creationId xmlns:a16="http://schemas.microsoft.com/office/drawing/2014/main" id="{2F3564A3-B438-4EF4-B4F9-A11CA8E5358E}"/>
+                <a16:creationId xmlns:a16="http://schemas.microsoft.com/office/drawing/2014/main" xmlns="" id="{2F3564A3-B438-4EF4-B4F9-A11CA8E5358E}"/>
               </a:ext>
             </a:extLst>
           </p:cNvPr>
@@ -4314,7 +4389,7 @@
           <p:cNvPr id="18" name="Image 17">
             <a:extLst>
               <a:ext uri="{FF2B5EF4-FFF2-40B4-BE49-F238E27FC236}">
-                <a16:creationId xmlns:a16="http://schemas.microsoft.com/office/drawing/2014/main" id="{01139CCA-D0C2-4BF4-B434-F6AED8BBAC1D}"/>
+                <a16:creationId xmlns:a16="http://schemas.microsoft.com/office/drawing/2014/main" xmlns="" id="{01139CCA-D0C2-4BF4-B434-F6AED8BBAC1D}"/>
               </a:ext>
             </a:extLst>
           </p:cNvPr>
@@ -4350,7 +4425,7 @@
           <p:cNvPr id="20" name="Image 19">
             <a:extLst>
               <a:ext uri="{FF2B5EF4-FFF2-40B4-BE49-F238E27FC236}">
-                <a16:creationId xmlns:a16="http://schemas.microsoft.com/office/drawing/2014/main" id="{B3E404E3-A3FA-4A78-8F7C-73DA3224A585}"/>
+                <a16:creationId xmlns:a16="http://schemas.microsoft.com/office/drawing/2014/main" xmlns="" id="{B3E404E3-A3FA-4A78-8F7C-73DA3224A585}"/>
               </a:ext>
             </a:extLst>
           </p:cNvPr>
@@ -4424,7 +4499,7 @@
           <p:cNvPr id="19" name="Group 7">
             <a:extLst>
               <a:ext uri="{FF2B5EF4-FFF2-40B4-BE49-F238E27FC236}">
-                <a16:creationId xmlns:a16="http://schemas.microsoft.com/office/drawing/2014/main" id="{A8CA1BBA-D4EE-4960-A0CF-91B6947C4C82}"/>
+                <a16:creationId xmlns:a16="http://schemas.microsoft.com/office/drawing/2014/main" xmlns="" id="{A8CA1BBA-D4EE-4960-A0CF-91B6947C4C82}"/>
               </a:ext>
             </a:extLst>
           </p:cNvPr>
@@ -4444,7 +4519,7 @@
             <p:cNvPr id="21" name="Freeform 5">
               <a:extLst>
                 <a:ext uri="{FF2B5EF4-FFF2-40B4-BE49-F238E27FC236}">
-                  <a16:creationId xmlns:a16="http://schemas.microsoft.com/office/drawing/2014/main" id="{4F4518FB-53C2-46E8-BA99-5431EE289649}"/>
+                  <a16:creationId xmlns:a16="http://schemas.microsoft.com/office/drawing/2014/main" xmlns="" id="{4F4518FB-53C2-46E8-BA99-5431EE289649}"/>
                 </a:ext>
               </a:extLst>
             </p:cNvPr>
@@ -4694,7 +4769,7 @@
             <p:cNvPr id="22" name="Freeform 6">
               <a:extLst>
                 <a:ext uri="{FF2B5EF4-FFF2-40B4-BE49-F238E27FC236}">
-                  <a16:creationId xmlns:a16="http://schemas.microsoft.com/office/drawing/2014/main" id="{2E0B9DF3-5D7E-49B5-AB24-0657C5E1F096}"/>
+                  <a16:creationId xmlns:a16="http://schemas.microsoft.com/office/drawing/2014/main" xmlns="" id="{2E0B9DF3-5D7E-49B5-AB24-0657C5E1F096}"/>
                 </a:ext>
               </a:extLst>
             </p:cNvPr>
@@ -4928,7 +5003,7 @@
           <p:cNvPr id="23" name="TextBox 8">
             <a:extLst>
               <a:ext uri="{FF2B5EF4-FFF2-40B4-BE49-F238E27FC236}">
-                <a16:creationId xmlns:a16="http://schemas.microsoft.com/office/drawing/2014/main" id="{97F636DF-720F-4ADE-81F8-CB3499A32EE7}"/>
+                <a16:creationId xmlns:a16="http://schemas.microsoft.com/office/drawing/2014/main" xmlns="" id="{97F636DF-720F-4ADE-81F8-CB3499A32EE7}"/>
               </a:ext>
             </a:extLst>
           </p:cNvPr>
@@ -4989,7 +5064,7 @@
           <p:cNvPr id="24" name="Group 9">
             <a:extLst>
               <a:ext uri="{FF2B5EF4-FFF2-40B4-BE49-F238E27FC236}">
-                <a16:creationId xmlns:a16="http://schemas.microsoft.com/office/drawing/2014/main" id="{2EFDF136-8892-458E-8031-D65CE0420D67}"/>
+                <a16:creationId xmlns:a16="http://schemas.microsoft.com/office/drawing/2014/main" xmlns="" id="{2EFDF136-8892-458E-8031-D65CE0420D67}"/>
               </a:ext>
             </a:extLst>
           </p:cNvPr>
@@ -5009,7 +5084,7 @@
             <p:cNvPr id="25" name="Oval 10">
               <a:extLst>
                 <a:ext uri="{FF2B5EF4-FFF2-40B4-BE49-F238E27FC236}">
-                  <a16:creationId xmlns:a16="http://schemas.microsoft.com/office/drawing/2014/main" id="{748DE4A7-4E7A-45C9-A8A4-CA8A13DA6E35}"/>
+                  <a16:creationId xmlns:a16="http://schemas.microsoft.com/office/drawing/2014/main" xmlns="" id="{748DE4A7-4E7A-45C9-A8A4-CA8A13DA6E35}"/>
                 </a:ext>
               </a:extLst>
             </p:cNvPr>
@@ -5063,7 +5138,7 @@
             <p:cNvPr id="26" name="Freeform 17">
               <a:extLst>
                 <a:ext uri="{FF2B5EF4-FFF2-40B4-BE49-F238E27FC236}">
-                  <a16:creationId xmlns:a16="http://schemas.microsoft.com/office/drawing/2014/main" id="{B2860349-C7FB-4E60-80A8-B36F64A274DF}"/>
+                  <a16:creationId xmlns:a16="http://schemas.microsoft.com/office/drawing/2014/main" xmlns="" id="{B2860349-C7FB-4E60-80A8-B36F64A274DF}"/>
                 </a:ext>
               </a:extLst>
             </p:cNvPr>
@@ -5353,7 +5428,7 @@
           <p:cNvPr id="27" name="Group 101">
             <a:extLst>
               <a:ext uri="{FF2B5EF4-FFF2-40B4-BE49-F238E27FC236}">
-                <a16:creationId xmlns:a16="http://schemas.microsoft.com/office/drawing/2014/main" id="{EE957025-5793-4180-A0D5-FDC346B7B5E7}"/>
+                <a16:creationId xmlns:a16="http://schemas.microsoft.com/office/drawing/2014/main" xmlns="" id="{EE957025-5793-4180-A0D5-FDC346B7B5E7}"/>
               </a:ext>
             </a:extLst>
           </p:cNvPr>
@@ -5376,7 +5451,7 @@
             <p:cNvPr id="28" name="Freeform 86">
               <a:extLst>
                 <a:ext uri="{FF2B5EF4-FFF2-40B4-BE49-F238E27FC236}">
-                  <a16:creationId xmlns:a16="http://schemas.microsoft.com/office/drawing/2014/main" id="{1014A888-A34F-4BE4-9F30-A5B08AF22E18}"/>
+                  <a16:creationId xmlns:a16="http://schemas.microsoft.com/office/drawing/2014/main" xmlns="" id="{1014A888-A34F-4BE4-9F30-A5B08AF22E18}"/>
                 </a:ext>
               </a:extLst>
             </p:cNvPr>
@@ -5453,7 +5528,7 @@
             <p:cNvPr id="29" name="Freeform 89">
               <a:extLst>
                 <a:ext uri="{FF2B5EF4-FFF2-40B4-BE49-F238E27FC236}">
-                  <a16:creationId xmlns:a16="http://schemas.microsoft.com/office/drawing/2014/main" id="{0B02333B-B859-4268-A312-2557B7C3AD6E}"/>
+                  <a16:creationId xmlns:a16="http://schemas.microsoft.com/office/drawing/2014/main" xmlns="" id="{0B02333B-B859-4268-A312-2557B7C3AD6E}"/>
                 </a:ext>
               </a:extLst>
             </p:cNvPr>
@@ -5563,7 +5638,7 @@
             <p:cNvPr id="31" name="Freeform 90">
               <a:extLst>
                 <a:ext uri="{FF2B5EF4-FFF2-40B4-BE49-F238E27FC236}">
-                  <a16:creationId xmlns:a16="http://schemas.microsoft.com/office/drawing/2014/main" id="{53FD3470-C0F5-4B0F-9281-0DFB730EE6F8}"/>
+                  <a16:creationId xmlns:a16="http://schemas.microsoft.com/office/drawing/2014/main" xmlns="" id="{53FD3470-C0F5-4B0F-9281-0DFB730EE6F8}"/>
                 </a:ext>
               </a:extLst>
             </p:cNvPr>
@@ -5683,7 +5758,7 @@
             <p:cNvPr id="32" name="Freeform 91">
               <a:extLst>
                 <a:ext uri="{FF2B5EF4-FFF2-40B4-BE49-F238E27FC236}">
-                  <a16:creationId xmlns:a16="http://schemas.microsoft.com/office/drawing/2014/main" id="{FF033651-4E66-46BB-82FB-3945948A5D41}"/>
+                  <a16:creationId xmlns:a16="http://schemas.microsoft.com/office/drawing/2014/main" xmlns="" id="{FF033651-4E66-46BB-82FB-3945948A5D41}"/>
                 </a:ext>
               </a:extLst>
             </p:cNvPr>
@@ -5813,7 +5888,7 @@
             <p:cNvPr id="33" name="Freeform 92">
               <a:extLst>
                 <a:ext uri="{FF2B5EF4-FFF2-40B4-BE49-F238E27FC236}">
-                  <a16:creationId xmlns:a16="http://schemas.microsoft.com/office/drawing/2014/main" id="{0EE526DD-E09E-42A6-9347-A5DD9F05A983}"/>
+                  <a16:creationId xmlns:a16="http://schemas.microsoft.com/office/drawing/2014/main" xmlns="" id="{0EE526DD-E09E-42A6-9347-A5DD9F05A983}"/>
                 </a:ext>
               </a:extLst>
             </p:cNvPr>
@@ -5943,7 +6018,7 @@
             <p:cNvPr id="34" name="Freeform 93">
               <a:extLst>
                 <a:ext uri="{FF2B5EF4-FFF2-40B4-BE49-F238E27FC236}">
-                  <a16:creationId xmlns:a16="http://schemas.microsoft.com/office/drawing/2014/main" id="{168CC001-3BF1-4563-9CDC-FF111E717014}"/>
+                  <a16:creationId xmlns:a16="http://schemas.microsoft.com/office/drawing/2014/main" xmlns="" id="{168CC001-3BF1-4563-9CDC-FF111E717014}"/>
                 </a:ext>
               </a:extLst>
             </p:cNvPr>
@@ -6053,7 +6128,7 @@
             <p:cNvPr id="35" name="Freeform 94">
               <a:extLst>
                 <a:ext uri="{FF2B5EF4-FFF2-40B4-BE49-F238E27FC236}">
-                  <a16:creationId xmlns:a16="http://schemas.microsoft.com/office/drawing/2014/main" id="{1D4A4599-9313-45A1-B736-EB071103ABB7}"/>
+                  <a16:creationId xmlns:a16="http://schemas.microsoft.com/office/drawing/2014/main" xmlns="" id="{1D4A4599-9313-45A1-B736-EB071103ABB7}"/>
                 </a:ext>
               </a:extLst>
             </p:cNvPr>
@@ -6163,7 +6238,7 @@
             <p:cNvPr id="36" name="Freeform 95">
               <a:extLst>
                 <a:ext uri="{FF2B5EF4-FFF2-40B4-BE49-F238E27FC236}">
-                  <a16:creationId xmlns:a16="http://schemas.microsoft.com/office/drawing/2014/main" id="{FFEA66DB-4784-49CC-B1FE-848714330E08}"/>
+                  <a16:creationId xmlns:a16="http://schemas.microsoft.com/office/drawing/2014/main" xmlns="" id="{FFEA66DB-4784-49CC-B1FE-848714330E08}"/>
                 </a:ext>
               </a:extLst>
             </p:cNvPr>
@@ -6273,7 +6348,7 @@
             <p:cNvPr id="37" name="Freeform 96">
               <a:extLst>
                 <a:ext uri="{FF2B5EF4-FFF2-40B4-BE49-F238E27FC236}">
-                  <a16:creationId xmlns:a16="http://schemas.microsoft.com/office/drawing/2014/main" id="{A81FBBE6-7FD7-40D8-A3BA-16304EFE4C07}"/>
+                  <a16:creationId xmlns:a16="http://schemas.microsoft.com/office/drawing/2014/main" xmlns="" id="{A81FBBE6-7FD7-40D8-A3BA-16304EFE4C07}"/>
                 </a:ext>
               </a:extLst>
             </p:cNvPr>
@@ -6383,7 +6458,7 @@
             <p:cNvPr id="38" name="Freeform 97">
               <a:extLst>
                 <a:ext uri="{FF2B5EF4-FFF2-40B4-BE49-F238E27FC236}">
-                  <a16:creationId xmlns:a16="http://schemas.microsoft.com/office/drawing/2014/main" id="{023AF24A-6C7D-4BA5-8508-0AD88F6F514B}"/>
+                  <a16:creationId xmlns:a16="http://schemas.microsoft.com/office/drawing/2014/main" xmlns="" id="{023AF24A-6C7D-4BA5-8508-0AD88F6F514B}"/>
                 </a:ext>
               </a:extLst>
             </p:cNvPr>
@@ -6493,7 +6568,7 @@
             <p:cNvPr id="40" name="Freeform 98">
               <a:extLst>
                 <a:ext uri="{FF2B5EF4-FFF2-40B4-BE49-F238E27FC236}">
-                  <a16:creationId xmlns:a16="http://schemas.microsoft.com/office/drawing/2014/main" id="{0693E940-4A91-4079-B0A9-AAD1AE635C5B}"/>
+                  <a16:creationId xmlns:a16="http://schemas.microsoft.com/office/drawing/2014/main" xmlns="" id="{0693E940-4A91-4079-B0A9-AAD1AE635C5B}"/>
                 </a:ext>
               </a:extLst>
             </p:cNvPr>
@@ -6613,7 +6688,7 @@
             <p:cNvPr id="41" name="Freeform 99">
               <a:extLst>
                 <a:ext uri="{FF2B5EF4-FFF2-40B4-BE49-F238E27FC236}">
-                  <a16:creationId xmlns:a16="http://schemas.microsoft.com/office/drawing/2014/main" id="{1F279395-A628-4BB4-BCCE-EED71D6E02FF}"/>
+                  <a16:creationId xmlns:a16="http://schemas.microsoft.com/office/drawing/2014/main" xmlns="" id="{1F279395-A628-4BB4-BCCE-EED71D6E02FF}"/>
                 </a:ext>
               </a:extLst>
             </p:cNvPr>
@@ -6733,7 +6808,7 @@
             <p:cNvPr id="42" name="Freeform 100">
               <a:extLst>
                 <a:ext uri="{FF2B5EF4-FFF2-40B4-BE49-F238E27FC236}">
-                  <a16:creationId xmlns:a16="http://schemas.microsoft.com/office/drawing/2014/main" id="{2CE6A409-7A99-4075-A97B-C7968B32DED1}"/>
+                  <a16:creationId xmlns:a16="http://schemas.microsoft.com/office/drawing/2014/main" xmlns="" id="{2CE6A409-7A99-4075-A97B-C7968B32DED1}"/>
                 </a:ext>
               </a:extLst>
             </p:cNvPr>
@@ -6853,7 +6928,7 @@
             <p:cNvPr id="46" name="Freeform 101">
               <a:extLst>
                 <a:ext uri="{FF2B5EF4-FFF2-40B4-BE49-F238E27FC236}">
-                  <a16:creationId xmlns:a16="http://schemas.microsoft.com/office/drawing/2014/main" id="{347C51BB-EDBB-4138-A415-DF4176E1817B}"/>
+                  <a16:creationId xmlns:a16="http://schemas.microsoft.com/office/drawing/2014/main" xmlns="" id="{347C51BB-EDBB-4138-A415-DF4176E1817B}"/>
                 </a:ext>
               </a:extLst>
             </p:cNvPr>
@@ -6993,7 +7068,7 @@
             <p:cNvPr id="49" name="Freeform 102">
               <a:extLst>
                 <a:ext uri="{FF2B5EF4-FFF2-40B4-BE49-F238E27FC236}">
-                  <a16:creationId xmlns:a16="http://schemas.microsoft.com/office/drawing/2014/main" id="{F4126DDE-B3DD-43B5-8FDB-2C644540953C}"/>
+                  <a16:creationId xmlns:a16="http://schemas.microsoft.com/office/drawing/2014/main" xmlns="" id="{F4126DDE-B3DD-43B5-8FDB-2C644540953C}"/>
                 </a:ext>
               </a:extLst>
             </p:cNvPr>
@@ -7133,7 +7208,7 @@
             <p:cNvPr id="54" name="Freeform 103">
               <a:extLst>
                 <a:ext uri="{FF2B5EF4-FFF2-40B4-BE49-F238E27FC236}">
-                  <a16:creationId xmlns:a16="http://schemas.microsoft.com/office/drawing/2014/main" id="{93BBC27C-2660-4988-8C7C-6C6E234D166B}"/>
+                  <a16:creationId xmlns:a16="http://schemas.microsoft.com/office/drawing/2014/main" xmlns="" id="{93BBC27C-2660-4988-8C7C-6C6E234D166B}"/>
                 </a:ext>
               </a:extLst>
             </p:cNvPr>
@@ -7283,7 +7358,7 @@
             <p:cNvPr id="55" name="Freeform 104">
               <a:extLst>
                 <a:ext uri="{FF2B5EF4-FFF2-40B4-BE49-F238E27FC236}">
-                  <a16:creationId xmlns:a16="http://schemas.microsoft.com/office/drawing/2014/main" id="{55C19D73-C28D-40B4-A3D3-A2509A09E126}"/>
+                  <a16:creationId xmlns:a16="http://schemas.microsoft.com/office/drawing/2014/main" xmlns="" id="{55C19D73-C28D-40B4-A3D3-A2509A09E126}"/>
                 </a:ext>
               </a:extLst>
             </p:cNvPr>
@@ -7423,7 +7498,7 @@
             <p:cNvPr id="56" name="Freeform 105">
               <a:extLst>
                 <a:ext uri="{FF2B5EF4-FFF2-40B4-BE49-F238E27FC236}">
-                  <a16:creationId xmlns:a16="http://schemas.microsoft.com/office/drawing/2014/main" id="{F4A81593-0819-4307-B6EE-B9BAA8ACD118}"/>
+                  <a16:creationId xmlns:a16="http://schemas.microsoft.com/office/drawing/2014/main" xmlns="" id="{F4A81593-0819-4307-B6EE-B9BAA8ACD118}"/>
                 </a:ext>
               </a:extLst>
             </p:cNvPr>
@@ -7533,7 +7608,7 @@
             <p:cNvPr id="57" name="Freeform 106">
               <a:extLst>
                 <a:ext uri="{FF2B5EF4-FFF2-40B4-BE49-F238E27FC236}">
-                  <a16:creationId xmlns:a16="http://schemas.microsoft.com/office/drawing/2014/main" id="{D57F6835-E3FA-419B-AAB0-66F48B4B5B5C}"/>
+                  <a16:creationId xmlns:a16="http://schemas.microsoft.com/office/drawing/2014/main" xmlns="" id="{D57F6835-E3FA-419B-AAB0-66F48B4B5B5C}"/>
                 </a:ext>
               </a:extLst>
             </p:cNvPr>
@@ -7653,7 +7728,7 @@
             <p:cNvPr id="58" name="Freeform 107">
               <a:extLst>
                 <a:ext uri="{FF2B5EF4-FFF2-40B4-BE49-F238E27FC236}">
-                  <a16:creationId xmlns:a16="http://schemas.microsoft.com/office/drawing/2014/main" id="{7CC5A20C-E688-41F8-AE56-2DE53373B720}"/>
+                  <a16:creationId xmlns:a16="http://schemas.microsoft.com/office/drawing/2014/main" xmlns="" id="{7CC5A20C-E688-41F8-AE56-2DE53373B720}"/>
                 </a:ext>
               </a:extLst>
             </p:cNvPr>
@@ -7813,7 +7888,7 @@
             <p:cNvPr id="59" name="Freeform 108">
               <a:extLst>
                 <a:ext uri="{FF2B5EF4-FFF2-40B4-BE49-F238E27FC236}">
-                  <a16:creationId xmlns:a16="http://schemas.microsoft.com/office/drawing/2014/main" id="{8324E23B-55A4-4591-B669-84ED6BE45BC3}"/>
+                  <a16:creationId xmlns:a16="http://schemas.microsoft.com/office/drawing/2014/main" xmlns="" id="{8324E23B-55A4-4591-B669-84ED6BE45BC3}"/>
                 </a:ext>
               </a:extLst>
             </p:cNvPr>
@@ -7943,7 +8018,7 @@
             <p:cNvPr id="60" name="Freeform 109">
               <a:extLst>
                 <a:ext uri="{FF2B5EF4-FFF2-40B4-BE49-F238E27FC236}">
-                  <a16:creationId xmlns:a16="http://schemas.microsoft.com/office/drawing/2014/main" id="{FB43A737-2455-4C12-9F8C-3EE6C5BACBF4}"/>
+                  <a16:creationId xmlns:a16="http://schemas.microsoft.com/office/drawing/2014/main" xmlns="" id="{FB43A737-2455-4C12-9F8C-3EE6C5BACBF4}"/>
                 </a:ext>
               </a:extLst>
             </p:cNvPr>
@@ -8073,7 +8148,7 @@
             <p:cNvPr id="62" name="Freeform 110">
               <a:extLst>
                 <a:ext uri="{FF2B5EF4-FFF2-40B4-BE49-F238E27FC236}">
-                  <a16:creationId xmlns:a16="http://schemas.microsoft.com/office/drawing/2014/main" id="{D5F8FC95-28A5-4A3E-9761-DB680AD3AC94}"/>
+                  <a16:creationId xmlns:a16="http://schemas.microsoft.com/office/drawing/2014/main" xmlns="" id="{D5F8FC95-28A5-4A3E-9761-DB680AD3AC94}"/>
                 </a:ext>
               </a:extLst>
             </p:cNvPr>
@@ -8203,7 +8278,7 @@
             <p:cNvPr id="63" name="Freeform 111">
               <a:extLst>
                 <a:ext uri="{FF2B5EF4-FFF2-40B4-BE49-F238E27FC236}">
-                  <a16:creationId xmlns:a16="http://schemas.microsoft.com/office/drawing/2014/main" id="{ABE48A73-3AA2-41B9-940F-32262CBD5EEC}"/>
+                  <a16:creationId xmlns:a16="http://schemas.microsoft.com/office/drawing/2014/main" xmlns="" id="{ABE48A73-3AA2-41B9-940F-32262CBD5EEC}"/>
                 </a:ext>
               </a:extLst>
             </p:cNvPr>
@@ -8343,7 +8418,7 @@
             <p:cNvPr id="64" name="Freeform 112">
               <a:extLst>
                 <a:ext uri="{FF2B5EF4-FFF2-40B4-BE49-F238E27FC236}">
-                  <a16:creationId xmlns:a16="http://schemas.microsoft.com/office/drawing/2014/main" id="{E0AD8E58-FFA1-41F1-AC36-8E9FA8545FDE}"/>
+                  <a16:creationId xmlns:a16="http://schemas.microsoft.com/office/drawing/2014/main" xmlns="" id="{E0AD8E58-FFA1-41F1-AC36-8E9FA8545FDE}"/>
                 </a:ext>
               </a:extLst>
             </p:cNvPr>
@@ -8463,7 +8538,7 @@
             <p:cNvPr id="65" name="Freeform 113">
               <a:extLst>
                 <a:ext uri="{FF2B5EF4-FFF2-40B4-BE49-F238E27FC236}">
-                  <a16:creationId xmlns:a16="http://schemas.microsoft.com/office/drawing/2014/main" id="{A553EC02-8A22-4110-9E7E-408CDF5BE347}"/>
+                  <a16:creationId xmlns:a16="http://schemas.microsoft.com/office/drawing/2014/main" xmlns="" id="{A553EC02-8A22-4110-9E7E-408CDF5BE347}"/>
                 </a:ext>
               </a:extLst>
             </p:cNvPr>
@@ -8583,7 +8658,7 @@
             <p:cNvPr id="66" name="Freeform 114">
               <a:extLst>
                 <a:ext uri="{FF2B5EF4-FFF2-40B4-BE49-F238E27FC236}">
-                  <a16:creationId xmlns:a16="http://schemas.microsoft.com/office/drawing/2014/main" id="{DC49EA7D-8ADA-4603-9C76-42BAAB24FECC}"/>
+                  <a16:creationId xmlns:a16="http://schemas.microsoft.com/office/drawing/2014/main" xmlns="" id="{DC49EA7D-8ADA-4603-9C76-42BAAB24FECC}"/>
                 </a:ext>
               </a:extLst>
             </p:cNvPr>
@@ -8713,7 +8788,7 @@
             <p:cNvPr id="67" name="Freeform 115">
               <a:extLst>
                 <a:ext uri="{FF2B5EF4-FFF2-40B4-BE49-F238E27FC236}">
-                  <a16:creationId xmlns:a16="http://schemas.microsoft.com/office/drawing/2014/main" id="{44263ABD-0F93-44BF-B756-DEFF6236211B}"/>
+                  <a16:creationId xmlns:a16="http://schemas.microsoft.com/office/drawing/2014/main" xmlns="" id="{44263ABD-0F93-44BF-B756-DEFF6236211B}"/>
                 </a:ext>
               </a:extLst>
             </p:cNvPr>
@@ -8833,7 +8908,7 @@
             <p:cNvPr id="68" name="Freeform 116">
               <a:extLst>
                 <a:ext uri="{FF2B5EF4-FFF2-40B4-BE49-F238E27FC236}">
-                  <a16:creationId xmlns:a16="http://schemas.microsoft.com/office/drawing/2014/main" id="{7BCCA957-4790-4066-8800-16EE1191041B}"/>
+                  <a16:creationId xmlns:a16="http://schemas.microsoft.com/office/drawing/2014/main" xmlns="" id="{7BCCA957-4790-4066-8800-16EE1191041B}"/>
                 </a:ext>
               </a:extLst>
             </p:cNvPr>
@@ -8983,7 +9058,7 @@
             <p:cNvPr id="71" name="Freeform 117">
               <a:extLst>
                 <a:ext uri="{FF2B5EF4-FFF2-40B4-BE49-F238E27FC236}">
-                  <a16:creationId xmlns:a16="http://schemas.microsoft.com/office/drawing/2014/main" id="{ED050DF1-0364-462A-8B85-763AE83DEAB4}"/>
+                  <a16:creationId xmlns:a16="http://schemas.microsoft.com/office/drawing/2014/main" xmlns="" id="{ED050DF1-0364-462A-8B85-763AE83DEAB4}"/>
                 </a:ext>
               </a:extLst>
             </p:cNvPr>
@@ -9103,7 +9178,7 @@
             <p:cNvPr id="72" name="Freeform 118">
               <a:extLst>
                 <a:ext uri="{FF2B5EF4-FFF2-40B4-BE49-F238E27FC236}">
-                  <a16:creationId xmlns:a16="http://schemas.microsoft.com/office/drawing/2014/main" id="{CD0FBBEB-1AC2-4100-85E7-05A6FFD56B57}"/>
+                  <a16:creationId xmlns:a16="http://schemas.microsoft.com/office/drawing/2014/main" xmlns="" id="{CD0FBBEB-1AC2-4100-85E7-05A6FFD56B57}"/>
                 </a:ext>
               </a:extLst>
             </p:cNvPr>
@@ -9233,7 +9308,7 @@
             <p:cNvPr id="73" name="Freeform 119">
               <a:extLst>
                 <a:ext uri="{FF2B5EF4-FFF2-40B4-BE49-F238E27FC236}">
-                  <a16:creationId xmlns:a16="http://schemas.microsoft.com/office/drawing/2014/main" id="{BBEF1E71-B73C-4A46-BBE6-648D71FB51AD}"/>
+                  <a16:creationId xmlns:a16="http://schemas.microsoft.com/office/drawing/2014/main" xmlns="" id="{BBEF1E71-B73C-4A46-BBE6-648D71FB51AD}"/>
                 </a:ext>
               </a:extLst>
             </p:cNvPr>
@@ -9353,7 +9428,7 @@
             <p:cNvPr id="74" name="Freeform 120">
               <a:extLst>
                 <a:ext uri="{FF2B5EF4-FFF2-40B4-BE49-F238E27FC236}">
-                  <a16:creationId xmlns:a16="http://schemas.microsoft.com/office/drawing/2014/main" id="{751C8DC8-DF25-4CB5-9535-AAAA75EADBF1}"/>
+                  <a16:creationId xmlns:a16="http://schemas.microsoft.com/office/drawing/2014/main" xmlns="" id="{751C8DC8-DF25-4CB5-9535-AAAA75EADBF1}"/>
                 </a:ext>
               </a:extLst>
             </p:cNvPr>
@@ -9483,7 +9558,7 @@
             <p:cNvPr id="75" name="Freeform 121">
               <a:extLst>
                 <a:ext uri="{FF2B5EF4-FFF2-40B4-BE49-F238E27FC236}">
-                  <a16:creationId xmlns:a16="http://schemas.microsoft.com/office/drawing/2014/main" id="{D5429EC3-EBF8-4A3E-9767-66FFC11D33B9}"/>
+                  <a16:creationId xmlns:a16="http://schemas.microsoft.com/office/drawing/2014/main" xmlns="" id="{D5429EC3-EBF8-4A3E-9767-66FFC11D33B9}"/>
                 </a:ext>
               </a:extLst>
             </p:cNvPr>
@@ -9593,7 +9668,7 @@
             <p:cNvPr id="76" name="Freeform 122">
               <a:extLst>
                 <a:ext uri="{FF2B5EF4-FFF2-40B4-BE49-F238E27FC236}">
-                  <a16:creationId xmlns:a16="http://schemas.microsoft.com/office/drawing/2014/main" id="{3A794D46-6843-48D6-BE98-8CE950180F74}"/>
+                  <a16:creationId xmlns:a16="http://schemas.microsoft.com/office/drawing/2014/main" xmlns="" id="{3A794D46-6843-48D6-BE98-8CE950180F74}"/>
                 </a:ext>
               </a:extLst>
             </p:cNvPr>
@@ -9693,7 +9768,7 @@
             <p:cNvPr id="77" name="Freeform 123">
               <a:extLst>
                 <a:ext uri="{FF2B5EF4-FFF2-40B4-BE49-F238E27FC236}">
-                  <a16:creationId xmlns:a16="http://schemas.microsoft.com/office/drawing/2014/main" id="{52C26188-48F4-48F3-840F-7D9543F460AA}"/>
+                  <a16:creationId xmlns:a16="http://schemas.microsoft.com/office/drawing/2014/main" xmlns="" id="{52C26188-48F4-48F3-840F-7D9543F460AA}"/>
                 </a:ext>
               </a:extLst>
             </p:cNvPr>
@@ -9813,7 +9888,7 @@
             <p:cNvPr id="78" name="Freeform 124">
               <a:extLst>
                 <a:ext uri="{FF2B5EF4-FFF2-40B4-BE49-F238E27FC236}">
-                  <a16:creationId xmlns:a16="http://schemas.microsoft.com/office/drawing/2014/main" id="{D651C23A-FCB3-4C36-9147-7FB9CC2BC3FD}"/>
+                  <a16:creationId xmlns:a16="http://schemas.microsoft.com/office/drawing/2014/main" xmlns="" id="{D651C23A-FCB3-4C36-9147-7FB9CC2BC3FD}"/>
                 </a:ext>
               </a:extLst>
             </p:cNvPr>
@@ -9903,7 +9978,7 @@
             <p:cNvPr id="79" name="Freeform 125">
               <a:extLst>
                 <a:ext uri="{FF2B5EF4-FFF2-40B4-BE49-F238E27FC236}">
-                  <a16:creationId xmlns:a16="http://schemas.microsoft.com/office/drawing/2014/main" id="{D8C4FD72-B666-4865-8383-F0F2075E7484}"/>
+                  <a16:creationId xmlns:a16="http://schemas.microsoft.com/office/drawing/2014/main" xmlns="" id="{D8C4FD72-B666-4865-8383-F0F2075E7484}"/>
                 </a:ext>
               </a:extLst>
             </p:cNvPr>
@@ -10023,7 +10098,7 @@
             <p:cNvPr id="80" name="Freeform 126">
               <a:extLst>
                 <a:ext uri="{FF2B5EF4-FFF2-40B4-BE49-F238E27FC236}">
-                  <a16:creationId xmlns:a16="http://schemas.microsoft.com/office/drawing/2014/main" id="{D97961DE-8297-48EE-92F0-12C59E7BEFC5}"/>
+                  <a16:creationId xmlns:a16="http://schemas.microsoft.com/office/drawing/2014/main" xmlns="" id="{D97961DE-8297-48EE-92F0-12C59E7BEFC5}"/>
                 </a:ext>
               </a:extLst>
             </p:cNvPr>
@@ -10123,7 +10198,7 @@
             <p:cNvPr id="81" name="Freeform 127">
               <a:extLst>
                 <a:ext uri="{FF2B5EF4-FFF2-40B4-BE49-F238E27FC236}">
-                  <a16:creationId xmlns:a16="http://schemas.microsoft.com/office/drawing/2014/main" id="{A224CCBB-1EC7-4A86-BDD5-17270ED0D1BF}"/>
+                  <a16:creationId xmlns:a16="http://schemas.microsoft.com/office/drawing/2014/main" xmlns="" id="{A224CCBB-1EC7-4A86-BDD5-17270ED0D1BF}"/>
                 </a:ext>
               </a:extLst>
             </p:cNvPr>
@@ -10233,7 +10308,7 @@
             <p:cNvPr id="82" name="Freeform 128">
               <a:extLst>
                 <a:ext uri="{FF2B5EF4-FFF2-40B4-BE49-F238E27FC236}">
-                  <a16:creationId xmlns:a16="http://schemas.microsoft.com/office/drawing/2014/main" id="{9BA0344A-FED7-4BB7-85D5-CEA80578378F}"/>
+                  <a16:creationId xmlns:a16="http://schemas.microsoft.com/office/drawing/2014/main" xmlns="" id="{9BA0344A-FED7-4BB7-85D5-CEA80578378F}"/>
                 </a:ext>
               </a:extLst>
             </p:cNvPr>
@@ -10333,7 +10408,7 @@
             <p:cNvPr id="83" name="Freeform 129">
               <a:extLst>
                 <a:ext uri="{FF2B5EF4-FFF2-40B4-BE49-F238E27FC236}">
-                  <a16:creationId xmlns:a16="http://schemas.microsoft.com/office/drawing/2014/main" id="{936E12A9-9876-4622-97B4-96170DF69152}"/>
+                  <a16:creationId xmlns:a16="http://schemas.microsoft.com/office/drawing/2014/main" xmlns="" id="{936E12A9-9876-4622-97B4-96170DF69152}"/>
                 </a:ext>
               </a:extLst>
             </p:cNvPr>
@@ -10453,7 +10528,7 @@
             <p:cNvPr id="84" name="Freeform 130">
               <a:extLst>
                 <a:ext uri="{FF2B5EF4-FFF2-40B4-BE49-F238E27FC236}">
-                  <a16:creationId xmlns:a16="http://schemas.microsoft.com/office/drawing/2014/main" id="{B02A79D2-0354-4F7C-A323-5B85AE93D574}"/>
+                  <a16:creationId xmlns:a16="http://schemas.microsoft.com/office/drawing/2014/main" xmlns="" id="{B02A79D2-0354-4F7C-A323-5B85AE93D574}"/>
                 </a:ext>
               </a:extLst>
             </p:cNvPr>
@@ -10563,7 +10638,7 @@
             <p:cNvPr id="85" name="Freeform 131">
               <a:extLst>
                 <a:ext uri="{FF2B5EF4-FFF2-40B4-BE49-F238E27FC236}">
-                  <a16:creationId xmlns:a16="http://schemas.microsoft.com/office/drawing/2014/main" id="{510B9F98-1EF2-4F98-98CB-FA5957768292}"/>
+                  <a16:creationId xmlns:a16="http://schemas.microsoft.com/office/drawing/2014/main" xmlns="" id="{510B9F98-1EF2-4F98-98CB-FA5957768292}"/>
                 </a:ext>
               </a:extLst>
             </p:cNvPr>
@@ -10683,7 +10758,7 @@
             <p:cNvPr id="86" name="Freeform 132">
               <a:extLst>
                 <a:ext uri="{FF2B5EF4-FFF2-40B4-BE49-F238E27FC236}">
-                  <a16:creationId xmlns:a16="http://schemas.microsoft.com/office/drawing/2014/main" id="{C5C9754B-7D4B-4519-8A3B-9604A305A693}"/>
+                  <a16:creationId xmlns:a16="http://schemas.microsoft.com/office/drawing/2014/main" xmlns="" id="{C5C9754B-7D4B-4519-8A3B-9604A305A693}"/>
                 </a:ext>
               </a:extLst>
             </p:cNvPr>
@@ -10803,7 +10878,7 @@
             <p:cNvPr id="87" name="Freeform 133">
               <a:extLst>
                 <a:ext uri="{FF2B5EF4-FFF2-40B4-BE49-F238E27FC236}">
-                  <a16:creationId xmlns:a16="http://schemas.microsoft.com/office/drawing/2014/main" id="{34AADA35-C85B-4268-B154-55E0C58CE458}"/>
+                  <a16:creationId xmlns:a16="http://schemas.microsoft.com/office/drawing/2014/main" xmlns="" id="{34AADA35-C85B-4268-B154-55E0C58CE458}"/>
                 </a:ext>
               </a:extLst>
             </p:cNvPr>
@@ -10923,7 +10998,7 @@
             <p:cNvPr id="88" name="Freeform 134">
               <a:extLst>
                 <a:ext uri="{FF2B5EF4-FFF2-40B4-BE49-F238E27FC236}">
-                  <a16:creationId xmlns:a16="http://schemas.microsoft.com/office/drawing/2014/main" id="{EE21FA1D-61EC-41DD-BA2D-47382C01AC80}"/>
+                  <a16:creationId xmlns:a16="http://schemas.microsoft.com/office/drawing/2014/main" xmlns="" id="{EE21FA1D-61EC-41DD-BA2D-47382C01AC80}"/>
                 </a:ext>
               </a:extLst>
             </p:cNvPr>
@@ -11053,7 +11128,7 @@
             <p:cNvPr id="89" name="Freeform 135">
               <a:extLst>
                 <a:ext uri="{FF2B5EF4-FFF2-40B4-BE49-F238E27FC236}">
-                  <a16:creationId xmlns:a16="http://schemas.microsoft.com/office/drawing/2014/main" id="{3B33D6B0-D0F1-4C40-8147-9D8BCEF5D632}"/>
+                  <a16:creationId xmlns:a16="http://schemas.microsoft.com/office/drawing/2014/main" xmlns="" id="{3B33D6B0-D0F1-4C40-8147-9D8BCEF5D632}"/>
                 </a:ext>
               </a:extLst>
             </p:cNvPr>
@@ -11143,7 +11218,7 @@
             <p:cNvPr id="90" name="Freeform 136">
               <a:extLst>
                 <a:ext uri="{FF2B5EF4-FFF2-40B4-BE49-F238E27FC236}">
-                  <a16:creationId xmlns:a16="http://schemas.microsoft.com/office/drawing/2014/main" id="{D0E7EF76-7CE1-4F4D-B027-CF56D2E954F5}"/>
+                  <a16:creationId xmlns:a16="http://schemas.microsoft.com/office/drawing/2014/main" xmlns="" id="{D0E7EF76-7CE1-4F4D-B027-CF56D2E954F5}"/>
                 </a:ext>
               </a:extLst>
             </p:cNvPr>
@@ -11263,7 +11338,7 @@
             <p:cNvPr id="91" name="Freeform 137">
               <a:extLst>
                 <a:ext uri="{FF2B5EF4-FFF2-40B4-BE49-F238E27FC236}">
-                  <a16:creationId xmlns:a16="http://schemas.microsoft.com/office/drawing/2014/main" id="{B293D49D-180D-4423-BDF3-03C7F7673DD5}"/>
+                  <a16:creationId xmlns:a16="http://schemas.microsoft.com/office/drawing/2014/main" xmlns="" id="{B293D49D-180D-4423-BDF3-03C7F7673DD5}"/>
                 </a:ext>
               </a:extLst>
             </p:cNvPr>
@@ -11373,7 +11448,7 @@
             <p:cNvPr id="92" name="Freeform 138">
               <a:extLst>
                 <a:ext uri="{FF2B5EF4-FFF2-40B4-BE49-F238E27FC236}">
-                  <a16:creationId xmlns:a16="http://schemas.microsoft.com/office/drawing/2014/main" id="{63330285-1A3F-46C5-844A-F8F59F790B23}"/>
+                  <a16:creationId xmlns:a16="http://schemas.microsoft.com/office/drawing/2014/main" xmlns="" id="{63330285-1A3F-46C5-844A-F8F59F790B23}"/>
                 </a:ext>
               </a:extLst>
             </p:cNvPr>
@@ -11503,7 +11578,7 @@
             <p:cNvPr id="93" name="Freeform 139">
               <a:extLst>
                 <a:ext uri="{FF2B5EF4-FFF2-40B4-BE49-F238E27FC236}">
-                  <a16:creationId xmlns:a16="http://schemas.microsoft.com/office/drawing/2014/main" id="{98FE8B0C-E8B5-4E12-A934-EB3AF26EAB8A}"/>
+                  <a16:creationId xmlns:a16="http://schemas.microsoft.com/office/drawing/2014/main" xmlns="" id="{98FE8B0C-E8B5-4E12-A934-EB3AF26EAB8A}"/>
                 </a:ext>
               </a:extLst>
             </p:cNvPr>
@@ -11623,7 +11698,7 @@
             <p:cNvPr id="94" name="Freeform 140">
               <a:extLst>
                 <a:ext uri="{FF2B5EF4-FFF2-40B4-BE49-F238E27FC236}">
-                  <a16:creationId xmlns:a16="http://schemas.microsoft.com/office/drawing/2014/main" id="{1AB2AA65-0172-46C7-A1EE-B18EE215686E}"/>
+                  <a16:creationId xmlns:a16="http://schemas.microsoft.com/office/drawing/2014/main" xmlns="" id="{1AB2AA65-0172-46C7-A1EE-B18EE215686E}"/>
                 </a:ext>
               </a:extLst>
             </p:cNvPr>
@@ -11713,7 +11788,7 @@
             <p:cNvPr id="95" name="Freeform 141">
               <a:extLst>
                 <a:ext uri="{FF2B5EF4-FFF2-40B4-BE49-F238E27FC236}">
-                  <a16:creationId xmlns:a16="http://schemas.microsoft.com/office/drawing/2014/main" id="{912631C7-A49D-4A51-946F-5482498A79C3}"/>
+                  <a16:creationId xmlns:a16="http://schemas.microsoft.com/office/drawing/2014/main" xmlns="" id="{912631C7-A49D-4A51-946F-5482498A79C3}"/>
                 </a:ext>
               </a:extLst>
             </p:cNvPr>
@@ -11833,7 +11908,7 @@
             <p:cNvPr id="96" name="Freeform 142">
               <a:extLst>
                 <a:ext uri="{FF2B5EF4-FFF2-40B4-BE49-F238E27FC236}">
-                  <a16:creationId xmlns:a16="http://schemas.microsoft.com/office/drawing/2014/main" id="{742D2994-F08B-4A34-A7DD-8B19346DBDF1}"/>
+                  <a16:creationId xmlns:a16="http://schemas.microsoft.com/office/drawing/2014/main" xmlns="" id="{742D2994-F08B-4A34-A7DD-8B19346DBDF1}"/>
                 </a:ext>
               </a:extLst>
             </p:cNvPr>
@@ -11933,7 +12008,7 @@
             <p:cNvPr id="97" name="Freeform 143">
               <a:extLst>
                 <a:ext uri="{FF2B5EF4-FFF2-40B4-BE49-F238E27FC236}">
-                  <a16:creationId xmlns:a16="http://schemas.microsoft.com/office/drawing/2014/main" id="{98BA4D7C-8439-439D-9375-98BB2DE6FC66}"/>
+                  <a16:creationId xmlns:a16="http://schemas.microsoft.com/office/drawing/2014/main" xmlns="" id="{98BA4D7C-8439-439D-9375-98BB2DE6FC66}"/>
                 </a:ext>
               </a:extLst>
             </p:cNvPr>
@@ -12044,7 +12119,7 @@
           <p:cNvPr id="98" name="Group 158">
             <a:extLst>
               <a:ext uri="{FF2B5EF4-FFF2-40B4-BE49-F238E27FC236}">
-                <a16:creationId xmlns:a16="http://schemas.microsoft.com/office/drawing/2014/main" id="{66315D9D-B690-4EF9-8CA2-39C549696F02}"/>
+                <a16:creationId xmlns:a16="http://schemas.microsoft.com/office/drawing/2014/main" xmlns="" id="{66315D9D-B690-4EF9-8CA2-39C549696F02}"/>
               </a:ext>
             </a:extLst>
           </p:cNvPr>
@@ -12064,7 +12139,7 @@
             <p:cNvPr id="99" name="Oval 159">
               <a:extLst>
                 <a:ext uri="{FF2B5EF4-FFF2-40B4-BE49-F238E27FC236}">
-                  <a16:creationId xmlns:a16="http://schemas.microsoft.com/office/drawing/2014/main" id="{E2687D36-2A87-4A62-8FEF-CF0B99BE9915}"/>
+                  <a16:creationId xmlns:a16="http://schemas.microsoft.com/office/drawing/2014/main" xmlns="" id="{E2687D36-2A87-4A62-8FEF-CF0B99BE9915}"/>
                 </a:ext>
               </a:extLst>
             </p:cNvPr>
@@ -12118,7 +12193,7 @@
             <p:cNvPr id="100" name="Freeform 17">
               <a:extLst>
                 <a:ext uri="{FF2B5EF4-FFF2-40B4-BE49-F238E27FC236}">
-                  <a16:creationId xmlns:a16="http://schemas.microsoft.com/office/drawing/2014/main" id="{7D889303-3765-4431-BC2A-50A2CA4C91FF}"/>
+                  <a16:creationId xmlns:a16="http://schemas.microsoft.com/office/drawing/2014/main" xmlns="" id="{7D889303-3765-4431-BC2A-50A2CA4C91FF}"/>
                 </a:ext>
               </a:extLst>
             </p:cNvPr>
@@ -12408,7 +12483,7 @@
           <p:cNvPr id="101" name="Group 161">
             <a:extLst>
               <a:ext uri="{FF2B5EF4-FFF2-40B4-BE49-F238E27FC236}">
-                <a16:creationId xmlns:a16="http://schemas.microsoft.com/office/drawing/2014/main" id="{928E6091-6B98-4F08-8671-2F0036D6D783}"/>
+                <a16:creationId xmlns:a16="http://schemas.microsoft.com/office/drawing/2014/main" xmlns="" id="{928E6091-6B98-4F08-8671-2F0036D6D783}"/>
               </a:ext>
             </a:extLst>
           </p:cNvPr>
@@ -12428,7 +12503,7 @@
             <p:cNvPr id="102" name="Oval 162">
               <a:extLst>
                 <a:ext uri="{FF2B5EF4-FFF2-40B4-BE49-F238E27FC236}">
-                  <a16:creationId xmlns:a16="http://schemas.microsoft.com/office/drawing/2014/main" id="{C3220A7B-10A2-4DBF-9A4A-1FD1009193A5}"/>
+                  <a16:creationId xmlns:a16="http://schemas.microsoft.com/office/drawing/2014/main" xmlns="" id="{C3220A7B-10A2-4DBF-9A4A-1FD1009193A5}"/>
                 </a:ext>
               </a:extLst>
             </p:cNvPr>
@@ -12482,7 +12557,7 @@
             <p:cNvPr id="103" name="Freeform 17">
               <a:extLst>
                 <a:ext uri="{FF2B5EF4-FFF2-40B4-BE49-F238E27FC236}">
-                  <a16:creationId xmlns:a16="http://schemas.microsoft.com/office/drawing/2014/main" id="{E79C8EEC-139D-4D53-850A-F073C56C95D1}"/>
+                  <a16:creationId xmlns:a16="http://schemas.microsoft.com/office/drawing/2014/main" xmlns="" id="{E79C8EEC-139D-4D53-850A-F073C56C95D1}"/>
                 </a:ext>
               </a:extLst>
             </p:cNvPr>
@@ -12772,7 +12847,7 @@
           <p:cNvPr id="104" name="Group 164">
             <a:extLst>
               <a:ext uri="{FF2B5EF4-FFF2-40B4-BE49-F238E27FC236}">
-                <a16:creationId xmlns:a16="http://schemas.microsoft.com/office/drawing/2014/main" id="{8A0BDD0D-CF18-4032-9B00-58741EDBA33E}"/>
+                <a16:creationId xmlns:a16="http://schemas.microsoft.com/office/drawing/2014/main" xmlns="" id="{8A0BDD0D-CF18-4032-9B00-58741EDBA33E}"/>
               </a:ext>
             </a:extLst>
           </p:cNvPr>
@@ -12792,7 +12867,7 @@
             <p:cNvPr id="105" name="Oval 165">
               <a:extLst>
                 <a:ext uri="{FF2B5EF4-FFF2-40B4-BE49-F238E27FC236}">
-                  <a16:creationId xmlns:a16="http://schemas.microsoft.com/office/drawing/2014/main" id="{40B61497-7D40-486F-86E7-F7FC8A24CE23}"/>
+                  <a16:creationId xmlns:a16="http://schemas.microsoft.com/office/drawing/2014/main" xmlns="" id="{40B61497-7D40-486F-86E7-F7FC8A24CE23}"/>
                 </a:ext>
               </a:extLst>
             </p:cNvPr>
@@ -12846,7 +12921,7 @@
             <p:cNvPr id="106" name="Freeform 17">
               <a:extLst>
                 <a:ext uri="{FF2B5EF4-FFF2-40B4-BE49-F238E27FC236}">
-                  <a16:creationId xmlns:a16="http://schemas.microsoft.com/office/drawing/2014/main" id="{90AC111C-B9B6-4B0E-842A-7A48F4D940C9}"/>
+                  <a16:creationId xmlns:a16="http://schemas.microsoft.com/office/drawing/2014/main" xmlns="" id="{90AC111C-B9B6-4B0E-842A-7A48F4D940C9}"/>
                 </a:ext>
               </a:extLst>
             </p:cNvPr>
@@ -13136,7 +13211,7 @@
           <p:cNvPr id="107" name="TextBox 167">
             <a:extLst>
               <a:ext uri="{FF2B5EF4-FFF2-40B4-BE49-F238E27FC236}">
-                <a16:creationId xmlns:a16="http://schemas.microsoft.com/office/drawing/2014/main" id="{34110AAC-39D2-4F09-AC83-0DE4D10C7370}"/>
+                <a16:creationId xmlns:a16="http://schemas.microsoft.com/office/drawing/2014/main" xmlns="" id="{34110AAC-39D2-4F09-AC83-0DE4D10C7370}"/>
               </a:ext>
             </a:extLst>
           </p:cNvPr>
@@ -13183,7 +13258,7 @@
           <p:cNvPr id="108" name="TextBox 168">
             <a:extLst>
               <a:ext uri="{FF2B5EF4-FFF2-40B4-BE49-F238E27FC236}">
-                <a16:creationId xmlns:a16="http://schemas.microsoft.com/office/drawing/2014/main" id="{E1B7DB9C-0174-40A4-ACA2-B1332E16D283}"/>
+                <a16:creationId xmlns:a16="http://schemas.microsoft.com/office/drawing/2014/main" xmlns="" id="{E1B7DB9C-0174-40A4-ACA2-B1332E16D283}"/>
               </a:ext>
             </a:extLst>
           </p:cNvPr>
@@ -13230,7 +13305,7 @@
           <p:cNvPr id="109" name="TextBox 169">
             <a:extLst>
               <a:ext uri="{FF2B5EF4-FFF2-40B4-BE49-F238E27FC236}">
-                <a16:creationId xmlns:a16="http://schemas.microsoft.com/office/drawing/2014/main" id="{F4E65BD8-77D1-43BE-8AEA-3B4FE145B178}"/>
+                <a16:creationId xmlns:a16="http://schemas.microsoft.com/office/drawing/2014/main" xmlns="" id="{F4E65BD8-77D1-43BE-8AEA-3B4FE145B178}"/>
               </a:ext>
             </a:extLst>
           </p:cNvPr>
@@ -13277,7 +13352,7 @@
           <p:cNvPr id="110" name="TextBox 170">
             <a:extLst>
               <a:ext uri="{FF2B5EF4-FFF2-40B4-BE49-F238E27FC236}">
-                <a16:creationId xmlns:a16="http://schemas.microsoft.com/office/drawing/2014/main" id="{AC5BA384-64F6-4B98-BE17-F4AAB2341F02}"/>
+                <a16:creationId xmlns:a16="http://schemas.microsoft.com/office/drawing/2014/main" xmlns="" id="{AC5BA384-64F6-4B98-BE17-F4AAB2341F02}"/>
               </a:ext>
             </a:extLst>
           </p:cNvPr>
@@ -13324,7 +13399,7 @@
           <p:cNvPr id="111" name="TextBox 171">
             <a:extLst>
               <a:ext uri="{FF2B5EF4-FFF2-40B4-BE49-F238E27FC236}">
-                <a16:creationId xmlns:a16="http://schemas.microsoft.com/office/drawing/2014/main" id="{2BCD75E3-81E0-4888-9627-3057DD2A5489}"/>
+                <a16:creationId xmlns:a16="http://schemas.microsoft.com/office/drawing/2014/main" xmlns="" id="{2BCD75E3-81E0-4888-9627-3057DD2A5489}"/>
               </a:ext>
             </a:extLst>
           </p:cNvPr>
@@ -13376,7 +13451,21 @@
                 <a:ea typeface="Noto Sans" panose="020B0502040504020204" pitchFamily="34"/>
                 <a:cs typeface="Noto Sans" panose="020B0502040504020204" pitchFamily="34"/>
               </a:rPr>
-              <a:t>Les Problématiques</a:t>
+              <a:t>Les </a:t>
+            </a:r>
+            <a:r>
+              <a:rPr kumimoji="0" lang="fr-FR" sz="1500" b="0" i="0" u="none" strike="noStrike" kern="1200" cap="none" spc="0" normalizeH="0" baseline="0" dirty="0" smtClean="0">
+                <a:ln>
+                  <a:noFill/>
+                </a:ln>
+                <a:effectLst/>
+                <a:uLnTx/>
+                <a:uFillTx/>
+                <a:latin typeface="Noto Sans" panose="020B0502040504020204" pitchFamily="34"/>
+                <a:ea typeface="Noto Sans" panose="020B0502040504020204" pitchFamily="34"/>
+                <a:cs typeface="Noto Sans" panose="020B0502040504020204" pitchFamily="34"/>
+              </a:rPr>
+              <a:t>problématiques</a:t>
             </a:r>
           </a:p>
           <a:p>
@@ -13398,12 +13487,20 @@
               <a:defRPr/>
             </a:pPr>
             <a:r>
+              <a:rPr lang="en-GB" sz="1500" dirty="0" smtClean="0">
+                <a:latin typeface="Noto Sans" panose="020B0502040504020204" pitchFamily="34"/>
+                <a:ea typeface="Noto Sans" panose="020B0502040504020204" pitchFamily="34"/>
+                <a:cs typeface="Noto Sans" panose="020B0502040504020204" pitchFamily="34"/>
+              </a:rPr>
+              <a:t>de </a:t>
+            </a:r>
+            <a:r>
               <a:rPr lang="en-GB" sz="1500" dirty="0">
                 <a:latin typeface="Noto Sans" panose="020B0502040504020204" pitchFamily="34"/>
                 <a:ea typeface="Noto Sans" panose="020B0502040504020204" pitchFamily="34"/>
                 <a:cs typeface="Noto Sans" panose="020B0502040504020204" pitchFamily="34"/>
               </a:rPr>
-              <a:t>de la situation, qui nous ont poussés à créer l’application.</a:t>
+              <a:t>la situation, qui nous ont poussés à créer l’application.</a:t>
             </a:r>
             <a:endParaRPr kumimoji="0" lang="en-GB" sz="1500" b="0" i="0" u="none" strike="noStrike" kern="1200" cap="none" spc="0" normalizeH="0" baseline="0" noProof="0" dirty="0">
               <a:ln>
@@ -13424,7 +13521,7 @@
           <p:cNvPr id="112" name="TextBox 172">
             <a:extLst>
               <a:ext uri="{FF2B5EF4-FFF2-40B4-BE49-F238E27FC236}">
-                <a16:creationId xmlns:a16="http://schemas.microsoft.com/office/drawing/2014/main" id="{EDF6661D-5408-41A7-9257-ACF4C2CEA9EC}"/>
+                <a16:creationId xmlns:a16="http://schemas.microsoft.com/office/drawing/2014/main" xmlns="" id="{EDF6661D-5408-41A7-9257-ACF4C2CEA9EC}"/>
               </a:ext>
             </a:extLst>
           </p:cNvPr>
@@ -13476,7 +13573,49 @@
                 <a:ea typeface="Noto Sans" panose="020B0502040504020204" pitchFamily="34"/>
                 <a:cs typeface="Noto Sans" panose="020B0502040504020204" pitchFamily="34"/>
               </a:rPr>
-              <a:t>Démonstration des divers fonctionnalités de l’application.</a:t>
+              <a:t>Démonstration des divers </a:t>
+            </a:r>
+            <a:r>
+              <a:rPr kumimoji="0" lang="fr-FR" sz="1500" b="0" i="0" u="none" strike="noStrike" kern="1200" cap="none" spc="0" normalizeH="0" baseline="0" dirty="0" smtClean="0">
+                <a:ln>
+                  <a:noFill/>
+                </a:ln>
+                <a:effectLst/>
+                <a:uLnTx/>
+                <a:uFillTx/>
+                <a:latin typeface="Noto Sans" panose="020B0502040504020204" pitchFamily="34"/>
+                <a:ea typeface="Noto Sans" panose="020B0502040504020204" pitchFamily="34"/>
+                <a:cs typeface="Noto Sans" panose="020B0502040504020204" pitchFamily="34"/>
+              </a:rPr>
+              <a:t>fonctionnalités</a:t>
+            </a:r>
+            <a:r>
+              <a:rPr kumimoji="0" lang="en-GB" sz="1500" b="0" i="0" u="none" strike="noStrike" kern="1200" cap="none" spc="0" normalizeH="0" baseline="0" noProof="0" dirty="0" smtClean="0">
+                <a:ln>
+                  <a:noFill/>
+                </a:ln>
+                <a:effectLst/>
+                <a:uLnTx/>
+                <a:uFillTx/>
+                <a:latin typeface="Noto Sans" panose="020B0502040504020204" pitchFamily="34"/>
+                <a:ea typeface="Noto Sans" panose="020B0502040504020204" pitchFamily="34"/>
+                <a:cs typeface="Noto Sans" panose="020B0502040504020204" pitchFamily="34"/>
+              </a:rPr>
+              <a:t> </a:t>
+            </a:r>
+            <a:r>
+              <a:rPr kumimoji="0" lang="en-GB" sz="1500" b="0" i="0" u="none" strike="noStrike" kern="1200" cap="none" spc="0" normalizeH="0" baseline="0" noProof="0" dirty="0">
+                <a:ln>
+                  <a:noFill/>
+                </a:ln>
+                <a:effectLst/>
+                <a:uLnTx/>
+                <a:uFillTx/>
+                <a:latin typeface="Noto Sans" panose="020B0502040504020204" pitchFamily="34"/>
+                <a:ea typeface="Noto Sans" panose="020B0502040504020204" pitchFamily="34"/>
+                <a:cs typeface="Noto Sans" panose="020B0502040504020204" pitchFamily="34"/>
+              </a:rPr>
+              <a:t>de l’application.</a:t>
             </a:r>
           </a:p>
         </p:txBody>
@@ -13486,7 +13625,7 @@
           <p:cNvPr id="113" name="TextBox 173">
             <a:extLst>
               <a:ext uri="{FF2B5EF4-FFF2-40B4-BE49-F238E27FC236}">
-                <a16:creationId xmlns:a16="http://schemas.microsoft.com/office/drawing/2014/main" id="{D124DF7C-52F0-406B-B1F8-FB59E2E86515}"/>
+                <a16:creationId xmlns:a16="http://schemas.microsoft.com/office/drawing/2014/main" xmlns="" id="{D124DF7C-52F0-406B-B1F8-FB59E2E86515}"/>
               </a:ext>
             </a:extLst>
           </p:cNvPr>
@@ -13567,7 +13706,7 @@
           <p:cNvPr id="114" name="TextBox 174">
             <a:extLst>
               <a:ext uri="{FF2B5EF4-FFF2-40B4-BE49-F238E27FC236}">
-                <a16:creationId xmlns:a16="http://schemas.microsoft.com/office/drawing/2014/main" id="{A9E3A202-E617-4ADF-9445-007AEFEE480A}"/>
+                <a16:creationId xmlns:a16="http://schemas.microsoft.com/office/drawing/2014/main" xmlns="" id="{A9E3A202-E617-4ADF-9445-007AEFEE480A}"/>
               </a:ext>
             </a:extLst>
           </p:cNvPr>
@@ -13629,7 +13768,7 @@
           <p:cNvPr id="115" name="Rectangle 114">
             <a:extLst>
               <a:ext uri="{FF2B5EF4-FFF2-40B4-BE49-F238E27FC236}">
-                <a16:creationId xmlns:a16="http://schemas.microsoft.com/office/drawing/2014/main" id="{BA08964D-AD95-4B68-9AD6-963837B1E13B}"/>
+                <a16:creationId xmlns:a16="http://schemas.microsoft.com/office/drawing/2014/main" xmlns="" id="{BA08964D-AD95-4B68-9AD6-963837B1E13B}"/>
               </a:ext>
             </a:extLst>
           </p:cNvPr>
@@ -13681,7 +13820,7 @@
           <p:cNvPr id="116" name="Rectangle 115">
             <a:extLst>
               <a:ext uri="{FF2B5EF4-FFF2-40B4-BE49-F238E27FC236}">
-                <a16:creationId xmlns:a16="http://schemas.microsoft.com/office/drawing/2014/main" id="{508508C6-10C9-407A-88A4-426E174ED782}"/>
+                <a16:creationId xmlns:a16="http://schemas.microsoft.com/office/drawing/2014/main" xmlns="" id="{508508C6-10C9-407A-88A4-426E174ED782}"/>
               </a:ext>
             </a:extLst>
           </p:cNvPr>
@@ -13733,7 +13872,7 @@
           <p:cNvPr id="117" name="Rectangle 116">
             <a:extLst>
               <a:ext uri="{FF2B5EF4-FFF2-40B4-BE49-F238E27FC236}">
-                <a16:creationId xmlns:a16="http://schemas.microsoft.com/office/drawing/2014/main" id="{6C4BD688-1033-4F09-9FAC-1B253A39F562}"/>
+                <a16:creationId xmlns:a16="http://schemas.microsoft.com/office/drawing/2014/main" xmlns="" id="{6C4BD688-1033-4F09-9FAC-1B253A39F562}"/>
               </a:ext>
             </a:extLst>
           </p:cNvPr>
@@ -13785,7 +13924,7 @@
           <p:cNvPr id="118" name="Rectangle 117">
             <a:extLst>
               <a:ext uri="{FF2B5EF4-FFF2-40B4-BE49-F238E27FC236}">
-                <a16:creationId xmlns:a16="http://schemas.microsoft.com/office/drawing/2014/main" id="{6756AA45-0517-4960-951D-0AB1E1144378}"/>
+                <a16:creationId xmlns:a16="http://schemas.microsoft.com/office/drawing/2014/main" xmlns="" id="{6756AA45-0517-4960-951D-0AB1E1144378}"/>
               </a:ext>
             </a:extLst>
           </p:cNvPr>
@@ -13837,7 +13976,7 @@
           <p:cNvPr id="120" name="TextBox 88">
             <a:extLst>
               <a:ext uri="{FF2B5EF4-FFF2-40B4-BE49-F238E27FC236}">
-                <a16:creationId xmlns:a16="http://schemas.microsoft.com/office/drawing/2014/main" id="{18080301-832D-4E68-9C5A-BB7AA7D1F746}"/>
+                <a16:creationId xmlns:a16="http://schemas.microsoft.com/office/drawing/2014/main" xmlns="" id="{18080301-832D-4E68-9C5A-BB7AA7D1F746}"/>
               </a:ext>
             </a:extLst>
           </p:cNvPr>
@@ -13925,7 +14064,7 @@
           <p:cNvPr id="4" name="TextBox 35">
             <a:extLst>
               <a:ext uri="{FF2B5EF4-FFF2-40B4-BE49-F238E27FC236}">
-                <a16:creationId xmlns:a16="http://schemas.microsoft.com/office/drawing/2014/main" id="{66609D85-D40C-4F81-8485-750D56EDD4B1}"/>
+                <a16:creationId xmlns:a16="http://schemas.microsoft.com/office/drawing/2014/main" xmlns="" id="{66609D85-D40C-4F81-8485-750D56EDD4B1}"/>
               </a:ext>
             </a:extLst>
           </p:cNvPr>
@@ -13975,7 +14114,7 @@
           <p:cNvPr id="6" name="TextBox 4">
             <a:extLst>
               <a:ext uri="{FF2B5EF4-FFF2-40B4-BE49-F238E27FC236}">
-                <a16:creationId xmlns:a16="http://schemas.microsoft.com/office/drawing/2014/main" id="{EFC568A7-8946-4980-9441-F8CE7D85E345}"/>
+                <a16:creationId xmlns:a16="http://schemas.microsoft.com/office/drawing/2014/main" xmlns="" id="{EFC568A7-8946-4980-9441-F8CE7D85E345}"/>
               </a:ext>
             </a:extLst>
           </p:cNvPr>
@@ -14043,7 +14182,7 @@
           <p:cNvPr id="7" name="Oval 1">
             <a:extLst>
               <a:ext uri="{FF2B5EF4-FFF2-40B4-BE49-F238E27FC236}">
-                <a16:creationId xmlns:a16="http://schemas.microsoft.com/office/drawing/2014/main" id="{C243E2AF-2E81-4025-A2C6-3CA08B6A6AEB}"/>
+                <a16:creationId xmlns:a16="http://schemas.microsoft.com/office/drawing/2014/main" xmlns="" id="{C243E2AF-2E81-4025-A2C6-3CA08B6A6AEB}"/>
               </a:ext>
             </a:extLst>
           </p:cNvPr>
@@ -14124,7 +14263,7 @@
           <p:cNvPr id="8" name="Oval 5">
             <a:extLst>
               <a:ext uri="{FF2B5EF4-FFF2-40B4-BE49-F238E27FC236}">
-                <a16:creationId xmlns:a16="http://schemas.microsoft.com/office/drawing/2014/main" id="{5535BCA3-5157-4058-8DEB-22FCC4A030CC}"/>
+                <a16:creationId xmlns:a16="http://schemas.microsoft.com/office/drawing/2014/main" xmlns="" id="{5535BCA3-5157-4058-8DEB-22FCC4A030CC}"/>
               </a:ext>
             </a:extLst>
           </p:cNvPr>
@@ -14205,7 +14344,7 @@
           <p:cNvPr id="9" name="Oval 8">
             <a:extLst>
               <a:ext uri="{FF2B5EF4-FFF2-40B4-BE49-F238E27FC236}">
-                <a16:creationId xmlns:a16="http://schemas.microsoft.com/office/drawing/2014/main" id="{FF0E4ED3-50D9-4C8C-8218-954382F8EB60}"/>
+                <a16:creationId xmlns:a16="http://schemas.microsoft.com/office/drawing/2014/main" xmlns="" id="{FF0E4ED3-50D9-4C8C-8218-954382F8EB60}"/>
               </a:ext>
             </a:extLst>
           </p:cNvPr>
@@ -14286,7 +14425,7 @@
           <p:cNvPr id="10" name="Oval 9">
             <a:extLst>
               <a:ext uri="{FF2B5EF4-FFF2-40B4-BE49-F238E27FC236}">
-                <a16:creationId xmlns:a16="http://schemas.microsoft.com/office/drawing/2014/main" id="{0BAACD35-C2F0-49AD-B090-94692780BE75}"/>
+                <a16:creationId xmlns:a16="http://schemas.microsoft.com/office/drawing/2014/main" xmlns="" id="{0BAACD35-C2F0-49AD-B090-94692780BE75}"/>
               </a:ext>
             </a:extLst>
           </p:cNvPr>
@@ -14367,7 +14506,7 @@
           <p:cNvPr id="11" name="Oval 10">
             <a:extLst>
               <a:ext uri="{FF2B5EF4-FFF2-40B4-BE49-F238E27FC236}">
-                <a16:creationId xmlns:a16="http://schemas.microsoft.com/office/drawing/2014/main" id="{F174FDA8-3415-4973-A22A-9A7A731ED75A}"/>
+                <a16:creationId xmlns:a16="http://schemas.microsoft.com/office/drawing/2014/main" xmlns="" id="{F174FDA8-3415-4973-A22A-9A7A731ED75A}"/>
               </a:ext>
             </a:extLst>
           </p:cNvPr>
@@ -14448,7 +14587,7 @@
           <p:cNvPr id="12" name="Oval 11">
             <a:extLst>
               <a:ext uri="{FF2B5EF4-FFF2-40B4-BE49-F238E27FC236}">
-                <a16:creationId xmlns:a16="http://schemas.microsoft.com/office/drawing/2014/main" id="{8563D2AE-2612-4EA4-8262-18A119C6BC62}"/>
+                <a16:creationId xmlns:a16="http://schemas.microsoft.com/office/drawing/2014/main" xmlns="" id="{8563D2AE-2612-4EA4-8262-18A119C6BC62}"/>
               </a:ext>
             </a:extLst>
           </p:cNvPr>
@@ -14529,7 +14668,7 @@
           <p:cNvPr id="13" name="Oval 12">
             <a:extLst>
               <a:ext uri="{FF2B5EF4-FFF2-40B4-BE49-F238E27FC236}">
-                <a16:creationId xmlns:a16="http://schemas.microsoft.com/office/drawing/2014/main" id="{F27802A4-0638-4C5B-8225-7307CCA7D42F}"/>
+                <a16:creationId xmlns:a16="http://schemas.microsoft.com/office/drawing/2014/main" xmlns="" id="{F27802A4-0638-4C5B-8225-7307CCA7D42F}"/>
               </a:ext>
             </a:extLst>
           </p:cNvPr>
@@ -14610,7 +14749,7 @@
           <p:cNvPr id="14" name="Oval 13">
             <a:extLst>
               <a:ext uri="{FF2B5EF4-FFF2-40B4-BE49-F238E27FC236}">
-                <a16:creationId xmlns:a16="http://schemas.microsoft.com/office/drawing/2014/main" id="{612633AB-07FA-4E17-AE50-43ED432A3B57}"/>
+                <a16:creationId xmlns:a16="http://schemas.microsoft.com/office/drawing/2014/main" xmlns="" id="{612633AB-07FA-4E17-AE50-43ED432A3B57}"/>
               </a:ext>
             </a:extLst>
           </p:cNvPr>
@@ -14691,7 +14830,7 @@
           <p:cNvPr id="15" name="Oval 14">
             <a:extLst>
               <a:ext uri="{FF2B5EF4-FFF2-40B4-BE49-F238E27FC236}">
-                <a16:creationId xmlns:a16="http://schemas.microsoft.com/office/drawing/2014/main" id="{74D9BC5B-1FE5-49A0-8CEC-87F478F9AD47}"/>
+                <a16:creationId xmlns:a16="http://schemas.microsoft.com/office/drawing/2014/main" xmlns="" id="{74D9BC5B-1FE5-49A0-8CEC-87F478F9AD47}"/>
               </a:ext>
             </a:extLst>
           </p:cNvPr>
@@ -14772,7 +14911,7 @@
           <p:cNvPr id="20" name="Group 62">
             <a:extLst>
               <a:ext uri="{FF2B5EF4-FFF2-40B4-BE49-F238E27FC236}">
-                <a16:creationId xmlns:a16="http://schemas.microsoft.com/office/drawing/2014/main" id="{9E5B8B33-91E4-469B-9D7C-384362FF9B03}"/>
+                <a16:creationId xmlns:a16="http://schemas.microsoft.com/office/drawing/2014/main" xmlns="" id="{9E5B8B33-91E4-469B-9D7C-384362FF9B03}"/>
               </a:ext>
             </a:extLst>
           </p:cNvPr>
@@ -14795,7 +14934,7 @@
             <p:cNvPr id="21" name="Freeform 18">
               <a:extLst>
                 <a:ext uri="{FF2B5EF4-FFF2-40B4-BE49-F238E27FC236}">
-                  <a16:creationId xmlns:a16="http://schemas.microsoft.com/office/drawing/2014/main" id="{4B5FAF3A-E285-4D8A-98D4-35630B199D51}"/>
+                  <a16:creationId xmlns:a16="http://schemas.microsoft.com/office/drawing/2014/main" xmlns="" id="{4B5FAF3A-E285-4D8A-98D4-35630B199D51}"/>
                 </a:ext>
               </a:extLst>
             </p:cNvPr>
@@ -15622,7 +15761,7 @@
             <p:cNvPr id="22" name="Freeform 19">
               <a:extLst>
                 <a:ext uri="{FF2B5EF4-FFF2-40B4-BE49-F238E27FC236}">
-                  <a16:creationId xmlns:a16="http://schemas.microsoft.com/office/drawing/2014/main" id="{45C5BC9F-3327-45D2-8ADD-A2F77C940E9E}"/>
+                  <a16:creationId xmlns:a16="http://schemas.microsoft.com/office/drawing/2014/main" xmlns="" id="{45C5BC9F-3327-45D2-8ADD-A2F77C940E9E}"/>
                 </a:ext>
               </a:extLst>
             </p:cNvPr>
@@ -15849,7 +15988,7 @@
             <p:cNvPr id="23" name="Freeform 20">
               <a:extLst>
                 <a:ext uri="{FF2B5EF4-FFF2-40B4-BE49-F238E27FC236}">
-                  <a16:creationId xmlns:a16="http://schemas.microsoft.com/office/drawing/2014/main" id="{951CB135-D8F4-466C-BE6F-5596E62EB502}"/>
+                  <a16:creationId xmlns:a16="http://schemas.microsoft.com/office/drawing/2014/main" xmlns="" id="{951CB135-D8F4-466C-BE6F-5596E62EB502}"/>
                 </a:ext>
               </a:extLst>
             </p:cNvPr>
@@ -16661,7 +16800,7 @@
             <p:cNvPr id="24" name="Freeform 21">
               <a:extLst>
                 <a:ext uri="{FF2B5EF4-FFF2-40B4-BE49-F238E27FC236}">
-                  <a16:creationId xmlns:a16="http://schemas.microsoft.com/office/drawing/2014/main" id="{E02FB2F9-CDED-43E7-AA22-0ECCF739D635}"/>
+                  <a16:creationId xmlns:a16="http://schemas.microsoft.com/office/drawing/2014/main" xmlns="" id="{E02FB2F9-CDED-43E7-AA22-0ECCF739D635}"/>
                 </a:ext>
               </a:extLst>
             </p:cNvPr>
@@ -16839,7 +16978,7 @@
           <p:cNvPr id="25" name="Group 67">
             <a:extLst>
               <a:ext uri="{FF2B5EF4-FFF2-40B4-BE49-F238E27FC236}">
-                <a16:creationId xmlns:a16="http://schemas.microsoft.com/office/drawing/2014/main" id="{1E44213D-564F-4550-B6BE-AC4C0A9AC812}"/>
+                <a16:creationId xmlns:a16="http://schemas.microsoft.com/office/drawing/2014/main" xmlns="" id="{1E44213D-564F-4550-B6BE-AC4C0A9AC812}"/>
               </a:ext>
             </a:extLst>
           </p:cNvPr>
@@ -16859,7 +16998,7 @@
             <p:cNvPr id="26" name="Group 68">
               <a:extLst>
                 <a:ext uri="{FF2B5EF4-FFF2-40B4-BE49-F238E27FC236}">
-                  <a16:creationId xmlns:a16="http://schemas.microsoft.com/office/drawing/2014/main" id="{2976212E-FFCE-4D3F-9963-AC1733183846}"/>
+                  <a16:creationId xmlns:a16="http://schemas.microsoft.com/office/drawing/2014/main" xmlns="" id="{2976212E-FFCE-4D3F-9963-AC1733183846}"/>
                 </a:ext>
               </a:extLst>
             </p:cNvPr>
@@ -16882,7 +17021,7 @@
               <p:cNvPr id="28" name="Rectangle: Rounded Corners 70">
                 <a:extLst>
                   <a:ext uri="{FF2B5EF4-FFF2-40B4-BE49-F238E27FC236}">
-                    <a16:creationId xmlns:a16="http://schemas.microsoft.com/office/drawing/2014/main" id="{38B7162B-B115-458C-8EC9-392120425643}"/>
+                    <a16:creationId xmlns:a16="http://schemas.microsoft.com/office/drawing/2014/main" xmlns="" id="{38B7162B-B115-458C-8EC9-392120425643}"/>
                   </a:ext>
                 </a:extLst>
               </p:cNvPr>
@@ -16963,7 +17102,7 @@
               <p:cNvPr id="29" name="Rectangle: Rounded Corners 71">
                 <a:extLst>
                   <a:ext uri="{FF2B5EF4-FFF2-40B4-BE49-F238E27FC236}">
-                    <a16:creationId xmlns:a16="http://schemas.microsoft.com/office/drawing/2014/main" id="{94EF4148-1801-4262-AA2E-683F32437F63}"/>
+                    <a16:creationId xmlns:a16="http://schemas.microsoft.com/office/drawing/2014/main" xmlns="" id="{94EF4148-1801-4262-AA2E-683F32437F63}"/>
                   </a:ext>
                 </a:extLst>
               </p:cNvPr>
@@ -17045,7 +17184,7 @@
             <p:cNvPr id="27" name="Oval 69">
               <a:extLst>
                 <a:ext uri="{FF2B5EF4-FFF2-40B4-BE49-F238E27FC236}">
-                  <a16:creationId xmlns:a16="http://schemas.microsoft.com/office/drawing/2014/main" id="{BBE48304-7660-42A6-9102-B9352CD97CDC}"/>
+                  <a16:creationId xmlns:a16="http://schemas.microsoft.com/office/drawing/2014/main" xmlns="" id="{BBE48304-7660-42A6-9102-B9352CD97CDC}"/>
                 </a:ext>
               </a:extLst>
             </p:cNvPr>
@@ -17127,7 +17266,7 @@
           <p:cNvPr id="34" name="Group 75">
             <a:extLst>
               <a:ext uri="{FF2B5EF4-FFF2-40B4-BE49-F238E27FC236}">
-                <a16:creationId xmlns:a16="http://schemas.microsoft.com/office/drawing/2014/main" id="{755564F6-C87A-45C7-AB9F-9D690EF1428C}"/>
+                <a16:creationId xmlns:a16="http://schemas.microsoft.com/office/drawing/2014/main" xmlns="" id="{755564F6-C87A-45C7-AB9F-9D690EF1428C}"/>
               </a:ext>
             </a:extLst>
           </p:cNvPr>
@@ -17150,7 +17289,7 @@
             <p:cNvPr id="35" name="Freeform 5">
               <a:extLst>
                 <a:ext uri="{FF2B5EF4-FFF2-40B4-BE49-F238E27FC236}">
-                  <a16:creationId xmlns:a16="http://schemas.microsoft.com/office/drawing/2014/main" id="{C1523C4C-31F6-43D3-93B0-BEB94DA76902}"/>
+                  <a16:creationId xmlns:a16="http://schemas.microsoft.com/office/drawing/2014/main" xmlns="" id="{C1523C4C-31F6-43D3-93B0-BEB94DA76902}"/>
                 </a:ext>
               </a:extLst>
             </p:cNvPr>
@@ -17298,7 +17437,7 @@
             <p:cNvPr id="36" name="Freeform 6">
               <a:extLst>
                 <a:ext uri="{FF2B5EF4-FFF2-40B4-BE49-F238E27FC236}">
-                  <a16:creationId xmlns:a16="http://schemas.microsoft.com/office/drawing/2014/main" id="{A5B7756E-B732-435A-AE98-528303AF8CCF}"/>
+                  <a16:creationId xmlns:a16="http://schemas.microsoft.com/office/drawing/2014/main" xmlns="" id="{A5B7756E-B732-435A-AE98-528303AF8CCF}"/>
                 </a:ext>
               </a:extLst>
             </p:cNvPr>
@@ -17586,7 +17725,7 @@
             <p:cNvPr id="37" name="Freeform 7">
               <a:extLst>
                 <a:ext uri="{FF2B5EF4-FFF2-40B4-BE49-F238E27FC236}">
-                  <a16:creationId xmlns:a16="http://schemas.microsoft.com/office/drawing/2014/main" id="{4410714B-FB24-486B-9F4F-AE478268E9B1}"/>
+                  <a16:creationId xmlns:a16="http://schemas.microsoft.com/office/drawing/2014/main" xmlns="" id="{4410714B-FB24-486B-9F4F-AE478268E9B1}"/>
                 </a:ext>
               </a:extLst>
             </p:cNvPr>
@@ -17744,7 +17883,7 @@
             <p:cNvPr id="38" name="Freeform 8">
               <a:extLst>
                 <a:ext uri="{FF2B5EF4-FFF2-40B4-BE49-F238E27FC236}">
-                  <a16:creationId xmlns:a16="http://schemas.microsoft.com/office/drawing/2014/main" id="{9ADE60D5-FA5B-4EDE-8D0F-3305B71B0C33}"/>
+                  <a16:creationId xmlns:a16="http://schemas.microsoft.com/office/drawing/2014/main" xmlns="" id="{9ADE60D5-FA5B-4EDE-8D0F-3305B71B0C33}"/>
                 </a:ext>
               </a:extLst>
             </p:cNvPr>
@@ -17893,7 +18032,7 @@
           <p:cNvPr id="61" name="Group 108">
             <a:extLst>
               <a:ext uri="{FF2B5EF4-FFF2-40B4-BE49-F238E27FC236}">
-                <a16:creationId xmlns:a16="http://schemas.microsoft.com/office/drawing/2014/main" id="{D068EF8E-37E6-48D1-86E9-1F65545F805B}"/>
+                <a16:creationId xmlns:a16="http://schemas.microsoft.com/office/drawing/2014/main" xmlns="" id="{D068EF8E-37E6-48D1-86E9-1F65545F805B}"/>
               </a:ext>
             </a:extLst>
           </p:cNvPr>
@@ -17916,7 +18055,7 @@
             <p:cNvPr id="62" name="Freeform 5">
               <a:extLst>
                 <a:ext uri="{FF2B5EF4-FFF2-40B4-BE49-F238E27FC236}">
-                  <a16:creationId xmlns:a16="http://schemas.microsoft.com/office/drawing/2014/main" id="{EF579050-9565-4D42-9186-3F2A8D545760}"/>
+                  <a16:creationId xmlns:a16="http://schemas.microsoft.com/office/drawing/2014/main" xmlns="" id="{EF579050-9565-4D42-9186-3F2A8D545760}"/>
                 </a:ext>
               </a:extLst>
             </p:cNvPr>
@@ -18114,7 +18253,7 @@
             <p:cNvPr id="63" name="Freeform 6">
               <a:extLst>
                 <a:ext uri="{FF2B5EF4-FFF2-40B4-BE49-F238E27FC236}">
-                  <a16:creationId xmlns:a16="http://schemas.microsoft.com/office/drawing/2014/main" id="{02C3928B-4A0A-44C5-906E-BA2B7C45BCC1}"/>
+                  <a16:creationId xmlns:a16="http://schemas.microsoft.com/office/drawing/2014/main" xmlns="" id="{02C3928B-4A0A-44C5-906E-BA2B7C45BCC1}"/>
                 </a:ext>
               </a:extLst>
             </p:cNvPr>
@@ -18462,7 +18601,7 @@
           <p:cNvPr id="64" name="TextBox 111">
             <a:extLst>
               <a:ext uri="{FF2B5EF4-FFF2-40B4-BE49-F238E27FC236}">
-                <a16:creationId xmlns:a16="http://schemas.microsoft.com/office/drawing/2014/main" id="{4C0D26AD-2EA8-48EA-B23D-03E209094878}"/>
+                <a16:creationId xmlns:a16="http://schemas.microsoft.com/office/drawing/2014/main" xmlns="" id="{4C0D26AD-2EA8-48EA-B23D-03E209094878}"/>
               </a:ext>
             </a:extLst>
           </p:cNvPr>
@@ -18527,7 +18666,7 @@
           <p:cNvPr id="65" name="Straight Connector 113">
             <a:extLst>
               <a:ext uri="{FF2B5EF4-FFF2-40B4-BE49-F238E27FC236}">
-                <a16:creationId xmlns:a16="http://schemas.microsoft.com/office/drawing/2014/main" id="{7FDCF4CE-F8FE-4B46-A0E2-27865BF343D5}"/>
+                <a16:creationId xmlns:a16="http://schemas.microsoft.com/office/drawing/2014/main" xmlns="" id="{7FDCF4CE-F8FE-4B46-A0E2-27865BF343D5}"/>
               </a:ext>
             </a:extLst>
           </p:cNvPr>
@@ -18572,7 +18711,7 @@
           <p:cNvPr id="66" name="Straight Connector 114">
             <a:extLst>
               <a:ext uri="{FF2B5EF4-FFF2-40B4-BE49-F238E27FC236}">
-                <a16:creationId xmlns:a16="http://schemas.microsoft.com/office/drawing/2014/main" id="{A30CB7A9-1A84-4551-BB9E-76BA3C00D778}"/>
+                <a16:creationId xmlns:a16="http://schemas.microsoft.com/office/drawing/2014/main" xmlns="" id="{A30CB7A9-1A84-4551-BB9E-76BA3C00D778}"/>
               </a:ext>
             </a:extLst>
           </p:cNvPr>
@@ -18617,7 +18756,7 @@
           <p:cNvPr id="67" name="Straight Connector 117">
             <a:extLst>
               <a:ext uri="{FF2B5EF4-FFF2-40B4-BE49-F238E27FC236}">
-                <a16:creationId xmlns:a16="http://schemas.microsoft.com/office/drawing/2014/main" id="{D7641A84-F0FA-408C-BC81-AFC076A27AA9}"/>
+                <a16:creationId xmlns:a16="http://schemas.microsoft.com/office/drawing/2014/main" xmlns="" id="{D7641A84-F0FA-408C-BC81-AFC076A27AA9}"/>
               </a:ext>
             </a:extLst>
           </p:cNvPr>
@@ -18662,7 +18801,7 @@
           <p:cNvPr id="68" name="Straight Connector 120">
             <a:extLst>
               <a:ext uri="{FF2B5EF4-FFF2-40B4-BE49-F238E27FC236}">
-                <a16:creationId xmlns:a16="http://schemas.microsoft.com/office/drawing/2014/main" id="{1925A77C-C7DD-45D2-8358-44A3C1C7833E}"/>
+                <a16:creationId xmlns:a16="http://schemas.microsoft.com/office/drawing/2014/main" xmlns="" id="{1925A77C-C7DD-45D2-8358-44A3C1C7833E}"/>
               </a:ext>
             </a:extLst>
           </p:cNvPr>
@@ -18707,7 +18846,7 @@
           <p:cNvPr id="69" name="Straight Connector 123">
             <a:extLst>
               <a:ext uri="{FF2B5EF4-FFF2-40B4-BE49-F238E27FC236}">
-                <a16:creationId xmlns:a16="http://schemas.microsoft.com/office/drawing/2014/main" id="{C744E9B0-E693-479C-A36B-7A3AC6EFA4F3}"/>
+                <a16:creationId xmlns:a16="http://schemas.microsoft.com/office/drawing/2014/main" xmlns="" id="{C744E9B0-E693-479C-A36B-7A3AC6EFA4F3}"/>
               </a:ext>
             </a:extLst>
           </p:cNvPr>
@@ -18752,7 +18891,7 @@
           <p:cNvPr id="70" name="Straight Connector 126">
             <a:extLst>
               <a:ext uri="{FF2B5EF4-FFF2-40B4-BE49-F238E27FC236}">
-                <a16:creationId xmlns:a16="http://schemas.microsoft.com/office/drawing/2014/main" id="{92A0C285-1CF3-426F-A86F-787E1EA93C69}"/>
+                <a16:creationId xmlns:a16="http://schemas.microsoft.com/office/drawing/2014/main" xmlns="" id="{92A0C285-1CF3-426F-A86F-787E1EA93C69}"/>
               </a:ext>
             </a:extLst>
           </p:cNvPr>
@@ -18797,7 +18936,7 @@
           <p:cNvPr id="71" name="Straight Connector 130">
             <a:extLst>
               <a:ext uri="{FF2B5EF4-FFF2-40B4-BE49-F238E27FC236}">
-                <a16:creationId xmlns:a16="http://schemas.microsoft.com/office/drawing/2014/main" id="{0580FDEC-E609-46A7-A229-066DB546F0C6}"/>
+                <a16:creationId xmlns:a16="http://schemas.microsoft.com/office/drawing/2014/main" xmlns="" id="{0580FDEC-E609-46A7-A229-066DB546F0C6}"/>
               </a:ext>
             </a:extLst>
           </p:cNvPr>
@@ -18842,7 +18981,7 @@
           <p:cNvPr id="72" name="Straight Connector 133">
             <a:extLst>
               <a:ext uri="{FF2B5EF4-FFF2-40B4-BE49-F238E27FC236}">
-                <a16:creationId xmlns:a16="http://schemas.microsoft.com/office/drawing/2014/main" id="{B0C8BD83-60FC-474B-988A-E7D63F293991}"/>
+                <a16:creationId xmlns:a16="http://schemas.microsoft.com/office/drawing/2014/main" xmlns="" id="{B0C8BD83-60FC-474B-988A-E7D63F293991}"/>
               </a:ext>
             </a:extLst>
           </p:cNvPr>
@@ -18887,7 +19026,7 @@
           <p:cNvPr id="73" name="TextBox 136">
             <a:extLst>
               <a:ext uri="{FF2B5EF4-FFF2-40B4-BE49-F238E27FC236}">
-                <a16:creationId xmlns:a16="http://schemas.microsoft.com/office/drawing/2014/main" id="{C2D9C1E6-3ADD-4E48-B8BF-01F650C509BB}"/>
+                <a16:creationId xmlns:a16="http://schemas.microsoft.com/office/drawing/2014/main" xmlns="" id="{C2D9C1E6-3ADD-4E48-B8BF-01F650C509BB}"/>
               </a:ext>
             </a:extLst>
           </p:cNvPr>
@@ -18954,7 +19093,7 @@
           <p:cNvPr id="77" name="Oval 140">
             <a:extLst>
               <a:ext uri="{FF2B5EF4-FFF2-40B4-BE49-F238E27FC236}">
-                <a16:creationId xmlns:a16="http://schemas.microsoft.com/office/drawing/2014/main" id="{B731DB78-C58E-4E25-8760-E4D7618B2090}"/>
+                <a16:creationId xmlns:a16="http://schemas.microsoft.com/office/drawing/2014/main" xmlns="" id="{B731DB78-C58E-4E25-8760-E4D7618B2090}"/>
               </a:ext>
             </a:extLst>
           </p:cNvPr>
@@ -19035,7 +19174,7 @@
           <p:cNvPr id="81" name="TextBox 136">
             <a:extLst>
               <a:ext uri="{FF2B5EF4-FFF2-40B4-BE49-F238E27FC236}">
-                <a16:creationId xmlns:a16="http://schemas.microsoft.com/office/drawing/2014/main" id="{27F7299F-5641-4CC0-84B8-DEA043D55939}"/>
+                <a16:creationId xmlns:a16="http://schemas.microsoft.com/office/drawing/2014/main" xmlns="" id="{27F7299F-5641-4CC0-84B8-DEA043D55939}"/>
               </a:ext>
             </a:extLst>
           </p:cNvPr>
@@ -19097,7 +19236,7 @@
           <p:cNvPr id="82" name="Oval 140">
             <a:extLst>
               <a:ext uri="{FF2B5EF4-FFF2-40B4-BE49-F238E27FC236}">
-                <a16:creationId xmlns:a16="http://schemas.microsoft.com/office/drawing/2014/main" id="{569D1812-A5EE-44EC-98CE-EBB3D63DDD00}"/>
+                <a16:creationId xmlns:a16="http://schemas.microsoft.com/office/drawing/2014/main" xmlns="" id="{569D1812-A5EE-44EC-98CE-EBB3D63DDD00}"/>
               </a:ext>
             </a:extLst>
           </p:cNvPr>
@@ -19178,7 +19317,7 @@
           <p:cNvPr id="83" name="TextBox 136">
             <a:extLst>
               <a:ext uri="{FF2B5EF4-FFF2-40B4-BE49-F238E27FC236}">
-                <a16:creationId xmlns:a16="http://schemas.microsoft.com/office/drawing/2014/main" id="{EEA7F325-54AE-48F9-9594-CA4C74A3C9EC}"/>
+                <a16:creationId xmlns:a16="http://schemas.microsoft.com/office/drawing/2014/main" xmlns="" id="{EEA7F325-54AE-48F9-9594-CA4C74A3C9EC}"/>
               </a:ext>
             </a:extLst>
           </p:cNvPr>
@@ -19240,7 +19379,7 @@
           <p:cNvPr id="84" name="Oval 140">
             <a:extLst>
               <a:ext uri="{FF2B5EF4-FFF2-40B4-BE49-F238E27FC236}">
-                <a16:creationId xmlns:a16="http://schemas.microsoft.com/office/drawing/2014/main" id="{F5323DAF-DE6B-440B-9B75-E85ADE5368A9}"/>
+                <a16:creationId xmlns:a16="http://schemas.microsoft.com/office/drawing/2014/main" xmlns="" id="{F5323DAF-DE6B-440B-9B75-E85ADE5368A9}"/>
               </a:ext>
             </a:extLst>
           </p:cNvPr>
@@ -19321,7 +19460,7 @@
           <p:cNvPr id="85" name="TextBox 136">
             <a:extLst>
               <a:ext uri="{FF2B5EF4-FFF2-40B4-BE49-F238E27FC236}">
-                <a16:creationId xmlns:a16="http://schemas.microsoft.com/office/drawing/2014/main" id="{AFF1E33C-055F-4E94-84B9-72C46C650AF8}"/>
+                <a16:creationId xmlns:a16="http://schemas.microsoft.com/office/drawing/2014/main" xmlns="" id="{AFF1E33C-055F-4E94-84B9-72C46C650AF8}"/>
               </a:ext>
             </a:extLst>
           </p:cNvPr>
@@ -19383,7 +19522,7 @@
           <p:cNvPr id="86" name="Oval 140">
             <a:extLst>
               <a:ext uri="{FF2B5EF4-FFF2-40B4-BE49-F238E27FC236}">
-                <a16:creationId xmlns:a16="http://schemas.microsoft.com/office/drawing/2014/main" id="{BA285E0A-0DE5-4493-8C79-44D67CABF839}"/>
+                <a16:creationId xmlns:a16="http://schemas.microsoft.com/office/drawing/2014/main" xmlns="" id="{BA285E0A-0DE5-4493-8C79-44D67CABF839}"/>
               </a:ext>
             </a:extLst>
           </p:cNvPr>
@@ -19464,7 +19603,7 @@
           <p:cNvPr id="87" name="TextBox 136">
             <a:extLst>
               <a:ext uri="{FF2B5EF4-FFF2-40B4-BE49-F238E27FC236}">
-                <a16:creationId xmlns:a16="http://schemas.microsoft.com/office/drawing/2014/main" id="{19BCE4AE-7BAB-4C46-B418-252CEB745FE3}"/>
+                <a16:creationId xmlns:a16="http://schemas.microsoft.com/office/drawing/2014/main" xmlns="" id="{19BCE4AE-7BAB-4C46-B418-252CEB745FE3}"/>
               </a:ext>
             </a:extLst>
           </p:cNvPr>
@@ -19526,7 +19665,7 @@
           <p:cNvPr id="88" name="Oval 140">
             <a:extLst>
               <a:ext uri="{FF2B5EF4-FFF2-40B4-BE49-F238E27FC236}">
-                <a16:creationId xmlns:a16="http://schemas.microsoft.com/office/drawing/2014/main" id="{E14DE4B1-D55D-4457-8AD6-486779C5BA7F}"/>
+                <a16:creationId xmlns:a16="http://schemas.microsoft.com/office/drawing/2014/main" xmlns="" id="{E14DE4B1-D55D-4457-8AD6-486779C5BA7F}"/>
               </a:ext>
             </a:extLst>
           </p:cNvPr>
@@ -19607,7 +19746,7 @@
           <p:cNvPr id="89" name="TextBox 136">
             <a:extLst>
               <a:ext uri="{FF2B5EF4-FFF2-40B4-BE49-F238E27FC236}">
-                <a16:creationId xmlns:a16="http://schemas.microsoft.com/office/drawing/2014/main" id="{4AE0B7CE-D258-48C7-A598-FD7A80A7CBB5}"/>
+                <a16:creationId xmlns:a16="http://schemas.microsoft.com/office/drawing/2014/main" xmlns="" id="{4AE0B7CE-D258-48C7-A598-FD7A80A7CBB5}"/>
               </a:ext>
             </a:extLst>
           </p:cNvPr>
@@ -19690,7 +19829,7 @@
           <p:cNvPr id="90" name="Oval 140">
             <a:extLst>
               <a:ext uri="{FF2B5EF4-FFF2-40B4-BE49-F238E27FC236}">
-                <a16:creationId xmlns:a16="http://schemas.microsoft.com/office/drawing/2014/main" id="{23A81700-3A40-433E-BBAC-DC569F4F368D}"/>
+                <a16:creationId xmlns:a16="http://schemas.microsoft.com/office/drawing/2014/main" xmlns="" id="{23A81700-3A40-433E-BBAC-DC569F4F368D}"/>
               </a:ext>
             </a:extLst>
           </p:cNvPr>
@@ -19771,7 +19910,7 @@
           <p:cNvPr id="91" name="TextBox 136">
             <a:extLst>
               <a:ext uri="{FF2B5EF4-FFF2-40B4-BE49-F238E27FC236}">
-                <a16:creationId xmlns:a16="http://schemas.microsoft.com/office/drawing/2014/main" id="{01E666A5-B0AE-45C9-A813-27090CE8716E}"/>
+                <a16:creationId xmlns:a16="http://schemas.microsoft.com/office/drawing/2014/main" xmlns="" id="{01E666A5-B0AE-45C9-A813-27090CE8716E}"/>
               </a:ext>
             </a:extLst>
           </p:cNvPr>
@@ -19820,12 +19959,20 @@
               <a:t>Difficile </a:t>
             </a:r>
             <a:r>
-              <a:rPr lang="en-GB" sz="1500" dirty="0" err="1">
+              <a:rPr lang="en-GB" sz="1500" dirty="0" err="1" smtClean="0">
                 <a:latin typeface="Noto Sans" panose="020B0502040504020204" pitchFamily="34"/>
                 <a:ea typeface="Noto Sans" panose="020B0502040504020204" pitchFamily="34"/>
                 <a:cs typeface="Noto Sans" panose="020B0502040504020204" pitchFamily="34"/>
               </a:rPr>
-              <a:t>d’élaborer</a:t>
+              <a:t>d’élaboration</a:t>
+            </a:r>
+            <a:r>
+              <a:rPr lang="en-GB" sz="1500" dirty="0" smtClean="0">
+                <a:latin typeface="Noto Sans" panose="020B0502040504020204" pitchFamily="34"/>
+                <a:ea typeface="Noto Sans" panose="020B0502040504020204" pitchFamily="34"/>
+                <a:cs typeface="Noto Sans" panose="020B0502040504020204" pitchFamily="34"/>
+              </a:rPr>
+              <a:t> </a:t>
             </a:r>
             <a:r>
               <a:rPr lang="en-GB" sz="1500" dirty="0">
@@ -19833,7 +19980,7 @@
                 <a:ea typeface="Noto Sans" panose="020B0502040504020204" pitchFamily="34"/>
                 <a:cs typeface="Noto Sans" panose="020B0502040504020204" pitchFamily="34"/>
               </a:rPr>
-              <a:t> des </a:t>
+              <a:t>des </a:t>
             </a:r>
             <a:r>
               <a:rPr lang="en-GB" sz="1500" dirty="0" err="1">
@@ -19870,7 +20017,7 @@
           <p:cNvPr id="92" name="Oval 140">
             <a:extLst>
               <a:ext uri="{FF2B5EF4-FFF2-40B4-BE49-F238E27FC236}">
-                <a16:creationId xmlns:a16="http://schemas.microsoft.com/office/drawing/2014/main" id="{78352542-AC69-4DC8-A53B-57CB96E35DD0}"/>
+                <a16:creationId xmlns:a16="http://schemas.microsoft.com/office/drawing/2014/main" xmlns="" id="{78352542-AC69-4DC8-A53B-57CB96E35DD0}"/>
               </a:ext>
             </a:extLst>
           </p:cNvPr>
@@ -19951,7 +20098,7 @@
           <p:cNvPr id="3" name="Image 2">
             <a:extLst>
               <a:ext uri="{FF2B5EF4-FFF2-40B4-BE49-F238E27FC236}">
-                <a16:creationId xmlns:a16="http://schemas.microsoft.com/office/drawing/2014/main" id="{176E04A2-941C-4BC0-8230-4AB62A1D628A}"/>
+                <a16:creationId xmlns:a16="http://schemas.microsoft.com/office/drawing/2014/main" xmlns="" id="{176E04A2-941C-4BC0-8230-4AB62A1D628A}"/>
               </a:ext>
             </a:extLst>
           </p:cNvPr>
@@ -19987,7 +20134,7 @@
           <p:cNvPr id="94" name="Image 93">
             <a:extLst>
               <a:ext uri="{FF2B5EF4-FFF2-40B4-BE49-F238E27FC236}">
-                <a16:creationId xmlns:a16="http://schemas.microsoft.com/office/drawing/2014/main" id="{F856EA5B-E88F-4FD5-B6E4-DE4B36FB9733}"/>
+                <a16:creationId xmlns:a16="http://schemas.microsoft.com/office/drawing/2014/main" xmlns="" id="{F856EA5B-E88F-4FD5-B6E4-DE4B36FB9733}"/>
               </a:ext>
             </a:extLst>
           </p:cNvPr>
@@ -20023,7 +20170,7 @@
           <p:cNvPr id="100" name="Image 99">
             <a:extLst>
               <a:ext uri="{FF2B5EF4-FFF2-40B4-BE49-F238E27FC236}">
-                <a16:creationId xmlns:a16="http://schemas.microsoft.com/office/drawing/2014/main" id="{D65EAF12-5279-4361-A178-B84CE98980CB}"/>
+                <a16:creationId xmlns:a16="http://schemas.microsoft.com/office/drawing/2014/main" xmlns="" id="{D65EAF12-5279-4361-A178-B84CE98980CB}"/>
               </a:ext>
             </a:extLst>
           </p:cNvPr>
@@ -20059,7 +20206,7 @@
           <p:cNvPr id="102" name="Image 101">
             <a:extLst>
               <a:ext uri="{FF2B5EF4-FFF2-40B4-BE49-F238E27FC236}">
-                <a16:creationId xmlns:a16="http://schemas.microsoft.com/office/drawing/2014/main" id="{F68F3BB2-5074-417D-B159-FEE85C842093}"/>
+                <a16:creationId xmlns:a16="http://schemas.microsoft.com/office/drawing/2014/main" xmlns="" id="{F68F3BB2-5074-417D-B159-FEE85C842093}"/>
               </a:ext>
             </a:extLst>
           </p:cNvPr>
@@ -20133,7 +20280,7 @@
           <p:cNvPr id="4" name="TextBox 35">
             <a:extLst>
               <a:ext uri="{FF2B5EF4-FFF2-40B4-BE49-F238E27FC236}">
-                <a16:creationId xmlns:a16="http://schemas.microsoft.com/office/drawing/2014/main" id="{66609D85-D40C-4F81-8485-750D56EDD4B1}"/>
+                <a16:creationId xmlns:a16="http://schemas.microsoft.com/office/drawing/2014/main" xmlns="" id="{66609D85-D40C-4F81-8485-750D56EDD4B1}"/>
               </a:ext>
             </a:extLst>
           </p:cNvPr>
@@ -20183,7 +20330,7 @@
           <p:cNvPr id="6" name="TextBox 4">
             <a:extLst>
               <a:ext uri="{FF2B5EF4-FFF2-40B4-BE49-F238E27FC236}">
-                <a16:creationId xmlns:a16="http://schemas.microsoft.com/office/drawing/2014/main" id="{EFC568A7-8946-4980-9441-F8CE7D85E345}"/>
+                <a16:creationId xmlns:a16="http://schemas.microsoft.com/office/drawing/2014/main" xmlns="" id="{EFC568A7-8946-4980-9441-F8CE7D85E345}"/>
               </a:ext>
             </a:extLst>
           </p:cNvPr>
@@ -20291,7 +20438,7 @@
           <p:cNvPr id="59" name="Group 1">
             <a:extLst>
               <a:ext uri="{FF2B5EF4-FFF2-40B4-BE49-F238E27FC236}">
-                <a16:creationId xmlns:a16="http://schemas.microsoft.com/office/drawing/2014/main" id="{5788E8D6-3E13-4D6D-A18A-D3FC7F6D9E40}"/>
+                <a16:creationId xmlns:a16="http://schemas.microsoft.com/office/drawing/2014/main" xmlns="" id="{5788E8D6-3E13-4D6D-A18A-D3FC7F6D9E40}"/>
               </a:ext>
             </a:extLst>
           </p:cNvPr>
@@ -20311,7 +20458,7 @@
             <p:cNvPr id="60" name="Freeform 5">
               <a:extLst>
                 <a:ext uri="{FF2B5EF4-FFF2-40B4-BE49-F238E27FC236}">
-                  <a16:creationId xmlns:a16="http://schemas.microsoft.com/office/drawing/2014/main" id="{06250596-8AAF-4F14-B920-365FB7E47E68}"/>
+                  <a16:creationId xmlns:a16="http://schemas.microsoft.com/office/drawing/2014/main" xmlns="" id="{06250596-8AAF-4F14-B920-365FB7E47E68}"/>
                 </a:ext>
               </a:extLst>
             </p:cNvPr>
@@ -20871,7 +21018,7 @@
             <p:cNvPr id="74" name="Freeform 5">
               <a:extLst>
                 <a:ext uri="{FF2B5EF4-FFF2-40B4-BE49-F238E27FC236}">
-                  <a16:creationId xmlns:a16="http://schemas.microsoft.com/office/drawing/2014/main" id="{17533B52-F9B5-4DB8-A065-A3AD8C92CA14}"/>
+                  <a16:creationId xmlns:a16="http://schemas.microsoft.com/office/drawing/2014/main" xmlns="" id="{17533B52-F9B5-4DB8-A065-A3AD8C92CA14}"/>
                 </a:ext>
               </a:extLst>
             </p:cNvPr>
@@ -21431,7 +21578,7 @@
             <p:cNvPr id="75" name="Freeform 6">
               <a:extLst>
                 <a:ext uri="{FF2B5EF4-FFF2-40B4-BE49-F238E27FC236}">
-                  <a16:creationId xmlns:a16="http://schemas.microsoft.com/office/drawing/2014/main" id="{907A4897-5160-4433-95BB-4981708F8E1D}"/>
+                  <a16:creationId xmlns:a16="http://schemas.microsoft.com/office/drawing/2014/main" xmlns="" id="{907A4897-5160-4433-95BB-4981708F8E1D}"/>
                 </a:ext>
               </a:extLst>
             </p:cNvPr>
@@ -22006,7 +22153,7 @@
             <p:cNvPr id="76" name="Freeform 6">
               <a:extLst>
                 <a:ext uri="{FF2B5EF4-FFF2-40B4-BE49-F238E27FC236}">
-                  <a16:creationId xmlns:a16="http://schemas.microsoft.com/office/drawing/2014/main" id="{1FEE99D4-1240-440A-9721-A8A628754217}"/>
+                  <a16:creationId xmlns:a16="http://schemas.microsoft.com/office/drawing/2014/main" xmlns="" id="{1FEE99D4-1240-440A-9721-A8A628754217}"/>
                 </a:ext>
               </a:extLst>
             </p:cNvPr>
@@ -22581,7 +22728,7 @@
             <p:cNvPr id="78" name="Freeform 5">
               <a:extLst>
                 <a:ext uri="{FF2B5EF4-FFF2-40B4-BE49-F238E27FC236}">
-                  <a16:creationId xmlns:a16="http://schemas.microsoft.com/office/drawing/2014/main" id="{4ABD5431-CEAD-4EEB-8487-540F38ECF079}"/>
+                  <a16:creationId xmlns:a16="http://schemas.microsoft.com/office/drawing/2014/main" xmlns="" id="{4ABD5431-CEAD-4EEB-8487-540F38ECF079}"/>
                 </a:ext>
               </a:extLst>
             </p:cNvPr>
@@ -23141,7 +23288,7 @@
             <p:cNvPr id="79" name="Freeform 6">
               <a:extLst>
                 <a:ext uri="{FF2B5EF4-FFF2-40B4-BE49-F238E27FC236}">
-                  <a16:creationId xmlns:a16="http://schemas.microsoft.com/office/drawing/2014/main" id="{CA1600B1-C6F4-44F1-A151-A8C6B7ABEBD8}"/>
+                  <a16:creationId xmlns:a16="http://schemas.microsoft.com/office/drawing/2014/main" xmlns="" id="{CA1600B1-C6F4-44F1-A151-A8C6B7ABEBD8}"/>
                 </a:ext>
               </a:extLst>
             </p:cNvPr>
@@ -23717,7 +23864,7 @@
           <p:cNvPr id="80" name="Group 14">
             <a:extLst>
               <a:ext uri="{FF2B5EF4-FFF2-40B4-BE49-F238E27FC236}">
-                <a16:creationId xmlns:a16="http://schemas.microsoft.com/office/drawing/2014/main" id="{9B255125-D159-4108-8FB8-288EE23DE946}"/>
+                <a16:creationId xmlns:a16="http://schemas.microsoft.com/office/drawing/2014/main" xmlns="" id="{9B255125-D159-4108-8FB8-288EE23DE946}"/>
               </a:ext>
             </a:extLst>
           </p:cNvPr>
@@ -23740,7 +23887,7 @@
             <p:cNvPr id="93" name="Freeform 18">
               <a:extLst>
                 <a:ext uri="{FF2B5EF4-FFF2-40B4-BE49-F238E27FC236}">
-                  <a16:creationId xmlns:a16="http://schemas.microsoft.com/office/drawing/2014/main" id="{4D04400E-B800-41D6-8C6F-4C0B23E416CA}"/>
+                  <a16:creationId xmlns:a16="http://schemas.microsoft.com/office/drawing/2014/main" xmlns="" id="{4D04400E-B800-41D6-8C6F-4C0B23E416CA}"/>
                 </a:ext>
               </a:extLst>
             </p:cNvPr>
@@ -24567,7 +24714,7 @@
             <p:cNvPr id="95" name="Freeform 19">
               <a:extLst>
                 <a:ext uri="{FF2B5EF4-FFF2-40B4-BE49-F238E27FC236}">
-                  <a16:creationId xmlns:a16="http://schemas.microsoft.com/office/drawing/2014/main" id="{B0472E68-97A0-4AA5-9887-1CC47FF01C88}"/>
+                  <a16:creationId xmlns:a16="http://schemas.microsoft.com/office/drawing/2014/main" xmlns="" id="{B0472E68-97A0-4AA5-9887-1CC47FF01C88}"/>
                 </a:ext>
               </a:extLst>
             </p:cNvPr>
@@ -24794,7 +24941,7 @@
             <p:cNvPr id="96" name="Freeform 20">
               <a:extLst>
                 <a:ext uri="{FF2B5EF4-FFF2-40B4-BE49-F238E27FC236}">
-                  <a16:creationId xmlns:a16="http://schemas.microsoft.com/office/drawing/2014/main" id="{E871DC2F-230A-4C0B-9F1B-13D0496FA007}"/>
+                  <a16:creationId xmlns:a16="http://schemas.microsoft.com/office/drawing/2014/main" xmlns="" id="{E871DC2F-230A-4C0B-9F1B-13D0496FA007}"/>
                 </a:ext>
               </a:extLst>
             </p:cNvPr>
@@ -25606,7 +25753,7 @@
             <p:cNvPr id="97" name="Freeform 21">
               <a:extLst>
                 <a:ext uri="{FF2B5EF4-FFF2-40B4-BE49-F238E27FC236}">
-                  <a16:creationId xmlns:a16="http://schemas.microsoft.com/office/drawing/2014/main" id="{3CC0BFF7-91ED-4E29-8574-A19D7E5AF83B}"/>
+                  <a16:creationId xmlns:a16="http://schemas.microsoft.com/office/drawing/2014/main" xmlns="" id="{3CC0BFF7-91ED-4E29-8574-A19D7E5AF83B}"/>
                 </a:ext>
               </a:extLst>
             </p:cNvPr>
@@ -25784,7 +25931,7 @@
           <p:cNvPr id="121" name="Group 42">
             <a:extLst>
               <a:ext uri="{FF2B5EF4-FFF2-40B4-BE49-F238E27FC236}">
-                <a16:creationId xmlns:a16="http://schemas.microsoft.com/office/drawing/2014/main" id="{82C885A2-83AA-4978-8B64-C38ECA9280F7}"/>
+                <a16:creationId xmlns:a16="http://schemas.microsoft.com/office/drawing/2014/main" xmlns="" id="{82C885A2-83AA-4978-8B64-C38ECA9280F7}"/>
               </a:ext>
             </a:extLst>
           </p:cNvPr>
@@ -25804,7 +25951,7 @@
             <p:cNvPr id="122" name="Freeform 5">
               <a:extLst>
                 <a:ext uri="{FF2B5EF4-FFF2-40B4-BE49-F238E27FC236}">
-                  <a16:creationId xmlns:a16="http://schemas.microsoft.com/office/drawing/2014/main" id="{BF44EF5B-ABA1-4C95-98C2-A4F3E92F376F}"/>
+                  <a16:creationId xmlns:a16="http://schemas.microsoft.com/office/drawing/2014/main" xmlns="" id="{BF44EF5B-ABA1-4C95-98C2-A4F3E92F376F}"/>
                 </a:ext>
               </a:extLst>
             </p:cNvPr>
@@ -25954,7 +26101,7 @@
             <p:cNvPr id="123" name="Freeform 6">
               <a:extLst>
                 <a:ext uri="{FF2B5EF4-FFF2-40B4-BE49-F238E27FC236}">
-                  <a16:creationId xmlns:a16="http://schemas.microsoft.com/office/drawing/2014/main" id="{CAECA68B-2DE2-4EDA-8947-86B32889D0B2}"/>
+                  <a16:creationId xmlns:a16="http://schemas.microsoft.com/office/drawing/2014/main" xmlns="" id="{CAECA68B-2DE2-4EDA-8947-86B32889D0B2}"/>
                 </a:ext>
               </a:extLst>
             </p:cNvPr>
@@ -26244,7 +26391,7 @@
             <p:cNvPr id="124" name="Freeform 7">
               <a:extLst>
                 <a:ext uri="{FF2B5EF4-FFF2-40B4-BE49-F238E27FC236}">
-                  <a16:creationId xmlns:a16="http://schemas.microsoft.com/office/drawing/2014/main" id="{4D43C89A-4F61-444F-8C37-D5EBE0ED31BA}"/>
+                  <a16:creationId xmlns:a16="http://schemas.microsoft.com/office/drawing/2014/main" xmlns="" id="{4D43C89A-4F61-444F-8C37-D5EBE0ED31BA}"/>
                 </a:ext>
               </a:extLst>
             </p:cNvPr>
@@ -26404,7 +26551,7 @@
             <p:cNvPr id="125" name="Freeform 8">
               <a:extLst>
                 <a:ext uri="{FF2B5EF4-FFF2-40B4-BE49-F238E27FC236}">
-                  <a16:creationId xmlns:a16="http://schemas.microsoft.com/office/drawing/2014/main" id="{E220946F-7740-4505-9A35-56C3BB0512DC}"/>
+                  <a16:creationId xmlns:a16="http://schemas.microsoft.com/office/drawing/2014/main" xmlns="" id="{E220946F-7740-4505-9A35-56C3BB0512DC}"/>
                 </a:ext>
               </a:extLst>
             </p:cNvPr>
@@ -26555,7 +26702,7 @@
           <p:cNvPr id="148" name="TextBox 57">
             <a:extLst>
               <a:ext uri="{FF2B5EF4-FFF2-40B4-BE49-F238E27FC236}">
-                <a16:creationId xmlns:a16="http://schemas.microsoft.com/office/drawing/2014/main" id="{C1A15BF7-C88E-41AE-BBEE-3C6735D70DED}"/>
+                <a16:creationId xmlns:a16="http://schemas.microsoft.com/office/drawing/2014/main" xmlns="" id="{C1A15BF7-C88E-41AE-BBEE-3C6735D70DED}"/>
               </a:ext>
             </a:extLst>
           </p:cNvPr>
@@ -26645,7 +26792,7 @@
           <p:cNvPr id="149" name="Oval 58">
             <a:extLst>
               <a:ext uri="{FF2B5EF4-FFF2-40B4-BE49-F238E27FC236}">
-                <a16:creationId xmlns:a16="http://schemas.microsoft.com/office/drawing/2014/main" id="{C9B05398-3B73-4B4B-BAC3-BEB89E05A508}"/>
+                <a16:creationId xmlns:a16="http://schemas.microsoft.com/office/drawing/2014/main" xmlns="" id="{C9B05398-3B73-4B4B-BAC3-BEB89E05A508}"/>
               </a:ext>
             </a:extLst>
           </p:cNvPr>
@@ -26726,7 +26873,7 @@
           <p:cNvPr id="150" name="Oval 59">
             <a:extLst>
               <a:ext uri="{FF2B5EF4-FFF2-40B4-BE49-F238E27FC236}">
-                <a16:creationId xmlns:a16="http://schemas.microsoft.com/office/drawing/2014/main" id="{FA535DF8-405D-42FC-B2DD-0F52751F4BC7}"/>
+                <a16:creationId xmlns:a16="http://schemas.microsoft.com/office/drawing/2014/main" xmlns="" id="{FA535DF8-405D-42FC-B2DD-0F52751F4BC7}"/>
               </a:ext>
             </a:extLst>
           </p:cNvPr>
@@ -26807,7 +26954,7 @@
           <p:cNvPr id="151" name="Oval 60">
             <a:extLst>
               <a:ext uri="{FF2B5EF4-FFF2-40B4-BE49-F238E27FC236}">
-                <a16:creationId xmlns:a16="http://schemas.microsoft.com/office/drawing/2014/main" id="{F7F0D00D-4C31-4EFC-A2B4-1E1EA0DB1868}"/>
+                <a16:creationId xmlns:a16="http://schemas.microsoft.com/office/drawing/2014/main" xmlns="" id="{F7F0D00D-4C31-4EFC-A2B4-1E1EA0DB1868}"/>
               </a:ext>
             </a:extLst>
           </p:cNvPr>
@@ -26888,7 +27035,7 @@
           <p:cNvPr id="152" name="Oval 61">
             <a:extLst>
               <a:ext uri="{FF2B5EF4-FFF2-40B4-BE49-F238E27FC236}">
-                <a16:creationId xmlns:a16="http://schemas.microsoft.com/office/drawing/2014/main" id="{27D9C86D-0592-4FDE-BC23-E7640EF9A15E}"/>
+                <a16:creationId xmlns:a16="http://schemas.microsoft.com/office/drawing/2014/main" xmlns="" id="{27D9C86D-0592-4FDE-BC23-E7640EF9A15E}"/>
               </a:ext>
             </a:extLst>
           </p:cNvPr>
@@ -26969,7 +27116,7 @@
           <p:cNvPr id="153" name="TextBox 62">
             <a:extLst>
               <a:ext uri="{FF2B5EF4-FFF2-40B4-BE49-F238E27FC236}">
-                <a16:creationId xmlns:a16="http://schemas.microsoft.com/office/drawing/2014/main" id="{73C93E80-7359-4BCE-A5C3-5CAD1CBA9127}"/>
+                <a16:creationId xmlns:a16="http://schemas.microsoft.com/office/drawing/2014/main" xmlns="" id="{73C93E80-7359-4BCE-A5C3-5CAD1CBA9127}"/>
               </a:ext>
             </a:extLst>
           </p:cNvPr>
@@ -27101,7 +27248,7 @@
           <p:cNvPr id="154" name="TextBox 63">
             <a:extLst>
               <a:ext uri="{FF2B5EF4-FFF2-40B4-BE49-F238E27FC236}">
-                <a16:creationId xmlns:a16="http://schemas.microsoft.com/office/drawing/2014/main" id="{1965C170-FA07-4CEC-8B15-C8B4A7ABB15F}"/>
+                <a16:creationId xmlns:a16="http://schemas.microsoft.com/office/drawing/2014/main" xmlns="" id="{1965C170-FA07-4CEC-8B15-C8B4A7ABB15F}"/>
               </a:ext>
             </a:extLst>
           </p:cNvPr>
@@ -27233,7 +27380,7 @@
           <p:cNvPr id="155" name="TextBox 64">
             <a:extLst>
               <a:ext uri="{FF2B5EF4-FFF2-40B4-BE49-F238E27FC236}">
-                <a16:creationId xmlns:a16="http://schemas.microsoft.com/office/drawing/2014/main" id="{EA5E9B43-F185-49FF-B1AB-DC72D4A33DAB}"/>
+                <a16:creationId xmlns:a16="http://schemas.microsoft.com/office/drawing/2014/main" xmlns="" id="{EA5E9B43-F185-49FF-B1AB-DC72D4A33DAB}"/>
               </a:ext>
             </a:extLst>
           </p:cNvPr>
@@ -27243,7 +27390,7 @@
         <p:spPr>
           <a:xfrm>
             <a:off x="528635" y="3256870"/>
-            <a:ext cx="2378242" cy="1246495"/>
+            <a:ext cx="2378242" cy="1015663"/>
           </a:xfrm>
           <a:prstGeom prst="rect">
             <a:avLst/>
@@ -27274,7 +27421,7 @@
               <a:defRPr/>
             </a:pPr>
             <a:r>
-              <a:rPr kumimoji="0" lang="en-US" sz="1500" b="0" i="0" u="none" strike="noStrike" kern="1200" cap="none" spc="0" normalizeH="0" baseline="0" noProof="0" dirty="0" err="1">
+              <a:rPr kumimoji="0" lang="fr-FR" sz="1500" b="0" i="0" u="none" strike="noStrike" kern="1200" cap="none" spc="0" normalizeH="0" baseline="0" dirty="0" smtClean="0">
                 <a:ln>
                   <a:noFill/>
                 </a:ln>
@@ -27288,7 +27435,7 @@
               <a:t>Adéquate</a:t>
             </a:r>
             <a:r>
-              <a:rPr kumimoji="0" lang="en-US" sz="1500" b="0" i="0" u="none" strike="noStrike" kern="1200" cap="none" spc="0" normalizeH="0" baseline="0" noProof="0" dirty="0">
+              <a:rPr kumimoji="0" lang="en-US" sz="1500" b="0" i="0" u="none" strike="noStrike" kern="1200" cap="none" spc="0" normalizeH="0" baseline="0" noProof="0" dirty="0" smtClean="0">
                 <a:ln>
                   <a:noFill/>
                 </a:ln>
@@ -27299,21 +27446,7 @@
                 <a:ea typeface="+mn-ea"/>
                 <a:cs typeface="+mn-cs"/>
               </a:rPr>
-              <a:t> et sur-</a:t>
-            </a:r>
-            <a:r>
-              <a:rPr kumimoji="0" lang="en-US" sz="1500" b="0" i="0" u="none" strike="noStrike" kern="1200" cap="none" spc="0" normalizeH="0" baseline="0" noProof="0" dirty="0" err="1">
-                <a:ln>
-                  <a:noFill/>
-                </a:ln>
-                <a:effectLst/>
-                <a:uLnTx/>
-                <a:uFillTx/>
-                <a:latin typeface="Open Sans" panose="020B0606030504020204" pitchFamily="34" charset="0"/>
-                <a:ea typeface="+mn-ea"/>
-                <a:cs typeface="+mn-cs"/>
-              </a:rPr>
-              <a:t>mesure</a:t>
+              <a:t> </a:t>
             </a:r>
             <a:r>
               <a:rPr kumimoji="0" lang="en-US" sz="1500" b="0" i="0" u="none" strike="noStrike" kern="1200" cap="none" spc="0" normalizeH="0" baseline="0" noProof="0" dirty="0">
@@ -27327,7 +27460,49 @@
                 <a:ea typeface="+mn-ea"/>
                 <a:cs typeface="+mn-cs"/>
               </a:rPr>
-              <a:t> pour le personnel de </a:t>
+              <a:t>et </a:t>
+            </a:r>
+            <a:r>
+              <a:rPr kumimoji="0" lang="fr-FR" sz="1500" b="0" i="0" u="none" strike="noStrike" kern="1200" cap="none" spc="0" normalizeH="0" baseline="0" dirty="0" smtClean="0">
+                <a:ln>
+                  <a:noFill/>
+                </a:ln>
+                <a:effectLst/>
+                <a:uLnTx/>
+                <a:uFillTx/>
+                <a:latin typeface="Open Sans" panose="020B0606030504020204" pitchFamily="34" charset="0"/>
+                <a:ea typeface="+mn-ea"/>
+                <a:cs typeface="+mn-cs"/>
+              </a:rPr>
+              <a:t>sur-mesure</a:t>
+            </a:r>
+            <a:r>
+              <a:rPr kumimoji="0" lang="en-US" sz="1500" b="0" i="0" u="none" strike="noStrike" kern="1200" cap="none" spc="0" normalizeH="0" baseline="0" noProof="0" dirty="0" smtClean="0">
+                <a:ln>
+                  <a:noFill/>
+                </a:ln>
+                <a:effectLst/>
+                <a:uLnTx/>
+                <a:uFillTx/>
+                <a:latin typeface="Open Sans" panose="020B0606030504020204" pitchFamily="34" charset="0"/>
+                <a:ea typeface="+mn-ea"/>
+                <a:cs typeface="+mn-cs"/>
+              </a:rPr>
+              <a:t> </a:t>
+            </a:r>
+            <a:r>
+              <a:rPr kumimoji="0" lang="en-US" sz="1500" b="0" i="0" u="none" strike="noStrike" kern="1200" cap="none" spc="0" normalizeH="0" baseline="0" noProof="0" dirty="0">
+                <a:ln>
+                  <a:noFill/>
+                </a:ln>
+                <a:effectLst/>
+                <a:uLnTx/>
+                <a:uFillTx/>
+                <a:latin typeface="Open Sans" panose="020B0606030504020204" pitchFamily="34" charset="0"/>
+                <a:ea typeface="+mn-ea"/>
+                <a:cs typeface="+mn-cs"/>
+              </a:rPr>
+              <a:t>pour le personnel de </a:t>
             </a:r>
             <a:r>
               <a:rPr kumimoji="0" lang="en-US" sz="1500" b="0" i="0" u="none" strike="noStrike" kern="1200" cap="none" spc="0" normalizeH="0" baseline="0" noProof="0" dirty="0" err="1">
@@ -27404,7 +27579,7 @@
           <p:cNvPr id="156" name="Oval 65">
             <a:extLst>
               <a:ext uri="{FF2B5EF4-FFF2-40B4-BE49-F238E27FC236}">
-                <a16:creationId xmlns:a16="http://schemas.microsoft.com/office/drawing/2014/main" id="{BF985647-61FB-4EF0-AB8D-ED9748971970}"/>
+                <a16:creationId xmlns:a16="http://schemas.microsoft.com/office/drawing/2014/main" xmlns="" id="{BF985647-61FB-4EF0-AB8D-ED9748971970}"/>
               </a:ext>
             </a:extLst>
           </p:cNvPr>
@@ -27485,7 +27660,7 @@
           <p:cNvPr id="157" name="Oval 66">
             <a:extLst>
               <a:ext uri="{FF2B5EF4-FFF2-40B4-BE49-F238E27FC236}">
-                <a16:creationId xmlns:a16="http://schemas.microsoft.com/office/drawing/2014/main" id="{0B05A997-7FE9-467A-B928-C077FD81365A}"/>
+                <a16:creationId xmlns:a16="http://schemas.microsoft.com/office/drawing/2014/main" xmlns="" id="{0B05A997-7FE9-467A-B928-C077FD81365A}"/>
               </a:ext>
             </a:extLst>
           </p:cNvPr>
@@ -27566,7 +27741,7 @@
           <p:cNvPr id="158" name="TextBox 67">
             <a:extLst>
               <a:ext uri="{FF2B5EF4-FFF2-40B4-BE49-F238E27FC236}">
-                <a16:creationId xmlns:a16="http://schemas.microsoft.com/office/drawing/2014/main" id="{F5226DAB-4F50-4C3C-B933-4C0F4E0F6DA3}"/>
+                <a16:creationId xmlns:a16="http://schemas.microsoft.com/office/drawing/2014/main" xmlns="" id="{F5226DAB-4F50-4C3C-B933-4C0F4E0F6DA3}"/>
               </a:ext>
             </a:extLst>
           </p:cNvPr>
@@ -27576,7 +27751,7 @@
         <p:spPr>
           <a:xfrm>
             <a:off x="9143206" y="1756542"/>
-            <a:ext cx="2742126" cy="784830"/>
+            <a:ext cx="2742126" cy="553998"/>
           </a:xfrm>
           <a:prstGeom prst="rect">
             <a:avLst/>
@@ -27660,7 +27835,35 @@
                 <a:ea typeface="+mn-ea"/>
                 <a:cs typeface="+mn-cs"/>
               </a:rPr>
-              <a:t> communication entre les different </a:t>
+              <a:t> communication entre les </a:t>
+            </a:r>
+            <a:r>
+              <a:rPr kumimoji="0" lang="en-US" sz="1500" b="0" i="0" u="none" strike="noStrike" kern="1200" cap="none" spc="0" normalizeH="0" baseline="0" noProof="0" dirty="0" err="1" smtClean="0">
+                <a:ln>
+                  <a:noFill/>
+                </a:ln>
+                <a:effectLst/>
+                <a:uLnTx/>
+                <a:uFillTx/>
+                <a:latin typeface="Open Sans" panose="020B0606030504020204" pitchFamily="34" charset="0"/>
+                <a:ea typeface="+mn-ea"/>
+                <a:cs typeface="+mn-cs"/>
+              </a:rPr>
+              <a:t>differents</a:t>
+            </a:r>
+            <a:r>
+              <a:rPr kumimoji="0" lang="en-US" sz="1500" b="0" i="0" u="none" strike="noStrike" kern="1200" cap="none" spc="0" normalizeH="0" baseline="0" noProof="0" dirty="0" smtClean="0">
+                <a:ln>
+                  <a:noFill/>
+                </a:ln>
+                <a:effectLst/>
+                <a:uLnTx/>
+                <a:uFillTx/>
+                <a:latin typeface="Open Sans" panose="020B0606030504020204" pitchFamily="34" charset="0"/>
+                <a:ea typeface="+mn-ea"/>
+                <a:cs typeface="+mn-cs"/>
+              </a:rPr>
+              <a:t> </a:t>
             </a:r>
             <a:r>
               <a:rPr kumimoji="0" lang="en-US" sz="1500" b="0" i="0" u="none" strike="noStrike" kern="1200" cap="none" spc="0" normalizeH="0" baseline="0" noProof="0" dirty="0" err="1">
@@ -27701,7 +27904,7 @@
           <p:cNvPr id="159" name="TextBox 68">
             <a:extLst>
               <a:ext uri="{FF2B5EF4-FFF2-40B4-BE49-F238E27FC236}">
-                <a16:creationId xmlns:a16="http://schemas.microsoft.com/office/drawing/2014/main" id="{8553F576-4DF1-4FF4-9640-BE041942800D}"/>
+                <a16:creationId xmlns:a16="http://schemas.microsoft.com/office/drawing/2014/main" xmlns="" id="{8553F576-4DF1-4FF4-9640-BE041942800D}"/>
               </a:ext>
             </a:extLst>
           </p:cNvPr>
@@ -27822,7 +28025,7 @@
           <p:cNvPr id="160" name="Image 159">
             <a:extLst>
               <a:ext uri="{FF2B5EF4-FFF2-40B4-BE49-F238E27FC236}">
-                <a16:creationId xmlns:a16="http://schemas.microsoft.com/office/drawing/2014/main" id="{2DC1F4FA-796F-4D6E-8D5F-3D2D3A42283C}"/>
+                <a16:creationId xmlns:a16="http://schemas.microsoft.com/office/drawing/2014/main" xmlns="" id="{2DC1F4FA-796F-4D6E-8D5F-3D2D3A42283C}"/>
               </a:ext>
             </a:extLst>
           </p:cNvPr>
@@ -27858,7 +28061,7 @@
           <p:cNvPr id="161" name="Image 160">
             <a:extLst>
               <a:ext uri="{FF2B5EF4-FFF2-40B4-BE49-F238E27FC236}">
-                <a16:creationId xmlns:a16="http://schemas.microsoft.com/office/drawing/2014/main" id="{860EB4C4-B36A-48B4-BAEE-149D7D1E73D9}"/>
+                <a16:creationId xmlns:a16="http://schemas.microsoft.com/office/drawing/2014/main" xmlns="" id="{860EB4C4-B36A-48B4-BAEE-149D7D1E73D9}"/>
               </a:ext>
             </a:extLst>
           </p:cNvPr>
@@ -27894,7 +28097,7 @@
           <p:cNvPr id="162" name="Image 161">
             <a:extLst>
               <a:ext uri="{FF2B5EF4-FFF2-40B4-BE49-F238E27FC236}">
-                <a16:creationId xmlns:a16="http://schemas.microsoft.com/office/drawing/2014/main" id="{29F2842E-8178-4537-841F-92D00AF8996B}"/>
+                <a16:creationId xmlns:a16="http://schemas.microsoft.com/office/drawing/2014/main" xmlns="" id="{29F2842E-8178-4537-841F-92D00AF8996B}"/>
               </a:ext>
             </a:extLst>
           </p:cNvPr>
@@ -27930,7 +28133,7 @@
           <p:cNvPr id="17" name="Image 16">
             <a:extLst>
               <a:ext uri="{FF2B5EF4-FFF2-40B4-BE49-F238E27FC236}">
-                <a16:creationId xmlns:a16="http://schemas.microsoft.com/office/drawing/2014/main" id="{258247F0-181D-4661-86EF-FD5E3D6BA5B9}"/>
+                <a16:creationId xmlns:a16="http://schemas.microsoft.com/office/drawing/2014/main" xmlns="" id="{258247F0-181D-4661-86EF-FD5E3D6BA5B9}"/>
               </a:ext>
             </a:extLst>
           </p:cNvPr>
@@ -27966,7 +28169,7 @@
           <p:cNvPr id="163" name="Image 162">
             <a:extLst>
               <a:ext uri="{FF2B5EF4-FFF2-40B4-BE49-F238E27FC236}">
-                <a16:creationId xmlns:a16="http://schemas.microsoft.com/office/drawing/2014/main" id="{B1A2252A-0291-4CC2-8BAB-8147596D52B5}"/>
+                <a16:creationId xmlns:a16="http://schemas.microsoft.com/office/drawing/2014/main" xmlns="" id="{B1A2252A-0291-4CC2-8BAB-8147596D52B5}"/>
               </a:ext>
             </a:extLst>
           </p:cNvPr>
@@ -28002,7 +28205,7 @@
           <p:cNvPr id="166" name="Group 67">
             <a:extLst>
               <a:ext uri="{FF2B5EF4-FFF2-40B4-BE49-F238E27FC236}">
-                <a16:creationId xmlns:a16="http://schemas.microsoft.com/office/drawing/2014/main" id="{6D1BCC98-165F-4AD3-9585-A2F3D81DFF8D}"/>
+                <a16:creationId xmlns:a16="http://schemas.microsoft.com/office/drawing/2014/main" xmlns="" id="{6D1BCC98-165F-4AD3-9585-A2F3D81DFF8D}"/>
               </a:ext>
             </a:extLst>
           </p:cNvPr>
@@ -28022,7 +28225,7 @@
             <p:cNvPr id="167" name="Group 68">
               <a:extLst>
                 <a:ext uri="{FF2B5EF4-FFF2-40B4-BE49-F238E27FC236}">
-                  <a16:creationId xmlns:a16="http://schemas.microsoft.com/office/drawing/2014/main" id="{5BD37924-16C1-4C9F-8F46-A19E9D8A01F7}"/>
+                  <a16:creationId xmlns:a16="http://schemas.microsoft.com/office/drawing/2014/main" xmlns="" id="{5BD37924-16C1-4C9F-8F46-A19E9D8A01F7}"/>
                 </a:ext>
               </a:extLst>
             </p:cNvPr>
@@ -28045,7 +28248,7 @@
               <p:cNvPr id="169" name="Rectangle: Rounded Corners 70">
                 <a:extLst>
                   <a:ext uri="{FF2B5EF4-FFF2-40B4-BE49-F238E27FC236}">
-                    <a16:creationId xmlns:a16="http://schemas.microsoft.com/office/drawing/2014/main" id="{F932F46C-FC86-4B3B-8A5C-EFE9CBA2E215}"/>
+                    <a16:creationId xmlns:a16="http://schemas.microsoft.com/office/drawing/2014/main" xmlns="" id="{F932F46C-FC86-4B3B-8A5C-EFE9CBA2E215}"/>
                   </a:ext>
                 </a:extLst>
               </p:cNvPr>
@@ -28126,7 +28329,7 @@
               <p:cNvPr id="170" name="Rectangle: Rounded Corners 71">
                 <a:extLst>
                   <a:ext uri="{FF2B5EF4-FFF2-40B4-BE49-F238E27FC236}">
-                    <a16:creationId xmlns:a16="http://schemas.microsoft.com/office/drawing/2014/main" id="{775BCA6D-C881-493C-9F53-3F965C24CD43}"/>
+                    <a16:creationId xmlns:a16="http://schemas.microsoft.com/office/drawing/2014/main" xmlns="" id="{775BCA6D-C881-493C-9F53-3F965C24CD43}"/>
                   </a:ext>
                 </a:extLst>
               </p:cNvPr>
@@ -28208,7 +28411,7 @@
             <p:cNvPr id="168" name="Oval 69">
               <a:extLst>
                 <a:ext uri="{FF2B5EF4-FFF2-40B4-BE49-F238E27FC236}">
-                  <a16:creationId xmlns:a16="http://schemas.microsoft.com/office/drawing/2014/main" id="{C4A8BFCA-0F02-40A3-9BBE-37BC2FC0F9EA}"/>
+                  <a16:creationId xmlns:a16="http://schemas.microsoft.com/office/drawing/2014/main" xmlns="" id="{C4A8BFCA-0F02-40A3-9BBE-37BC2FC0F9EA}"/>
                 </a:ext>
               </a:extLst>
             </p:cNvPr>
@@ -28328,7 +28531,7 @@
           <p:cNvPr id="69" name="TextBox 35">
             <a:extLst>
               <a:ext uri="{FF2B5EF4-FFF2-40B4-BE49-F238E27FC236}">
-                <a16:creationId xmlns:a16="http://schemas.microsoft.com/office/drawing/2014/main" id="{6405F39A-14CB-4EC4-8ACA-5C85F50E6575}"/>
+                <a16:creationId xmlns:a16="http://schemas.microsoft.com/office/drawing/2014/main" xmlns="" id="{6405F39A-14CB-4EC4-8ACA-5C85F50E6575}"/>
               </a:ext>
             </a:extLst>
           </p:cNvPr>
@@ -28378,7 +28581,7 @@
           <p:cNvPr id="70" name="TextBox 4">
             <a:extLst>
               <a:ext uri="{FF2B5EF4-FFF2-40B4-BE49-F238E27FC236}">
-                <a16:creationId xmlns:a16="http://schemas.microsoft.com/office/drawing/2014/main" id="{F9FC6292-6122-43AF-8C7F-75C054408A94}"/>
+                <a16:creationId xmlns:a16="http://schemas.microsoft.com/office/drawing/2014/main" xmlns="" id="{F9FC6292-6122-43AF-8C7F-75C054408A94}"/>
               </a:ext>
             </a:extLst>
           </p:cNvPr>
@@ -28508,7 +28711,7 @@
           <p:cNvPr id="71" name="TextBox 4">
             <a:extLst>
               <a:ext uri="{FF2B5EF4-FFF2-40B4-BE49-F238E27FC236}">
-                <a16:creationId xmlns:a16="http://schemas.microsoft.com/office/drawing/2014/main" id="{D6F88F4B-0AFF-4C31-AED6-9F3441CB165C}"/>
+                <a16:creationId xmlns:a16="http://schemas.microsoft.com/office/drawing/2014/main" xmlns="" id="{D6F88F4B-0AFF-4C31-AED6-9F3441CB165C}"/>
               </a:ext>
             </a:extLst>
           </p:cNvPr>
@@ -28549,38 +28752,23 @@
               <a:defRPr/>
             </a:pPr>
             <a:r>
-              <a:rPr kumimoji="0" lang="en-US" sz="2800" i="0" strike="noStrike" kern="1200" cap="none" spc="0" normalizeH="0" baseline="0" noProof="0" dirty="0">
-                <a:ln>
-                  <a:noFill/>
-                </a:ln>
-                <a:uLnTx/>
-                <a:uFillTx/>
+              <a:rPr lang="en-US" sz="2800" dirty="0" smtClean="0">
                 <a:latin typeface="Noto Sans" panose="020B0502040504020204" pitchFamily="34"/>
                 <a:ea typeface="Noto Sans" panose="020B0502040504020204" pitchFamily="34"/>
                 <a:cs typeface="Noto Sans" panose="020B0502040504020204" pitchFamily="34"/>
               </a:rPr>
-              <a:t>Sara7a asdiqa2 ma3reftch </a:t>
+              <a:t>On </a:t>
             </a:r>
             <a:r>
-              <a:rPr kumimoji="0" lang="en-US" sz="2800" i="0" strike="noStrike" kern="1200" cap="none" spc="0" normalizeH="0" baseline="0" noProof="0" dirty="0" err="1">
-                <a:ln>
-                  <a:noFill/>
-                </a:ln>
-                <a:uLnTx/>
-                <a:uFillTx/>
+              <a:rPr lang="en-US" sz="2800" dirty="0" err="1" smtClean="0">
                 <a:latin typeface="Noto Sans" panose="020B0502040504020204" pitchFamily="34"/>
                 <a:ea typeface="Noto Sans" panose="020B0502040504020204" pitchFamily="34"/>
                 <a:cs typeface="Noto Sans" panose="020B0502040504020204" pitchFamily="34"/>
               </a:rPr>
-              <a:t>wcha</a:t>
+              <a:t>va</a:t>
             </a:r>
             <a:r>
-              <a:rPr kumimoji="0" lang="en-US" sz="2800" i="0" strike="noStrike" kern="1200" cap="none" spc="0" normalizeH="0" baseline="0" noProof="0" dirty="0">
-                <a:ln>
-                  <a:noFill/>
-                </a:ln>
-                <a:uLnTx/>
-                <a:uFillTx/>
+              <a:rPr lang="en-US" sz="2800" dirty="0" smtClean="0">
                 <a:latin typeface="Noto Sans" panose="020B0502040504020204" pitchFamily="34"/>
                 <a:ea typeface="Noto Sans" panose="020B0502040504020204" pitchFamily="34"/>
                 <a:cs typeface="Noto Sans" panose="020B0502040504020204" pitchFamily="34"/>
@@ -28588,25 +28776,47 @@
               <a:t> </a:t>
             </a:r>
             <a:r>
-              <a:rPr kumimoji="0" lang="en-US" sz="2800" i="0" strike="noStrike" kern="1200" cap="none" spc="0" normalizeH="0" baseline="0" noProof="0" dirty="0" err="1">
-                <a:ln>
-                  <a:noFill/>
-                </a:ln>
-                <a:uLnTx/>
-                <a:uFillTx/>
+              <a:rPr lang="en-US" sz="2800" dirty="0" err="1" smtClean="0">
                 <a:latin typeface="Noto Sans" panose="020B0502040504020204" pitchFamily="34"/>
                 <a:ea typeface="Noto Sans" panose="020B0502040504020204" pitchFamily="34"/>
                 <a:cs typeface="Noto Sans" panose="020B0502040504020204" pitchFamily="34"/>
               </a:rPr>
-              <a:t>ndir</a:t>
+              <a:t>vous</a:t>
             </a:r>
             <a:r>
-              <a:rPr kumimoji="0" lang="en-US" sz="2800" i="0" strike="noStrike" kern="1200" cap="none" spc="0" normalizeH="0" baseline="0" noProof="0" dirty="0">
-                <a:ln>
-                  <a:noFill/>
-                </a:ln>
-                <a:uLnTx/>
-                <a:uFillTx/>
+              <a:rPr lang="en-US" sz="2800" dirty="0" smtClean="0">
+                <a:latin typeface="Noto Sans" panose="020B0502040504020204" pitchFamily="34"/>
+                <a:ea typeface="Noto Sans" panose="020B0502040504020204" pitchFamily="34"/>
+                <a:cs typeface="Noto Sans" panose="020B0502040504020204" pitchFamily="34"/>
+              </a:rPr>
+              <a:t> la  </a:t>
+            </a:r>
+            <a:r>
+              <a:rPr lang="en-US" sz="2800" dirty="0" err="1" smtClean="0">
+                <a:latin typeface="Noto Sans" panose="020B0502040504020204" pitchFamily="34"/>
+                <a:ea typeface="Noto Sans" panose="020B0502040504020204" pitchFamily="34"/>
+                <a:cs typeface="Noto Sans" panose="020B0502040504020204" pitchFamily="34"/>
+              </a:rPr>
+              <a:t>montrer</a:t>
+            </a:r>
+            <a:r>
+              <a:rPr lang="en-US" sz="2800" dirty="0" smtClean="0">
+                <a:latin typeface="Noto Sans" panose="020B0502040504020204" pitchFamily="34"/>
+                <a:ea typeface="Noto Sans" panose="020B0502040504020204" pitchFamily="34"/>
+                <a:cs typeface="Noto Sans" panose="020B0502040504020204" pitchFamily="34"/>
+              </a:rPr>
+              <a:t> sous </a:t>
+            </a:r>
+            <a:r>
+              <a:rPr lang="en-US" sz="2800" dirty="0" err="1" smtClean="0">
+                <a:latin typeface="Noto Sans" panose="020B0502040504020204" pitchFamily="34"/>
+                <a:ea typeface="Noto Sans" panose="020B0502040504020204" pitchFamily="34"/>
+                <a:cs typeface="Noto Sans" panose="020B0502040504020204" pitchFamily="34"/>
+              </a:rPr>
+              <a:t>forme</a:t>
+            </a:r>
+            <a:r>
+              <a:rPr lang="en-US" sz="2800" dirty="0" smtClean="0">
                 <a:latin typeface="Noto Sans" panose="020B0502040504020204" pitchFamily="34"/>
                 <a:ea typeface="Noto Sans" panose="020B0502040504020204" pitchFamily="34"/>
                 <a:cs typeface="Noto Sans" panose="020B0502040504020204" pitchFamily="34"/>
@@ -28614,31 +28824,47 @@
               <a:t> </a:t>
             </a:r>
             <a:r>
-              <a:rPr kumimoji="0" lang="en-US" sz="2800" i="0" strike="noStrike" kern="1200" cap="none" spc="0" normalizeH="0" baseline="0" noProof="0" dirty="0" err="1">
-                <a:ln>
-                  <a:noFill/>
-                </a:ln>
-                <a:uLnTx/>
-                <a:uFillTx/>
+              <a:rPr lang="en-US" sz="2800" dirty="0" err="1" smtClean="0">
                 <a:latin typeface="Noto Sans" panose="020B0502040504020204" pitchFamily="34"/>
                 <a:ea typeface="Noto Sans" panose="020B0502040504020204" pitchFamily="34"/>
                 <a:cs typeface="Noto Sans" panose="020B0502040504020204" pitchFamily="34"/>
               </a:rPr>
-              <a:t>hna</a:t>
+              <a:t>d’une</a:t>
             </a:r>
             <a:r>
-              <a:rPr kumimoji="0" lang="en-US" sz="2800" i="0" strike="noStrike" kern="1200" cap="none" spc="0" normalizeH="0" baseline="0" noProof="0" dirty="0">
-                <a:ln>
-                  <a:noFill/>
-                </a:ln>
-                <a:uLnTx/>
-                <a:uFillTx/>
+              <a:rPr lang="en-US" sz="2800" dirty="0" smtClean="0">
                 <a:latin typeface="Noto Sans" panose="020B0502040504020204" pitchFamily="34"/>
                 <a:ea typeface="Noto Sans" panose="020B0502040504020204" pitchFamily="34"/>
                 <a:cs typeface="Noto Sans" panose="020B0502040504020204" pitchFamily="34"/>
               </a:rPr>
-              <a:t> …</a:t>
+              <a:t> </a:t>
             </a:r>
+            <a:r>
+              <a:rPr lang="en-US" sz="2800" dirty="0" err="1" smtClean="0">
+                <a:latin typeface="Noto Sans" panose="020B0502040504020204" pitchFamily="34"/>
+                <a:ea typeface="Noto Sans" panose="020B0502040504020204" pitchFamily="34"/>
+                <a:cs typeface="Noto Sans" panose="020B0502040504020204" pitchFamily="34"/>
+              </a:rPr>
+              <a:t>vidéo</a:t>
+            </a:r>
+            <a:r>
+              <a:rPr lang="en-US" sz="2800" dirty="0" smtClean="0">
+                <a:latin typeface="Noto Sans" panose="020B0502040504020204" pitchFamily="34"/>
+                <a:ea typeface="Noto Sans" panose="020B0502040504020204" pitchFamily="34"/>
+                <a:cs typeface="Noto Sans" panose="020B0502040504020204" pitchFamily="34"/>
+              </a:rPr>
+              <a:t>  </a:t>
+            </a:r>
+            <a:endParaRPr kumimoji="0" lang="en-US" sz="2800" i="0" strike="noStrike" kern="1200" cap="none" spc="0" normalizeH="0" baseline="0" noProof="0" dirty="0">
+              <a:ln>
+                <a:noFill/>
+              </a:ln>
+              <a:uLnTx/>
+              <a:uFillTx/>
+              <a:latin typeface="Noto Sans" panose="020B0502040504020204" pitchFamily="34"/>
+              <a:ea typeface="Noto Sans" panose="020B0502040504020204" pitchFamily="34"/>
+              <a:cs typeface="Noto Sans" panose="020B0502040504020204" pitchFamily="34"/>
+            </a:endParaRPr>
           </a:p>
         </p:txBody>
       </p:sp>
@@ -28685,7 +28911,7 @@
           <p:cNvPr id="69" name="TextBox 35">
             <a:extLst>
               <a:ext uri="{FF2B5EF4-FFF2-40B4-BE49-F238E27FC236}">
-                <a16:creationId xmlns:a16="http://schemas.microsoft.com/office/drawing/2014/main" id="{6405F39A-14CB-4EC4-8ACA-5C85F50E6575}"/>
+                <a16:creationId xmlns:a16="http://schemas.microsoft.com/office/drawing/2014/main" xmlns="" id="{6405F39A-14CB-4EC4-8ACA-5C85F50E6575}"/>
               </a:ext>
             </a:extLst>
           </p:cNvPr>
@@ -28735,7 +28961,7 @@
           <p:cNvPr id="70" name="TextBox 4">
             <a:extLst>
               <a:ext uri="{FF2B5EF4-FFF2-40B4-BE49-F238E27FC236}">
-                <a16:creationId xmlns:a16="http://schemas.microsoft.com/office/drawing/2014/main" id="{F9FC6292-6122-43AF-8C7F-75C054408A94}"/>
+                <a16:creationId xmlns:a16="http://schemas.microsoft.com/office/drawing/2014/main" xmlns="" id="{F9FC6292-6122-43AF-8C7F-75C054408A94}"/>
               </a:ext>
             </a:extLst>
           </p:cNvPr>
@@ -28838,7 +29064,7 @@
           <p:cNvPr id="4" name="TextBox 64">
             <a:extLst>
               <a:ext uri="{FF2B5EF4-FFF2-40B4-BE49-F238E27FC236}">
-                <a16:creationId xmlns:a16="http://schemas.microsoft.com/office/drawing/2014/main" id="{03F8AF6A-2F1B-47CA-A538-14E976CE5A21}"/>
+                <a16:creationId xmlns:a16="http://schemas.microsoft.com/office/drawing/2014/main" xmlns="" id="{03F8AF6A-2F1B-47CA-A538-14E976CE5A21}"/>
               </a:ext>
             </a:extLst>
           </p:cNvPr>
@@ -28984,7 +29210,7 @@
           <p:cNvPr id="3" name="Image 2">
             <a:extLst>
               <a:ext uri="{FF2B5EF4-FFF2-40B4-BE49-F238E27FC236}">
-                <a16:creationId xmlns:a16="http://schemas.microsoft.com/office/drawing/2014/main" id="{9283A749-AEBB-4C34-988C-2F8F5376581E}"/>
+                <a16:creationId xmlns:a16="http://schemas.microsoft.com/office/drawing/2014/main" xmlns="" id="{9283A749-AEBB-4C34-988C-2F8F5376581E}"/>
               </a:ext>
             </a:extLst>
           </p:cNvPr>
@@ -28994,7 +29220,7 @@
           <p:nvPr/>
         </p:nvPicPr>
         <p:blipFill>
-          <a:blip r:embed="rId3">
+          <a:blip r:embed="rId3" cstate="print">
             <a:extLst>
               <a:ext uri="{28A0092B-C50C-407E-A947-70E740481C1C}">
                 <a14:useLocalDpi xmlns:a14="http://schemas.microsoft.com/office/drawing/2010/main" val="0"/>
@@ -29020,7 +29246,7 @@
           <p:cNvPr id="7" name="TextBox 1">
             <a:extLst>
               <a:ext uri="{FF2B5EF4-FFF2-40B4-BE49-F238E27FC236}">
-                <a16:creationId xmlns:a16="http://schemas.microsoft.com/office/drawing/2014/main" id="{6A7864E7-995C-496B-AD23-D6997AB17CC5}"/>
+                <a16:creationId xmlns:a16="http://schemas.microsoft.com/office/drawing/2014/main" xmlns="" id="{6A7864E7-995C-496B-AD23-D6997AB17CC5}"/>
               </a:ext>
             </a:extLst>
           </p:cNvPr>
@@ -29060,7 +29286,7 @@
           <p:cNvPr id="5" name="Rectangle : coins arrondis 4">
             <a:extLst>
               <a:ext uri="{FF2B5EF4-FFF2-40B4-BE49-F238E27FC236}">
-                <a16:creationId xmlns:a16="http://schemas.microsoft.com/office/drawing/2014/main" id="{3283E187-B269-4A8E-8ABA-F16EC1E05BEB}"/>
+                <a16:creationId xmlns:a16="http://schemas.microsoft.com/office/drawing/2014/main" xmlns="" id="{3283E187-B269-4A8E-8ABA-F16EC1E05BEB}"/>
               </a:ext>
             </a:extLst>
           </p:cNvPr>
@@ -29114,7 +29340,7 @@
           <p:cNvPr id="8" name="TextBox 64">
             <a:extLst>
               <a:ext uri="{FF2B5EF4-FFF2-40B4-BE49-F238E27FC236}">
-                <a16:creationId xmlns:a16="http://schemas.microsoft.com/office/drawing/2014/main" id="{C641B2B5-A7E0-4E49-9A5C-7AFF2FF18909}"/>
+                <a16:creationId xmlns:a16="http://schemas.microsoft.com/office/drawing/2014/main" xmlns="" id="{C641B2B5-A7E0-4E49-9A5C-7AFF2FF18909}"/>
               </a:ext>
             </a:extLst>
           </p:cNvPr>
@@ -29240,16 +29466,22 @@
               <a:defRPr/>
             </a:pPr>
             <a:r>
-              <a:rPr lang="en-US" sz="1500" b="1" dirty="0" err="1">
+              <a:rPr lang="en-US" sz="1500" b="1" dirty="0" err="1" smtClean="0">
                 <a:latin typeface="Open Sans" panose="020B0606030504020204" pitchFamily="34" charset="0"/>
               </a:rPr>
-              <a:t>Quelque</a:t>
+              <a:t>Quelques</a:t>
+            </a:r>
+            <a:r>
+              <a:rPr lang="en-US" sz="1500" b="1" dirty="0" smtClean="0">
+                <a:latin typeface="Open Sans" panose="020B0606030504020204" pitchFamily="34" charset="0"/>
+              </a:rPr>
+              <a:t> </a:t>
             </a:r>
             <a:r>
               <a:rPr lang="en-US" sz="1500" b="1" dirty="0">
                 <a:latin typeface="Open Sans" panose="020B0606030504020204" pitchFamily="34" charset="0"/>
               </a:rPr>
-              <a:t> captures </a:t>
+              <a:t>captures </a:t>
             </a:r>
             <a:r>
               <a:rPr lang="en-US" sz="1500" b="1" dirty="0" err="1">
@@ -29261,7 +29493,19 @@
               <a:rPr lang="en-US" sz="1500" b="1" dirty="0">
                 <a:latin typeface="Open Sans" panose="020B0606030504020204" pitchFamily="34" charset="0"/>
               </a:rPr>
-              <a:t> des interfaces </a:t>
+              <a:t> </a:t>
+            </a:r>
+            <a:r>
+              <a:rPr lang="en-US" sz="1500" b="1" dirty="0" smtClean="0">
+                <a:latin typeface="Open Sans" panose="020B0606030504020204" pitchFamily="34" charset="0"/>
+              </a:rPr>
+              <a:t>,des </a:t>
+            </a:r>
+            <a:r>
+              <a:rPr lang="en-US" sz="1500" b="1" dirty="0">
+                <a:latin typeface="Open Sans" panose="020B0606030504020204" pitchFamily="34" charset="0"/>
+              </a:rPr>
+              <a:t>interfaces </a:t>
             </a:r>
             <a:r>
               <a:rPr lang="en-US" sz="1500" b="1" dirty="0" err="1">
@@ -29445,7 +29689,7 @@
           <p:cNvPr id="9" name="Connecteur : en arc 8">
             <a:extLst>
               <a:ext uri="{FF2B5EF4-FFF2-40B4-BE49-F238E27FC236}">
-                <a16:creationId xmlns:a16="http://schemas.microsoft.com/office/drawing/2014/main" id="{4E3AE972-8690-4333-A60B-44D333D5AE25}"/>
+                <a16:creationId xmlns:a16="http://schemas.microsoft.com/office/drawing/2014/main" xmlns="" id="{4E3AE972-8690-4333-A60B-44D333D5AE25}"/>
               </a:ext>
             </a:extLst>
           </p:cNvPr>

</xml_diff>